<commit_message>
More contributions with Rodirgo
</commit_message>
<xml_diff>
--- a/Mundo do Wumpus.pptx
+++ b/Mundo do Wumpus.pptx
@@ -14,9 +14,15 @@
     <p:sldId id="261" r:id="rId8"/>
     <p:sldId id="262" r:id="rId9"/>
     <p:sldId id="263" r:id="rId10"/>
-    <p:sldId id="264" r:id="rId11"/>
-    <p:sldId id="265" r:id="rId12"/>
-    <p:sldId id="266" r:id="rId13"/>
+    <p:sldId id="272" r:id="rId11"/>
+    <p:sldId id="273" r:id="rId12"/>
+    <p:sldId id="264" r:id="rId13"/>
+    <p:sldId id="270" r:id="rId14"/>
+    <p:sldId id="271" r:id="rId15"/>
+    <p:sldId id="265" r:id="rId16"/>
+    <p:sldId id="269" r:id="rId17"/>
+    <p:sldId id="266" r:id="rId18"/>
+    <p:sldId id="268" r:id="rId19"/>
   </p:sldIdLst>
   <p:sldSz cx="12192000" cy="6858000"/>
   <p:notesSz cx="6858000" cy="9144000"/>
@@ -115,6 +121,11 @@
       </a:defRPr>
     </a:lvl9pPr>
   </p:defaultTextStyle>
+  <p:extLst>
+    <p:ext uri="{EFAFB233-063F-42B5-8137-9DF3F51BA10A}">
+      <p15:sldGuideLst xmlns:p15="http://schemas.microsoft.com/office/powerpoint/2012/main"/>
+    </p:ext>
+  </p:extLst>
 </p:presentation>
 </file>
 
@@ -1779,6 +1790,13 @@
     <dgm:pt modelId="{41E786A4-E49E-4551-BC66-1B98BEBDFBC0}" type="pres">
       <dgm:prSet presAssocID="{3FF0AE23-3C36-46BA-AC4A-4526A5D797A0}" presName="wedge2" presStyleLbl="node1" presStyleIdx="1" presStyleCnt="3"/>
       <dgm:spPr/>
+      <dgm:t>
+        <a:bodyPr/>
+        <a:lstStyle/>
+        <a:p>
+          <a:endParaRPr lang="pt-BR"/>
+        </a:p>
+      </dgm:t>
     </dgm:pt>
     <dgm:pt modelId="{B8C9DDF1-7419-40DC-A908-89FDE16FCC2F}" type="pres">
       <dgm:prSet presAssocID="{3FF0AE23-3C36-46BA-AC4A-4526A5D797A0}" presName="dummy2a" presStyleCnt="0"/>
@@ -1797,10 +1815,24 @@
         </dgm:presLayoutVars>
       </dgm:prSet>
       <dgm:spPr/>
+      <dgm:t>
+        <a:bodyPr/>
+        <a:lstStyle/>
+        <a:p>
+          <a:endParaRPr lang="pt-BR"/>
+        </a:p>
+      </dgm:t>
     </dgm:pt>
     <dgm:pt modelId="{C14CF8F6-2271-4F2F-9A6D-29CACACDB126}" type="pres">
       <dgm:prSet presAssocID="{3FF0AE23-3C36-46BA-AC4A-4526A5D797A0}" presName="wedge3" presStyleLbl="node1" presStyleIdx="2" presStyleCnt="3"/>
       <dgm:spPr/>
+      <dgm:t>
+        <a:bodyPr/>
+        <a:lstStyle/>
+        <a:p>
+          <a:endParaRPr lang="pt-BR"/>
+        </a:p>
+      </dgm:t>
     </dgm:pt>
     <dgm:pt modelId="{3051F70D-0238-4990-B771-75DC61996A17}" type="pres">
       <dgm:prSet presAssocID="{3FF0AE23-3C36-46BA-AC4A-4526A5D797A0}" presName="dummy3a" presStyleCnt="0"/>
@@ -1819,6 +1851,13 @@
         </dgm:presLayoutVars>
       </dgm:prSet>
       <dgm:spPr/>
+      <dgm:t>
+        <a:bodyPr/>
+        <a:lstStyle/>
+        <a:p>
+          <a:endParaRPr lang="pt-BR"/>
+        </a:p>
+      </dgm:t>
     </dgm:pt>
     <dgm:pt modelId="{F380708E-A279-450E-B5D4-4AF09ED8ABE2}" type="pres">
       <dgm:prSet presAssocID="{C7AF246E-0DC9-48D3-9F76-7D94AF856BDA}" presName="arrowWedge1" presStyleLbl="fgSibTrans2D1" presStyleIdx="0" presStyleCnt="3"/>
@@ -1839,8 +1878,8 @@
     <dgm:cxn modelId="{1C03EDDC-8A2D-4D1A-A5EA-82E3399F35BB}" type="presOf" srcId="{01F4058E-5F9D-42AA-BB34-5BC3D85A024C}" destId="{C9180CCB-285C-4A5A-9E4C-4BFAEB7F2B03}" srcOrd="1" destOrd="0" presId="urn:microsoft.com/office/officeart/2005/8/layout/cycle8"/>
     <dgm:cxn modelId="{FF9FC0F8-0EB2-4E30-AE2B-2DED1D9FC797}" srcId="{3FF0AE23-3C36-46BA-AC4A-4526A5D797A0}" destId="{B14775A5-0D06-4579-BD83-1F6C99B270F4}" srcOrd="1" destOrd="0" parTransId="{0C9B8C81-2DD1-4A7B-BA60-7C4B66277FA5}" sibTransId="{475A15A6-6DC7-41DD-AF2E-7CDD4EB81227}"/>
     <dgm:cxn modelId="{6B4A2402-96CC-443F-8C63-62C51A01FD3A}" type="presOf" srcId="{3FF0AE23-3C36-46BA-AC4A-4526A5D797A0}" destId="{0C55F12A-8364-40FC-B491-357F416850DA}" srcOrd="0" destOrd="0" presId="urn:microsoft.com/office/officeart/2005/8/layout/cycle8"/>
+    <dgm:cxn modelId="{8873D0C9-2B45-41A5-9795-C38BED61E18D}" type="presOf" srcId="{B14775A5-0D06-4579-BD83-1F6C99B270F4}" destId="{495EBFB1-7927-43D0-B440-7E8A3040EE5D}" srcOrd="1" destOrd="0" presId="urn:microsoft.com/office/officeart/2005/8/layout/cycle8"/>
     <dgm:cxn modelId="{1FD170D4-4C0E-4743-9524-BF110F1EF65F}" type="presOf" srcId="{6A0B6496-43EF-4E75-9897-8F488C5D63AD}" destId="{2ED4471D-8F5B-4FFA-9AAC-DA76E5D47AFF}" srcOrd="1" destOrd="0" presId="urn:microsoft.com/office/officeart/2005/8/layout/cycle8"/>
-    <dgm:cxn modelId="{8873D0C9-2B45-41A5-9795-C38BED61E18D}" type="presOf" srcId="{B14775A5-0D06-4579-BD83-1F6C99B270F4}" destId="{495EBFB1-7927-43D0-B440-7E8A3040EE5D}" srcOrd="1" destOrd="0" presId="urn:microsoft.com/office/officeart/2005/8/layout/cycle8"/>
     <dgm:cxn modelId="{B580935E-D496-4B03-A484-C070924AF212}" srcId="{3FF0AE23-3C36-46BA-AC4A-4526A5D797A0}" destId="{01F4058E-5F9D-42AA-BB34-5BC3D85A024C}" srcOrd="2" destOrd="0" parTransId="{F639A97A-31F0-49E3-A637-B9768CD2E3D0}" sibTransId="{1097D3FB-EC17-40E1-9CDE-BF6168DC4F62}"/>
     <dgm:cxn modelId="{FCE7700A-60D4-4F30-A9CE-0512426B6C95}" type="presOf" srcId="{B14775A5-0D06-4579-BD83-1F6C99B270F4}" destId="{41E786A4-E49E-4551-BC66-1B98BEBDFBC0}" srcOrd="0" destOrd="0" presId="urn:microsoft.com/office/officeart/2005/8/layout/cycle8"/>
     <dgm:cxn modelId="{65201BA6-6C8F-4FE9-AC22-382DBAF35FF6}" srcId="{3FF0AE23-3C36-46BA-AC4A-4526A5D797A0}" destId="{6A0B6496-43EF-4E75-9897-8F488C5D63AD}" srcOrd="0" destOrd="0" parTransId="{F7B24134-FAD8-4E56-976D-B1D14E727819}" sibTransId="{C7AF246E-0DC9-48D3-9F76-7D94AF856BDA}"/>
@@ -1930,12 +1969,19 @@
         </dgm:presLayoutVars>
       </dgm:prSet>
       <dgm:spPr/>
+      <dgm:t>
+        <a:bodyPr/>
+        <a:lstStyle/>
+        <a:p>
+          <a:endParaRPr lang="pt-BR"/>
+        </a:p>
+      </dgm:t>
     </dgm:pt>
   </dgm:ptLst>
   <dgm:cxnLst>
     <dgm:cxn modelId="{002E13E0-4954-43ED-BA45-6B5349226DFB}" srcId="{F84A2734-884F-48C7-9529-94A88BE6CD9A}" destId="{D8BB0D78-887E-48BA-9F45-0B9349CDF075}" srcOrd="0" destOrd="0" parTransId="{64F44DF5-E0F0-4B93-BB0D-EBE21A75B662}" sibTransId="{85B89ADE-6119-4EFE-AAB5-86A9C803F90C}"/>
+    <dgm:cxn modelId="{B8EA49F6-F3BA-4E24-B3C8-D29E9519CA90}" type="presOf" srcId="{F84A2734-884F-48C7-9529-94A88BE6CD9A}" destId="{F270A453-8A66-45A0-8144-43DEEB709FF4}" srcOrd="0" destOrd="0" presId="urn:microsoft.com/office/officeart/2005/8/layout/process1"/>
     <dgm:cxn modelId="{0FE1AE31-D8F6-47DC-A62E-1A0908237705}" type="presOf" srcId="{D8BB0D78-887E-48BA-9F45-0B9349CDF075}" destId="{65137B11-9E4E-4D71-BE43-8014B872E69F}" srcOrd="0" destOrd="0" presId="urn:microsoft.com/office/officeart/2005/8/layout/process1"/>
-    <dgm:cxn modelId="{B8EA49F6-F3BA-4E24-B3C8-D29E9519CA90}" type="presOf" srcId="{F84A2734-884F-48C7-9529-94A88BE6CD9A}" destId="{F270A453-8A66-45A0-8144-43DEEB709FF4}" srcOrd="0" destOrd="0" presId="urn:microsoft.com/office/officeart/2005/8/layout/process1"/>
     <dgm:cxn modelId="{B48900A3-8672-401D-A7F0-D4D8FF20C395}" type="presParOf" srcId="{F270A453-8A66-45A0-8144-43DEEB709FF4}" destId="{65137B11-9E4E-4D71-BE43-8014B872E69F}" srcOrd="0" destOrd="0" presId="urn:microsoft.com/office/officeart/2005/8/layout/process1"/>
   </dgm:cxnLst>
   <dgm:bg/>
@@ -6544,7 +6590,7 @@
           <a:p>
             <a:fld id="{213F39DB-1467-4D4D-9743-31981A20AF97}" type="datetimeFigureOut">
               <a:rPr lang="pt-BR" smtClean="0"/>
-              <a:t>03/01/2017</a:t>
+              <a:t>04/01/2017</a:t>
             </a:fld>
             <a:endParaRPr lang="pt-BR"/>
           </a:p>
@@ -6714,7 +6760,7 @@
           <a:p>
             <a:fld id="{213F39DB-1467-4D4D-9743-31981A20AF97}" type="datetimeFigureOut">
               <a:rPr lang="pt-BR" smtClean="0"/>
-              <a:t>03/01/2017</a:t>
+              <a:t>04/01/2017</a:t>
             </a:fld>
             <a:endParaRPr lang="pt-BR"/>
           </a:p>
@@ -6894,7 +6940,7 @@
           <a:p>
             <a:fld id="{213F39DB-1467-4D4D-9743-31981A20AF97}" type="datetimeFigureOut">
               <a:rPr lang="pt-BR" smtClean="0"/>
-              <a:t>03/01/2017</a:t>
+              <a:t>04/01/2017</a:t>
             </a:fld>
             <a:endParaRPr lang="pt-BR"/>
           </a:p>
@@ -7064,7 +7110,7 @@
           <a:p>
             <a:fld id="{213F39DB-1467-4D4D-9743-31981A20AF97}" type="datetimeFigureOut">
               <a:rPr lang="pt-BR" smtClean="0"/>
-              <a:t>03/01/2017</a:t>
+              <a:t>04/01/2017</a:t>
             </a:fld>
             <a:endParaRPr lang="pt-BR"/>
           </a:p>
@@ -7310,7 +7356,7 @@
           <a:p>
             <a:fld id="{213F39DB-1467-4D4D-9743-31981A20AF97}" type="datetimeFigureOut">
               <a:rPr lang="pt-BR" smtClean="0"/>
-              <a:t>03/01/2017</a:t>
+              <a:t>04/01/2017</a:t>
             </a:fld>
             <a:endParaRPr lang="pt-BR"/>
           </a:p>
@@ -7542,7 +7588,7 @@
           <a:p>
             <a:fld id="{213F39DB-1467-4D4D-9743-31981A20AF97}" type="datetimeFigureOut">
               <a:rPr lang="pt-BR" smtClean="0"/>
-              <a:t>03/01/2017</a:t>
+              <a:t>04/01/2017</a:t>
             </a:fld>
             <a:endParaRPr lang="pt-BR"/>
           </a:p>
@@ -7909,7 +7955,7 @@
           <a:p>
             <a:fld id="{213F39DB-1467-4D4D-9743-31981A20AF97}" type="datetimeFigureOut">
               <a:rPr lang="pt-BR" smtClean="0"/>
-              <a:t>03/01/2017</a:t>
+              <a:t>04/01/2017</a:t>
             </a:fld>
             <a:endParaRPr lang="pt-BR"/>
           </a:p>
@@ -8027,7 +8073,7 @@
           <a:p>
             <a:fld id="{213F39DB-1467-4D4D-9743-31981A20AF97}" type="datetimeFigureOut">
               <a:rPr lang="pt-BR" smtClean="0"/>
-              <a:t>03/01/2017</a:t>
+              <a:t>04/01/2017</a:t>
             </a:fld>
             <a:endParaRPr lang="pt-BR"/>
           </a:p>
@@ -8122,7 +8168,7 @@
           <a:p>
             <a:fld id="{213F39DB-1467-4D4D-9743-31981A20AF97}" type="datetimeFigureOut">
               <a:rPr lang="pt-BR" smtClean="0"/>
-              <a:t>03/01/2017</a:t>
+              <a:t>04/01/2017</a:t>
             </a:fld>
             <a:endParaRPr lang="pt-BR"/>
           </a:p>
@@ -8399,7 +8445,7 @@
           <a:p>
             <a:fld id="{213F39DB-1467-4D4D-9743-31981A20AF97}" type="datetimeFigureOut">
               <a:rPr lang="pt-BR" smtClean="0"/>
-              <a:t>03/01/2017</a:t>
+              <a:t>04/01/2017</a:t>
             </a:fld>
             <a:endParaRPr lang="pt-BR"/>
           </a:p>
@@ -8652,7 +8698,7 @@
           <a:p>
             <a:fld id="{213F39DB-1467-4D4D-9743-31981A20AF97}" type="datetimeFigureOut">
               <a:rPr lang="pt-BR" smtClean="0"/>
-              <a:t>03/01/2017</a:t>
+              <a:t>04/01/2017</a:t>
             </a:fld>
             <a:endParaRPr lang="pt-BR"/>
           </a:p>
@@ -8865,7 +8911,7 @@
           <a:p>
             <a:fld id="{213F39DB-1467-4D4D-9743-31981A20AF97}" type="datetimeFigureOut">
               <a:rPr lang="pt-BR" smtClean="0"/>
-              <a:t>03/01/2017</a:t>
+              <a:t>04/01/2017</a:t>
             </a:fld>
             <a:endParaRPr lang="pt-BR"/>
           </a:p>
@@ -9307,28 +9353,119 @@
             <p:ph type="subTitle" idx="1"/>
           </p:nvPr>
         </p:nvSpPr>
-        <p:spPr/>
+        <p:spPr>
+          <a:xfrm>
+            <a:off x="1524000" y="3602037"/>
+            <a:ext cx="9144000" cy="2149057"/>
+          </a:xfrm>
+        </p:spPr>
         <p:txBody>
-          <a:bodyPr/>
+          <a:bodyPr>
+            <a:normAutofit fontScale="85000" lnSpcReduction="20000"/>
+          </a:bodyPr>
           <a:lstStyle/>
           <a:p>
             <a:endParaRPr lang="pt-BR" dirty="0" smtClean="0"/>
           </a:p>
           <a:p>
             <a:r>
+              <a:rPr lang="pt-BR" sz="2700" dirty="0" smtClean="0"/>
+              <a:t>Sistemas Inteligentes</a:t>
+            </a:r>
+          </a:p>
+          <a:p>
+            <a:r>
+              <a:rPr lang="pt-BR" dirty="0"/>
+              <a:t>Prof. </a:t>
+            </a:r>
+            <a:r>
+              <a:rPr lang="pt-BR" dirty="0" err="1" smtClean="0"/>
+              <a:t>Heloina</a:t>
+            </a:r>
+            <a:r>
               <a:rPr lang="pt-BR" dirty="0" smtClean="0"/>
+              <a:t> Alves Arnaldo</a:t>
+            </a:r>
+            <a:endParaRPr lang="pt-BR" dirty="0" smtClean="0"/>
+          </a:p>
+          <a:p>
+            <a:endParaRPr lang="pt-BR" dirty="0" smtClean="0"/>
+          </a:p>
+          <a:p>
+            <a:r>
+              <a:rPr lang="pt-BR" b="1" dirty="0" smtClean="0"/>
               <a:t>Rodrigo Carlos Carvalho Lima Barbosa Leal</a:t>
             </a:r>
           </a:p>
           <a:p>
             <a:r>
-              <a:rPr lang="pt-BR" dirty="0" smtClean="0"/>
+              <a:rPr lang="pt-BR" b="1" dirty="0" smtClean="0"/>
               <a:t>Ricardo Bruno Ferreira da Silva</a:t>
             </a:r>
-            <a:endParaRPr lang="pt-BR" dirty="0"/>
+            <a:endParaRPr lang="pt-BR" b="1" dirty="0"/>
           </a:p>
         </p:txBody>
       </p:sp>
+      <p:pic>
+        <p:nvPicPr>
+          <p:cNvPr id="5" name="Imagem 4"/>
+          <p:cNvPicPr>
+            <a:picLocks noChangeAspect="1"/>
+          </p:cNvPicPr>
+          <p:nvPr/>
+        </p:nvPicPr>
+        <p:blipFill>
+          <a:blip r:embed="rId2">
+            <a:extLst>
+              <a:ext uri="{28A0092B-C50C-407E-A947-70E740481C1C}">
+                <a14:useLocalDpi xmlns:a14="http://schemas.microsoft.com/office/drawing/2010/main" val="0"/>
+              </a:ext>
+            </a:extLst>
+          </a:blip>
+          <a:stretch>
+            <a:fillRect/>
+          </a:stretch>
+        </p:blipFill>
+        <p:spPr>
+          <a:xfrm>
+            <a:off x="1" y="1"/>
+            <a:ext cx="1524000" cy="2122486"/>
+          </a:xfrm>
+          <a:prstGeom prst="rect">
+            <a:avLst/>
+          </a:prstGeom>
+        </p:spPr>
+      </p:pic>
+      <p:pic>
+        <p:nvPicPr>
+          <p:cNvPr id="6" name="Imagem 5"/>
+          <p:cNvPicPr>
+            <a:picLocks noChangeAspect="1"/>
+          </p:cNvPicPr>
+          <p:nvPr/>
+        </p:nvPicPr>
+        <p:blipFill>
+          <a:blip r:embed="rId3">
+            <a:extLst>
+              <a:ext uri="{28A0092B-C50C-407E-A947-70E740481C1C}">
+                <a14:useLocalDpi xmlns:a14="http://schemas.microsoft.com/office/drawing/2010/main" val="0"/>
+              </a:ext>
+            </a:extLst>
+          </a:blip>
+          <a:stretch>
+            <a:fillRect/>
+          </a:stretch>
+        </p:blipFill>
+        <p:spPr>
+          <a:xfrm>
+            <a:off x="10062411" y="30165"/>
+            <a:ext cx="2129589" cy="2092321"/>
+          </a:xfrm>
+          <a:prstGeom prst="rect">
+            <a:avLst/>
+          </a:prstGeom>
+        </p:spPr>
+      </p:pic>
     </p:spTree>
     <p:extLst>
       <p:ext uri="{BB962C8B-B14F-4D97-AF65-F5344CB8AC3E}">
@@ -9339,6 +9476,13 @@
   <p:clrMapOvr>
     <a:masterClrMapping/>
   </p:clrMapOvr>
+  <p:timing>
+    <p:tnLst>
+      <p:par>
+        <p:cTn id="1" dur="indefinite" restart="never" nodeType="tmRoot"/>
+      </p:par>
+    </p:tnLst>
+  </p:timing>
 </p:sld>
 </file>
 
@@ -9376,7 +9520,7 @@
           <a:p>
             <a:r>
               <a:rPr lang="pt-BR" dirty="0" smtClean="0"/>
-              <a:t>Estruturas auxiliares</a:t>
+              <a:t>Funções de Execução</a:t>
             </a:r>
             <a:endParaRPr lang="pt-BR" dirty="0"/>
           </a:p>
@@ -9397,92 +9541,43 @@
           <a:bodyPr/>
           <a:lstStyle/>
           <a:p>
-            <a:pPr marL="0" indent="0">
-              <a:buNone/>
-            </a:pPr>
-            <a:r>
-              <a:rPr lang="en-US" b="1" dirty="0"/>
-              <a:t>static char </a:t>
-            </a:r>
-            <a:r>
-              <a:rPr lang="en-US" b="1" i="1" dirty="0" err="1"/>
-              <a:t>imaginacaoWumpus</a:t>
-            </a:r>
-            <a:r>
-              <a:rPr lang="en-US" b="1" i="1" dirty="0"/>
-              <a:t>[][] = new char[4][4];</a:t>
-            </a:r>
-          </a:p>
-          <a:p>
-            <a:pPr marL="0" indent="0">
-              <a:buNone/>
-            </a:pPr>
-            <a:r>
-              <a:rPr lang="pt-BR" dirty="0"/>
-              <a:t>// Aqui é uma matriz que mostra a imaginação do Agente, o que o Agente tem de interpretação do</a:t>
-            </a:r>
-          </a:p>
-          <a:p>
-            <a:pPr marL="0" indent="0">
-              <a:buNone/>
-            </a:pPr>
-            <a:r>
-              <a:rPr lang="pt-BR" dirty="0"/>
-              <a:t>// cenário sobre a localização do </a:t>
-            </a:r>
-            <a:r>
-              <a:rPr lang="pt-BR" dirty="0" err="1"/>
-              <a:t>Wumpus</a:t>
-            </a:r>
-            <a:r>
-              <a:rPr lang="pt-BR" dirty="0"/>
-              <a:t> está aqui!</a:t>
+            <a:endParaRPr lang="pt-BR" dirty="0" smtClean="0"/>
+          </a:p>
+          <a:p>
+            <a:r>
+              <a:rPr lang="pt-BR" dirty="0" smtClean="0"/>
+              <a:t>A função start busca comparar sempre as áreas seguras, com as áreas visitadas e as áreas possíveis de movimentação.</a:t>
             </a:r>
           </a:p>
           <a:p>
             <a:endParaRPr lang="pt-BR" dirty="0"/>
           </a:p>
           <a:p>
-            <a:pPr marL="0" indent="0">
-              <a:buNone/>
-            </a:pPr>
-            <a:r>
-              <a:rPr lang="en-US" b="1" dirty="0"/>
-              <a:t>static char </a:t>
-            </a:r>
-            <a:r>
-              <a:rPr lang="en-US" b="1" i="1" dirty="0" err="1"/>
-              <a:t>imaginacaoPocos</a:t>
-            </a:r>
-            <a:r>
-              <a:rPr lang="en-US" b="1" i="1" dirty="0"/>
-              <a:t>[][] = new char[4][4];</a:t>
-            </a:r>
-          </a:p>
-          <a:p>
-            <a:pPr marL="0" indent="0">
-              <a:buNone/>
-            </a:pPr>
-            <a:r>
-              <a:rPr lang="pt-BR" dirty="0"/>
-              <a:t>// Aqui é uma matriz que mostra a imaginação do Agente, o que o Agente tem de interpretação do</a:t>
-            </a:r>
-          </a:p>
-          <a:p>
-            <a:pPr marL="0" indent="0">
-              <a:buNone/>
-            </a:pPr>
-            <a:r>
-              <a:rPr lang="pt-BR" dirty="0"/>
-              <a:t>// cenário sobre a localização dos poços está aqui!</a:t>
-            </a:r>
+            <a:r>
+              <a:rPr lang="pt-BR" dirty="0" smtClean="0"/>
+              <a:t>Se há uma área segura, que ainda não foi visitada, e que é uma área possível de movimentação, então o movimento é realizado.</a:t>
+            </a:r>
+          </a:p>
+          <a:p>
+            <a:endParaRPr lang="pt-BR" dirty="0"/>
+          </a:p>
+          <a:p>
+            <a:r>
+              <a:rPr lang="pt-BR" dirty="0" smtClean="0"/>
+              <a:t>Neste momento, o guerreiro fala: </a:t>
+            </a:r>
+            <a:r>
+              <a:rPr lang="pt-BR" b="1" i="1" dirty="0"/>
+              <a:t>Estou me movimentando para uma área que sei que é segura.</a:t>
+            </a:r>
+            <a:endParaRPr lang="pt-BR" b="1" i="1" dirty="0"/>
           </a:p>
         </p:txBody>
       </p:sp>
     </p:spTree>
     <p:extLst>
       <p:ext uri="{BB962C8B-B14F-4D97-AF65-F5344CB8AC3E}">
-        <p14:creationId xmlns:p14="http://schemas.microsoft.com/office/powerpoint/2010/main" val="581382581"/>
+        <p14:creationId xmlns:p14="http://schemas.microsoft.com/office/powerpoint/2010/main" val="4286639439"/>
       </p:ext>
     </p:extLst>
   </p:cSld>
@@ -9526,7 +9621,7 @@
           <a:p>
             <a:r>
               <a:rPr lang="pt-BR" dirty="0" smtClean="0"/>
-              <a:t>Estruturas auxiliares</a:t>
+              <a:t>Funções de Execução</a:t>
             </a:r>
             <a:endParaRPr lang="pt-BR" dirty="0"/>
           </a:p>
@@ -9544,201 +9639,72 @@
         </p:nvSpPr>
         <p:spPr/>
         <p:txBody>
-          <a:bodyPr>
-            <a:normAutofit fontScale="85000" lnSpcReduction="20000"/>
-          </a:bodyPr>
+          <a:bodyPr/>
           <a:lstStyle/>
           <a:p>
-            <a:pPr marL="0" indent="0">
-              <a:buNone/>
-            </a:pPr>
-            <a:r>
-              <a:rPr lang="en-US" b="1" dirty="0"/>
-              <a:t>static </a:t>
-            </a:r>
-            <a:r>
-              <a:rPr lang="en-US" b="1" dirty="0" err="1"/>
-              <a:t>ArrayList</a:t>
-            </a:r>
-            <a:r>
-              <a:rPr lang="en-US" b="1" dirty="0"/>
-              <a:t>&lt;Position&gt; </a:t>
-            </a:r>
-            <a:r>
-              <a:rPr lang="en-US" b="1" i="1" dirty="0" err="1"/>
-              <a:t>areas_visitadas</a:t>
-            </a:r>
-            <a:r>
-              <a:rPr lang="en-US" b="1" i="1" dirty="0"/>
-              <a:t> = new </a:t>
-            </a:r>
-            <a:r>
-              <a:rPr lang="en-US" b="1" i="1" dirty="0" err="1"/>
-              <a:t>ArrayList</a:t>
-            </a:r>
-            <a:r>
-              <a:rPr lang="en-US" b="1" i="1" dirty="0"/>
-              <a:t>&lt;Position&gt;();</a:t>
-            </a:r>
-          </a:p>
-          <a:p>
-            <a:pPr marL="0" indent="0">
-              <a:buNone/>
-            </a:pPr>
-            <a:r>
-              <a:rPr lang="pt-BR" dirty="0"/>
-              <a:t>// Aqui são armazenadas as áreas já visitadas pelo agente.</a:t>
+            <a:endParaRPr lang="pt-BR" dirty="0" smtClean="0"/>
+          </a:p>
+          <a:p>
+            <a:r>
+              <a:rPr lang="pt-BR" dirty="0" smtClean="0"/>
+              <a:t>Entretanto, se as áreas seguras todas já foram visitadas, não resta mais nada para o agente a não ser sortear a sua próxima jogada.</a:t>
             </a:r>
           </a:p>
           <a:p>
             <a:endParaRPr lang="pt-BR" dirty="0"/>
           </a:p>
           <a:p>
-            <a:pPr marL="0" indent="0">
-              <a:buNone/>
-            </a:pPr>
-            <a:r>
-              <a:rPr lang="en-US" b="1" dirty="0"/>
-              <a:t>static </a:t>
-            </a:r>
-            <a:r>
-              <a:rPr lang="en-US" b="1" dirty="0" err="1"/>
-              <a:t>ArrayList</a:t>
-            </a:r>
-            <a:r>
-              <a:rPr lang="en-US" b="1" dirty="0"/>
-              <a:t>&lt;Position&gt; </a:t>
-            </a:r>
-            <a:r>
-              <a:rPr lang="en-US" b="1" i="1" dirty="0" err="1"/>
-              <a:t>areas_perigosas</a:t>
-            </a:r>
-            <a:r>
-              <a:rPr lang="en-US" b="1" i="1" dirty="0"/>
-              <a:t> = new </a:t>
-            </a:r>
-            <a:r>
-              <a:rPr lang="en-US" b="1" i="1" dirty="0" err="1"/>
-              <a:t>ArrayList</a:t>
-            </a:r>
-            <a:r>
-              <a:rPr lang="en-US" b="1" i="1" dirty="0"/>
-              <a:t>&lt;Position&gt;();</a:t>
-            </a:r>
-          </a:p>
-          <a:p>
-            <a:pPr marL="0" indent="0">
-              <a:buNone/>
-            </a:pPr>
-            <a:r>
-              <a:rPr lang="pt-BR" dirty="0"/>
-              <a:t>// Aqui são armazenadas áreas perigosas descobertas pelo agente.</a:t>
-            </a:r>
-          </a:p>
-          <a:p>
+            <a:r>
+              <a:rPr lang="pt-BR" dirty="0" smtClean="0"/>
+              <a:t>Neste momento, o guerreiro fala:</a:t>
+            </a:r>
+            <a:r>
+              <a:rPr lang="pt-BR" b="1" i="1" dirty="0" smtClean="0"/>
+              <a:t> </a:t>
+            </a:r>
+            <a:r>
+              <a:rPr lang="pt-BR" b="1" i="1" dirty="0"/>
+              <a:t>Neste momento não sei para onde ir</a:t>
+            </a:r>
+            <a:r>
+              <a:rPr lang="pt-BR" b="1" i="1" dirty="0" smtClean="0"/>
+              <a:t>! </a:t>
+            </a:r>
+            <a:r>
+              <a:rPr lang="pt-BR" b="1" i="1" dirty="0"/>
+              <a:t>Vou escolher ao acaso. Então me deseja sorte</a:t>
+            </a:r>
+            <a:r>
+              <a:rPr lang="pt-BR" b="1" i="1" dirty="0" smtClean="0"/>
+              <a:t>.</a:t>
+            </a:r>
+            <a:endParaRPr lang="pt-BR" dirty="0" smtClean="0"/>
+          </a:p>
+          <a:p>
+            <a:endParaRPr lang="pt-BR" b="1" i="1" dirty="0"/>
+          </a:p>
+          <a:p>
+            <a:pPr algn="just"/>
+            <a:r>
+              <a:rPr lang="pt-BR" dirty="0" smtClean="0"/>
+              <a:t>A próxima jogada é sorteada de forma completamente aleatória usando os recursos da classe </a:t>
+            </a:r>
+            <a:r>
+              <a:rPr lang="pt-BR" dirty="0" err="1" smtClean="0"/>
+              <a:t>Random</a:t>
+            </a:r>
+            <a:r>
+              <a:rPr lang="pt-BR" dirty="0" smtClean="0"/>
+              <a:t> da linguagem Java.</a:t>
+            </a:r>
             <a:endParaRPr lang="pt-BR" dirty="0"/>
-          </a:p>
-          <a:p>
-            <a:pPr marL="0" indent="0">
-              <a:buNone/>
-            </a:pPr>
-            <a:r>
-              <a:rPr lang="en-US" b="1" dirty="0"/>
-              <a:t>static </a:t>
-            </a:r>
-            <a:r>
-              <a:rPr lang="en-US" b="1" dirty="0" err="1"/>
-              <a:t>ArrayList</a:t>
-            </a:r>
-            <a:r>
-              <a:rPr lang="en-US" b="1" dirty="0"/>
-              <a:t>&lt;Position&gt; </a:t>
-            </a:r>
-            <a:r>
-              <a:rPr lang="en-US" b="1" i="1" dirty="0" err="1"/>
-              <a:t>areas_seguras</a:t>
-            </a:r>
-            <a:r>
-              <a:rPr lang="en-US" b="1" i="1" dirty="0"/>
-              <a:t> = new </a:t>
-            </a:r>
-            <a:r>
-              <a:rPr lang="en-US" b="1" i="1" dirty="0" err="1"/>
-              <a:t>ArrayList</a:t>
-            </a:r>
-            <a:r>
-              <a:rPr lang="en-US" b="1" i="1" dirty="0"/>
-              <a:t>&lt;Position&gt;();</a:t>
-            </a:r>
-          </a:p>
-          <a:p>
-            <a:pPr marL="0" indent="0">
-              <a:buNone/>
-            </a:pPr>
-            <a:r>
-              <a:rPr lang="pt-BR" dirty="0"/>
-              <a:t>// Aqui ficam as áreas consideradas seguras para o agente.</a:t>
-            </a:r>
-          </a:p>
-          <a:p>
-            <a:endParaRPr lang="pt-BR" dirty="0"/>
-          </a:p>
-          <a:p>
-            <a:pPr marL="0" indent="0">
-              <a:buNone/>
-            </a:pPr>
-            <a:r>
-              <a:rPr lang="en-US" b="1" dirty="0"/>
-              <a:t>static </a:t>
-            </a:r>
-            <a:r>
-              <a:rPr lang="en-US" b="1" dirty="0" err="1"/>
-              <a:t>ArrayList</a:t>
-            </a:r>
-            <a:r>
-              <a:rPr lang="en-US" b="1" dirty="0"/>
-              <a:t>&lt;Position&gt; </a:t>
-            </a:r>
-            <a:r>
-              <a:rPr lang="en-US" b="1" i="1" dirty="0" err="1"/>
-              <a:t>areas_possiveis</a:t>
-            </a:r>
-            <a:r>
-              <a:rPr lang="en-US" b="1" i="1" dirty="0"/>
-              <a:t> = new </a:t>
-            </a:r>
-            <a:r>
-              <a:rPr lang="en-US" b="1" i="1" dirty="0" err="1"/>
-              <a:t>ArrayList</a:t>
-            </a:r>
-            <a:r>
-              <a:rPr lang="en-US" b="1" i="1" dirty="0"/>
-              <a:t>&lt;Position&gt;();</a:t>
-            </a:r>
-          </a:p>
-          <a:p>
-            <a:pPr marL="0" indent="0">
-              <a:buNone/>
-            </a:pPr>
-            <a:r>
-              <a:rPr lang="pt-BR" dirty="0"/>
-              <a:t>// Neste </a:t>
-            </a:r>
-            <a:r>
-              <a:rPr lang="pt-BR" dirty="0" err="1"/>
-              <a:t>array</a:t>
-            </a:r>
-            <a:r>
-              <a:rPr lang="pt-BR" dirty="0"/>
-              <a:t> ficam as possíveis jogadas ou movimentos do agente.</a:t>
-            </a:r>
           </a:p>
         </p:txBody>
       </p:sp>
     </p:spTree>
     <p:extLst>
       <p:ext uri="{BB962C8B-B14F-4D97-AF65-F5344CB8AC3E}">
-        <p14:creationId xmlns:p14="http://schemas.microsoft.com/office/powerpoint/2010/main" val="1698051050"/>
+        <p14:creationId xmlns:p14="http://schemas.microsoft.com/office/powerpoint/2010/main" val="3979793273"/>
       </p:ext>
     </p:extLst>
   </p:cSld>
@@ -9782,7 +9748,202 @@
           <a:p>
             <a:r>
               <a:rPr lang="pt-BR" dirty="0" smtClean="0"/>
-              <a:t>Funções de Execução</a:t>
+              <a:t>Estruturas auxiliares</a:t>
+            </a:r>
+            <a:endParaRPr lang="pt-BR" dirty="0"/>
+          </a:p>
+        </p:txBody>
+      </p:sp>
+      <p:sp>
+        <p:nvSpPr>
+          <p:cNvPr id="3" name="Espaço Reservado para Conteúdo 2"/>
+          <p:cNvSpPr>
+            <a:spLocks noGrp="1"/>
+          </p:cNvSpPr>
+          <p:nvPr>
+            <p:ph idx="1"/>
+          </p:nvPr>
+        </p:nvSpPr>
+        <p:spPr/>
+        <p:txBody>
+          <a:bodyPr>
+            <a:normAutofit lnSpcReduction="10000"/>
+          </a:bodyPr>
+          <a:lstStyle/>
+          <a:p>
+            <a:pPr marL="0" indent="0">
+              <a:buNone/>
+            </a:pPr>
+            <a:r>
+              <a:rPr lang="en-US" b="1" dirty="0"/>
+              <a:t>static char </a:t>
+            </a:r>
+            <a:r>
+              <a:rPr lang="en-US" b="1" i="1" dirty="0" err="1"/>
+              <a:t>imaginacaoWumpus</a:t>
+            </a:r>
+            <a:r>
+              <a:rPr lang="en-US" b="1" i="1" dirty="0"/>
+              <a:t>[][] = new char[4][4];</a:t>
+            </a:r>
+          </a:p>
+          <a:p>
+            <a:pPr marL="0" indent="0">
+              <a:buNone/>
+            </a:pPr>
+            <a:r>
+              <a:rPr lang="pt-BR" dirty="0"/>
+              <a:t>// Aqui é uma matriz que mostra a imaginação do Agente, o que o </a:t>
+            </a:r>
+            <a:endParaRPr lang="pt-BR" dirty="0" smtClean="0"/>
+          </a:p>
+          <a:p>
+            <a:pPr marL="0" indent="0">
+              <a:buNone/>
+            </a:pPr>
+            <a:r>
+              <a:rPr lang="pt-BR" dirty="0" smtClean="0"/>
+              <a:t>// </a:t>
+            </a:r>
+            <a:r>
+              <a:rPr lang="pt-BR" dirty="0" smtClean="0"/>
+              <a:t>Agente </a:t>
+            </a:r>
+            <a:r>
+              <a:rPr lang="pt-BR" dirty="0"/>
+              <a:t>tem de interpretação do</a:t>
+            </a:r>
+          </a:p>
+          <a:p>
+            <a:pPr marL="0" indent="0">
+              <a:buNone/>
+            </a:pPr>
+            <a:r>
+              <a:rPr lang="pt-BR" dirty="0"/>
+              <a:t>// cenário sobre a localização do </a:t>
+            </a:r>
+            <a:r>
+              <a:rPr lang="pt-BR" dirty="0" err="1"/>
+              <a:t>Wumpus</a:t>
+            </a:r>
+            <a:r>
+              <a:rPr lang="pt-BR" dirty="0"/>
+              <a:t> está aqui!</a:t>
+            </a:r>
+          </a:p>
+          <a:p>
+            <a:endParaRPr lang="pt-BR" dirty="0"/>
+          </a:p>
+          <a:p>
+            <a:pPr marL="0" indent="0">
+              <a:buNone/>
+            </a:pPr>
+            <a:r>
+              <a:rPr lang="en-US" b="1" dirty="0"/>
+              <a:t>static char </a:t>
+            </a:r>
+            <a:r>
+              <a:rPr lang="en-US" b="1" i="1" dirty="0" err="1"/>
+              <a:t>imaginacaoPocos</a:t>
+            </a:r>
+            <a:r>
+              <a:rPr lang="en-US" b="1" i="1" dirty="0"/>
+              <a:t>[][] = new char[4][4];</a:t>
+            </a:r>
+          </a:p>
+          <a:p>
+            <a:pPr marL="0" indent="0">
+              <a:buNone/>
+            </a:pPr>
+            <a:r>
+              <a:rPr lang="pt-BR" dirty="0"/>
+              <a:t>// Aqui é uma matriz que mostra a imaginação do Agente, o que o </a:t>
+            </a:r>
+            <a:endParaRPr lang="pt-BR" dirty="0" smtClean="0"/>
+          </a:p>
+          <a:p>
+            <a:pPr marL="0" indent="0">
+              <a:buNone/>
+            </a:pPr>
+            <a:r>
+              <a:rPr lang="pt-BR" dirty="0" smtClean="0"/>
+              <a:t>// </a:t>
+            </a:r>
+            <a:r>
+              <a:rPr lang="pt-BR" dirty="0" smtClean="0"/>
+              <a:t>Agente </a:t>
+            </a:r>
+            <a:r>
+              <a:rPr lang="pt-BR" dirty="0"/>
+              <a:t>tem de interpretação do</a:t>
+            </a:r>
+          </a:p>
+          <a:p>
+            <a:pPr marL="0" indent="0">
+              <a:buNone/>
+            </a:pPr>
+            <a:r>
+              <a:rPr lang="pt-BR" dirty="0"/>
+              <a:t>// cenário sobre a localização dos poços está aqui!</a:t>
+            </a:r>
+          </a:p>
+        </p:txBody>
+      </p:sp>
+    </p:spTree>
+    <p:extLst>
+      <p:ext uri="{BB962C8B-B14F-4D97-AF65-F5344CB8AC3E}">
+        <p14:creationId xmlns:p14="http://schemas.microsoft.com/office/powerpoint/2010/main" val="581382581"/>
+      </p:ext>
+    </p:extLst>
+  </p:cSld>
+  <p:clrMapOvr>
+    <a:masterClrMapping/>
+  </p:clrMapOvr>
+  <p:timing>
+    <p:tnLst>
+      <p:par>
+        <p:cTn id="1" dur="indefinite" restart="never" nodeType="tmRoot"/>
+      </p:par>
+    </p:tnLst>
+  </p:timing>
+</p:sld>
+</file>
+
+<file path=ppt/slides/slide13.xml><?xml version="1.0" encoding="utf-8"?>
+<p:sld xmlns:a="http://schemas.openxmlformats.org/drawingml/2006/main" xmlns:r="http://schemas.openxmlformats.org/officeDocument/2006/relationships" xmlns:p="http://schemas.openxmlformats.org/presentationml/2006/main">
+  <p:cSld>
+    <p:spTree>
+      <p:nvGrpSpPr>
+        <p:cNvPr id="1" name=""/>
+        <p:cNvGrpSpPr/>
+        <p:nvPr/>
+      </p:nvGrpSpPr>
+      <p:grpSpPr>
+        <a:xfrm>
+          <a:off x="0" y="0"/>
+          <a:ext cx="0" cy="0"/>
+          <a:chOff x="0" y="0"/>
+          <a:chExt cx="0" cy="0"/>
+        </a:xfrm>
+      </p:grpSpPr>
+      <p:sp>
+        <p:nvSpPr>
+          <p:cNvPr id="2" name="Título 1"/>
+          <p:cNvSpPr>
+            <a:spLocks noGrp="1"/>
+          </p:cNvSpPr>
+          <p:nvPr>
+            <p:ph type="title"/>
+          </p:nvPr>
+        </p:nvSpPr>
+        <p:spPr/>
+        <p:txBody>
+          <a:bodyPr/>
+          <a:lstStyle/>
+          <a:p>
+            <a:r>
+              <a:rPr lang="pt-BR" dirty="0" smtClean="0"/>
+              <a:t>Estruturas auxiliares</a:t>
             </a:r>
             <a:endParaRPr lang="pt-BR" dirty="0"/>
           </a:p>
@@ -9806,6 +9967,631 @@
             <a:endParaRPr lang="pt-BR" dirty="0" smtClean="0"/>
           </a:p>
           <a:p>
+            <a:pPr algn="just"/>
+            <a:r>
+              <a:rPr lang="pt-BR" dirty="0" smtClean="0"/>
+              <a:t>A lista </a:t>
+            </a:r>
+            <a:r>
+              <a:rPr lang="pt-BR" dirty="0" err="1" smtClean="0"/>
+              <a:t>imaginacaoWumpus</a:t>
+            </a:r>
+            <a:r>
+              <a:rPr lang="pt-BR" dirty="0" smtClean="0"/>
+              <a:t> corresponde a uma imaginação simulada virtualmente do agente sobre o </a:t>
+            </a:r>
+            <a:r>
+              <a:rPr lang="pt-BR" dirty="0" err="1" smtClean="0"/>
+              <a:t>Wumpus</a:t>
+            </a:r>
+            <a:r>
+              <a:rPr lang="pt-BR" dirty="0" smtClean="0"/>
+              <a:t>.</a:t>
+            </a:r>
+          </a:p>
+          <a:p>
+            <a:pPr algn="just"/>
+            <a:endParaRPr lang="pt-BR" dirty="0" smtClean="0"/>
+          </a:p>
+          <a:p>
+            <a:pPr algn="just"/>
+            <a:r>
+              <a:rPr lang="pt-BR" dirty="0" smtClean="0"/>
+              <a:t>A </a:t>
+            </a:r>
+            <a:r>
+              <a:rPr lang="pt-BR" dirty="0" err="1" smtClean="0"/>
+              <a:t>imaginacaoWumpus</a:t>
+            </a:r>
+            <a:r>
+              <a:rPr lang="pt-BR" dirty="0" smtClean="0"/>
+              <a:t> se beneficia das percepções do agente para tentar tirar a conclusão de onde está o </a:t>
+            </a:r>
+            <a:r>
+              <a:rPr lang="pt-BR" dirty="0" err="1" smtClean="0"/>
+              <a:t>Wumpus</a:t>
+            </a:r>
+            <a:r>
+              <a:rPr lang="pt-BR" dirty="0" smtClean="0"/>
+              <a:t>.</a:t>
+            </a:r>
+          </a:p>
+          <a:p>
+            <a:pPr algn="just"/>
+            <a:endParaRPr lang="pt-BR" dirty="0"/>
+          </a:p>
+          <a:p>
+            <a:pPr algn="just"/>
+            <a:r>
+              <a:rPr lang="pt-BR" dirty="0" smtClean="0"/>
+              <a:t>No momento de descoberta do </a:t>
+            </a:r>
+            <a:r>
+              <a:rPr lang="pt-BR" dirty="0" err="1" smtClean="0"/>
+              <a:t>Wumpus</a:t>
+            </a:r>
+            <a:r>
+              <a:rPr lang="pt-BR" dirty="0" smtClean="0"/>
+              <a:t>, o guerreiro (ou agente) ataca com a flecha.</a:t>
+            </a:r>
+            <a:endParaRPr lang="pt-BR" dirty="0"/>
+          </a:p>
+        </p:txBody>
+      </p:sp>
+    </p:spTree>
+    <p:extLst>
+      <p:ext uri="{BB962C8B-B14F-4D97-AF65-F5344CB8AC3E}">
+        <p14:creationId xmlns:p14="http://schemas.microsoft.com/office/powerpoint/2010/main" val="3185484214"/>
+      </p:ext>
+    </p:extLst>
+  </p:cSld>
+  <p:clrMapOvr>
+    <a:masterClrMapping/>
+  </p:clrMapOvr>
+</p:sld>
+</file>
+
+<file path=ppt/slides/slide14.xml><?xml version="1.0" encoding="utf-8"?>
+<p:sld xmlns:a="http://schemas.openxmlformats.org/drawingml/2006/main" xmlns:r="http://schemas.openxmlformats.org/officeDocument/2006/relationships" xmlns:p="http://schemas.openxmlformats.org/presentationml/2006/main">
+  <p:cSld>
+    <p:spTree>
+      <p:nvGrpSpPr>
+        <p:cNvPr id="1" name=""/>
+        <p:cNvGrpSpPr/>
+        <p:nvPr/>
+      </p:nvGrpSpPr>
+      <p:grpSpPr>
+        <a:xfrm>
+          <a:off x="0" y="0"/>
+          <a:ext cx="0" cy="0"/>
+          <a:chOff x="0" y="0"/>
+          <a:chExt cx="0" cy="0"/>
+        </a:xfrm>
+      </p:grpSpPr>
+      <p:sp>
+        <p:nvSpPr>
+          <p:cNvPr id="2" name="Título 1"/>
+          <p:cNvSpPr>
+            <a:spLocks noGrp="1"/>
+          </p:cNvSpPr>
+          <p:nvPr>
+            <p:ph type="title"/>
+          </p:nvPr>
+        </p:nvSpPr>
+        <p:spPr/>
+        <p:txBody>
+          <a:bodyPr/>
+          <a:lstStyle/>
+          <a:p>
+            <a:r>
+              <a:rPr lang="pt-BR" dirty="0" smtClean="0"/>
+              <a:t>Estruturas auxiliares</a:t>
+            </a:r>
+            <a:endParaRPr lang="pt-BR" dirty="0"/>
+          </a:p>
+        </p:txBody>
+      </p:sp>
+      <p:sp>
+        <p:nvSpPr>
+          <p:cNvPr id="3" name="Espaço Reservado para Conteúdo 2"/>
+          <p:cNvSpPr>
+            <a:spLocks noGrp="1"/>
+          </p:cNvSpPr>
+          <p:nvPr>
+            <p:ph idx="1"/>
+          </p:nvPr>
+        </p:nvSpPr>
+        <p:spPr/>
+        <p:txBody>
+          <a:bodyPr/>
+          <a:lstStyle/>
+          <a:p>
+            <a:endParaRPr lang="pt-BR" dirty="0" smtClean="0"/>
+          </a:p>
+          <a:p>
+            <a:r>
+              <a:rPr lang="pt-BR" dirty="0" smtClean="0"/>
+              <a:t>Já a lista </a:t>
+            </a:r>
+            <a:r>
+              <a:rPr lang="pt-BR" dirty="0" err="1" smtClean="0"/>
+              <a:t>imaginacaoPocos</a:t>
+            </a:r>
+            <a:r>
+              <a:rPr lang="pt-BR" dirty="0" smtClean="0"/>
+              <a:t> fica responsável por tentar identificar onde ficam os poços do cenário, a partir das percepções do agente.</a:t>
+            </a:r>
+          </a:p>
+          <a:p>
+            <a:endParaRPr lang="pt-BR" dirty="0"/>
+          </a:p>
+          <a:p>
+            <a:pPr algn="just"/>
+            <a:r>
+              <a:rPr lang="pt-BR" dirty="0" smtClean="0"/>
+              <a:t>Além desta identificação, essas áreas ficam sendo consideradas áreas perigosas, desta forma, o agente não pode visita-las, a não ser em casos excepcionais (quando não houver nenhuma possibilidade).</a:t>
+            </a:r>
+            <a:endParaRPr lang="pt-BR" dirty="0"/>
+          </a:p>
+        </p:txBody>
+      </p:sp>
+    </p:spTree>
+    <p:extLst>
+      <p:ext uri="{BB962C8B-B14F-4D97-AF65-F5344CB8AC3E}">
+        <p14:creationId xmlns:p14="http://schemas.microsoft.com/office/powerpoint/2010/main" val="830079334"/>
+      </p:ext>
+    </p:extLst>
+  </p:cSld>
+  <p:clrMapOvr>
+    <a:masterClrMapping/>
+  </p:clrMapOvr>
+</p:sld>
+</file>
+
+<file path=ppt/slides/slide15.xml><?xml version="1.0" encoding="utf-8"?>
+<p:sld xmlns:a="http://schemas.openxmlformats.org/drawingml/2006/main" xmlns:r="http://schemas.openxmlformats.org/officeDocument/2006/relationships" xmlns:p="http://schemas.openxmlformats.org/presentationml/2006/main">
+  <p:cSld>
+    <p:spTree>
+      <p:nvGrpSpPr>
+        <p:cNvPr id="1" name=""/>
+        <p:cNvGrpSpPr/>
+        <p:nvPr/>
+      </p:nvGrpSpPr>
+      <p:grpSpPr>
+        <a:xfrm>
+          <a:off x="0" y="0"/>
+          <a:ext cx="0" cy="0"/>
+          <a:chOff x="0" y="0"/>
+          <a:chExt cx="0" cy="0"/>
+        </a:xfrm>
+      </p:grpSpPr>
+      <p:sp>
+        <p:nvSpPr>
+          <p:cNvPr id="2" name="Título 1"/>
+          <p:cNvSpPr>
+            <a:spLocks noGrp="1"/>
+          </p:cNvSpPr>
+          <p:nvPr>
+            <p:ph type="title"/>
+          </p:nvPr>
+        </p:nvSpPr>
+        <p:spPr/>
+        <p:txBody>
+          <a:bodyPr/>
+          <a:lstStyle/>
+          <a:p>
+            <a:r>
+              <a:rPr lang="pt-BR" dirty="0" smtClean="0"/>
+              <a:t>Estruturas auxiliares</a:t>
+            </a:r>
+            <a:endParaRPr lang="pt-BR" dirty="0"/>
+          </a:p>
+        </p:txBody>
+      </p:sp>
+      <p:sp>
+        <p:nvSpPr>
+          <p:cNvPr id="3" name="Espaço Reservado para Conteúdo 2"/>
+          <p:cNvSpPr>
+            <a:spLocks noGrp="1"/>
+          </p:cNvSpPr>
+          <p:nvPr>
+            <p:ph idx="1"/>
+          </p:nvPr>
+        </p:nvSpPr>
+        <p:spPr/>
+        <p:txBody>
+          <a:bodyPr>
+            <a:normAutofit fontScale="85000" lnSpcReduction="20000"/>
+          </a:bodyPr>
+          <a:lstStyle/>
+          <a:p>
+            <a:pPr marL="0" indent="0">
+              <a:buNone/>
+            </a:pPr>
+            <a:r>
+              <a:rPr lang="en-US" b="1" dirty="0"/>
+              <a:t>static </a:t>
+            </a:r>
+            <a:r>
+              <a:rPr lang="en-US" b="1" dirty="0" err="1"/>
+              <a:t>ArrayList</a:t>
+            </a:r>
+            <a:r>
+              <a:rPr lang="en-US" b="1" dirty="0"/>
+              <a:t>&lt;Position&gt; </a:t>
+            </a:r>
+            <a:r>
+              <a:rPr lang="en-US" b="1" i="1" dirty="0" err="1"/>
+              <a:t>areas_visitadas</a:t>
+            </a:r>
+            <a:r>
+              <a:rPr lang="en-US" b="1" i="1" dirty="0"/>
+              <a:t> = new </a:t>
+            </a:r>
+            <a:r>
+              <a:rPr lang="en-US" b="1" i="1" dirty="0" err="1"/>
+              <a:t>ArrayList</a:t>
+            </a:r>
+            <a:r>
+              <a:rPr lang="en-US" b="1" i="1" dirty="0"/>
+              <a:t>&lt;Position&gt;();</a:t>
+            </a:r>
+          </a:p>
+          <a:p>
+            <a:pPr marL="0" indent="0">
+              <a:buNone/>
+            </a:pPr>
+            <a:r>
+              <a:rPr lang="pt-BR" dirty="0"/>
+              <a:t>// Aqui são armazenadas as áreas já visitadas pelo agente.</a:t>
+            </a:r>
+          </a:p>
+          <a:p>
+            <a:endParaRPr lang="pt-BR" dirty="0"/>
+          </a:p>
+          <a:p>
+            <a:pPr marL="0" indent="0">
+              <a:buNone/>
+            </a:pPr>
+            <a:r>
+              <a:rPr lang="en-US" b="1" dirty="0"/>
+              <a:t>static </a:t>
+            </a:r>
+            <a:r>
+              <a:rPr lang="en-US" b="1" dirty="0" err="1"/>
+              <a:t>ArrayList</a:t>
+            </a:r>
+            <a:r>
+              <a:rPr lang="en-US" b="1" dirty="0"/>
+              <a:t>&lt;Position&gt; </a:t>
+            </a:r>
+            <a:r>
+              <a:rPr lang="en-US" b="1" i="1" dirty="0" err="1"/>
+              <a:t>areas_perigosas</a:t>
+            </a:r>
+            <a:r>
+              <a:rPr lang="en-US" b="1" i="1" dirty="0"/>
+              <a:t> = new </a:t>
+            </a:r>
+            <a:r>
+              <a:rPr lang="en-US" b="1" i="1" dirty="0" err="1"/>
+              <a:t>ArrayList</a:t>
+            </a:r>
+            <a:r>
+              <a:rPr lang="en-US" b="1" i="1" dirty="0"/>
+              <a:t>&lt;Position&gt;();</a:t>
+            </a:r>
+          </a:p>
+          <a:p>
+            <a:pPr marL="0" indent="0">
+              <a:buNone/>
+            </a:pPr>
+            <a:r>
+              <a:rPr lang="pt-BR" dirty="0"/>
+              <a:t>// Aqui são armazenadas áreas perigosas descobertas pelo agente.</a:t>
+            </a:r>
+          </a:p>
+          <a:p>
+            <a:endParaRPr lang="pt-BR" dirty="0"/>
+          </a:p>
+          <a:p>
+            <a:pPr marL="0" indent="0">
+              <a:buNone/>
+            </a:pPr>
+            <a:r>
+              <a:rPr lang="en-US" b="1" dirty="0"/>
+              <a:t>static </a:t>
+            </a:r>
+            <a:r>
+              <a:rPr lang="en-US" b="1" dirty="0" err="1"/>
+              <a:t>ArrayList</a:t>
+            </a:r>
+            <a:r>
+              <a:rPr lang="en-US" b="1" dirty="0"/>
+              <a:t>&lt;Position&gt; </a:t>
+            </a:r>
+            <a:r>
+              <a:rPr lang="en-US" b="1" i="1" dirty="0" err="1"/>
+              <a:t>areas_seguras</a:t>
+            </a:r>
+            <a:r>
+              <a:rPr lang="en-US" b="1" i="1" dirty="0"/>
+              <a:t> = new </a:t>
+            </a:r>
+            <a:r>
+              <a:rPr lang="en-US" b="1" i="1" dirty="0" err="1"/>
+              <a:t>ArrayList</a:t>
+            </a:r>
+            <a:r>
+              <a:rPr lang="en-US" b="1" i="1" dirty="0"/>
+              <a:t>&lt;Position&gt;();</a:t>
+            </a:r>
+          </a:p>
+          <a:p>
+            <a:pPr marL="0" indent="0">
+              <a:buNone/>
+            </a:pPr>
+            <a:r>
+              <a:rPr lang="pt-BR" dirty="0"/>
+              <a:t>// Aqui ficam as áreas consideradas seguras para o agente.</a:t>
+            </a:r>
+          </a:p>
+          <a:p>
+            <a:endParaRPr lang="pt-BR" dirty="0"/>
+          </a:p>
+          <a:p>
+            <a:pPr marL="0" indent="0">
+              <a:buNone/>
+            </a:pPr>
+            <a:r>
+              <a:rPr lang="en-US" b="1" dirty="0"/>
+              <a:t>static </a:t>
+            </a:r>
+            <a:r>
+              <a:rPr lang="en-US" b="1" dirty="0" err="1"/>
+              <a:t>ArrayList</a:t>
+            </a:r>
+            <a:r>
+              <a:rPr lang="en-US" b="1" dirty="0"/>
+              <a:t>&lt;Position&gt; </a:t>
+            </a:r>
+            <a:r>
+              <a:rPr lang="en-US" b="1" i="1" dirty="0" err="1"/>
+              <a:t>areas_possiveis</a:t>
+            </a:r>
+            <a:r>
+              <a:rPr lang="en-US" b="1" i="1" dirty="0"/>
+              <a:t> = new </a:t>
+            </a:r>
+            <a:r>
+              <a:rPr lang="en-US" b="1" i="1" dirty="0" err="1"/>
+              <a:t>ArrayList</a:t>
+            </a:r>
+            <a:r>
+              <a:rPr lang="en-US" b="1" i="1" dirty="0"/>
+              <a:t>&lt;Position&gt;();</a:t>
+            </a:r>
+          </a:p>
+          <a:p>
+            <a:pPr marL="0" indent="0">
+              <a:buNone/>
+            </a:pPr>
+            <a:r>
+              <a:rPr lang="pt-BR" dirty="0"/>
+              <a:t>// Neste </a:t>
+            </a:r>
+            <a:r>
+              <a:rPr lang="pt-BR" dirty="0" err="1"/>
+              <a:t>array</a:t>
+            </a:r>
+            <a:r>
+              <a:rPr lang="pt-BR" dirty="0"/>
+              <a:t> ficam as possíveis jogadas ou movimentos do agente.</a:t>
+            </a:r>
+          </a:p>
+        </p:txBody>
+      </p:sp>
+    </p:spTree>
+    <p:extLst>
+      <p:ext uri="{BB962C8B-B14F-4D97-AF65-F5344CB8AC3E}">
+        <p14:creationId xmlns:p14="http://schemas.microsoft.com/office/powerpoint/2010/main" val="1698051050"/>
+      </p:ext>
+    </p:extLst>
+  </p:cSld>
+  <p:clrMapOvr>
+    <a:masterClrMapping/>
+  </p:clrMapOvr>
+  <p:timing>
+    <p:tnLst>
+      <p:par>
+        <p:cTn id="1" dur="indefinite" restart="never" nodeType="tmRoot"/>
+      </p:par>
+    </p:tnLst>
+  </p:timing>
+</p:sld>
+</file>
+
+<file path=ppt/slides/slide16.xml><?xml version="1.0" encoding="utf-8"?>
+<p:sld xmlns:a="http://schemas.openxmlformats.org/drawingml/2006/main" xmlns:r="http://schemas.openxmlformats.org/officeDocument/2006/relationships" xmlns:p="http://schemas.openxmlformats.org/presentationml/2006/main">
+  <p:cSld>
+    <p:spTree>
+      <p:nvGrpSpPr>
+        <p:cNvPr id="1" name=""/>
+        <p:cNvGrpSpPr/>
+        <p:nvPr/>
+      </p:nvGrpSpPr>
+      <p:grpSpPr>
+        <a:xfrm>
+          <a:off x="0" y="0"/>
+          <a:ext cx="0" cy="0"/>
+          <a:chOff x="0" y="0"/>
+          <a:chExt cx="0" cy="0"/>
+        </a:xfrm>
+      </p:grpSpPr>
+      <p:sp>
+        <p:nvSpPr>
+          <p:cNvPr id="2" name="Título 1"/>
+          <p:cNvSpPr>
+            <a:spLocks noGrp="1"/>
+          </p:cNvSpPr>
+          <p:nvPr>
+            <p:ph type="title"/>
+          </p:nvPr>
+        </p:nvSpPr>
+        <p:spPr/>
+        <p:txBody>
+          <a:bodyPr/>
+          <a:lstStyle/>
+          <a:p>
+            <a:r>
+              <a:rPr lang="pt-BR" dirty="0" smtClean="0"/>
+              <a:t>Estruturas auxiliares</a:t>
+            </a:r>
+            <a:endParaRPr lang="pt-BR" dirty="0"/>
+          </a:p>
+        </p:txBody>
+      </p:sp>
+      <p:sp>
+        <p:nvSpPr>
+          <p:cNvPr id="3" name="Espaço Reservado para Conteúdo 2"/>
+          <p:cNvSpPr>
+            <a:spLocks noGrp="1"/>
+          </p:cNvSpPr>
+          <p:nvPr>
+            <p:ph idx="1"/>
+          </p:nvPr>
+        </p:nvSpPr>
+        <p:spPr/>
+        <p:txBody>
+          <a:bodyPr/>
+          <a:lstStyle/>
+          <a:p>
+            <a:r>
+              <a:rPr lang="pt-BR" dirty="0" smtClean="0"/>
+              <a:t>Situações que ocorre a criação de áreas perigosas:</a:t>
+            </a:r>
+          </a:p>
+          <a:p>
+            <a:endParaRPr lang="pt-BR" dirty="0"/>
+          </a:p>
+          <a:p>
+            <a:pPr lvl="2">
+              <a:buFont typeface="Wingdings" panose="05000000000000000000" pitchFamily="2" charset="2"/>
+              <a:buChar char="q"/>
+            </a:pPr>
+            <a:r>
+              <a:rPr lang="pt-BR" dirty="0" smtClean="0"/>
+              <a:t> Quando o guerreiro encontra um fedor;</a:t>
+            </a:r>
+          </a:p>
+          <a:p>
+            <a:pPr lvl="2">
+              <a:buFont typeface="Wingdings" panose="05000000000000000000" pitchFamily="2" charset="2"/>
+              <a:buChar char="q"/>
+            </a:pPr>
+            <a:r>
+              <a:rPr lang="pt-BR" dirty="0"/>
+              <a:t> </a:t>
+            </a:r>
+            <a:r>
+              <a:rPr lang="pt-BR" dirty="0" smtClean="0"/>
+              <a:t>Quando o guerreiro encontra uma brisa.</a:t>
+            </a:r>
+          </a:p>
+          <a:p>
+            <a:pPr marL="914400" lvl="2" indent="0">
+              <a:buNone/>
+            </a:pPr>
+            <a:endParaRPr lang="pt-BR" dirty="0" smtClean="0"/>
+          </a:p>
+          <a:p>
+            <a:pPr marL="0" lvl="2" indent="0" algn="just">
+              <a:buNone/>
+            </a:pPr>
+            <a:endParaRPr lang="pt-BR" sz="2800" dirty="0" smtClean="0"/>
+          </a:p>
+          <a:p>
+            <a:pPr marL="0" lvl="2" indent="0" algn="just">
+              <a:buNone/>
+            </a:pPr>
+            <a:r>
+              <a:rPr lang="pt-BR" sz="2800" dirty="0" smtClean="0"/>
+              <a:t>Nestas situações, o algoritmo cria áreas perigosas, ou melhor dizendo, áreas suspeitas de perigo em que o guerreiro não vai arriscar entrar nestas, a não ser que não exista qualquer outra possibilidade.</a:t>
+            </a:r>
+          </a:p>
+        </p:txBody>
+      </p:sp>
+    </p:spTree>
+    <p:extLst>
+      <p:ext uri="{BB962C8B-B14F-4D97-AF65-F5344CB8AC3E}">
+        <p14:creationId xmlns:p14="http://schemas.microsoft.com/office/powerpoint/2010/main" val="3128287076"/>
+      </p:ext>
+    </p:extLst>
+  </p:cSld>
+  <p:clrMapOvr>
+    <a:masterClrMapping/>
+  </p:clrMapOvr>
+</p:sld>
+</file>
+
+<file path=ppt/slides/slide17.xml><?xml version="1.0" encoding="utf-8"?>
+<p:sld xmlns:a="http://schemas.openxmlformats.org/drawingml/2006/main" xmlns:r="http://schemas.openxmlformats.org/officeDocument/2006/relationships" xmlns:p="http://schemas.openxmlformats.org/presentationml/2006/main">
+  <p:cSld>
+    <p:spTree>
+      <p:nvGrpSpPr>
+        <p:cNvPr id="1" name=""/>
+        <p:cNvGrpSpPr/>
+        <p:nvPr/>
+      </p:nvGrpSpPr>
+      <p:grpSpPr>
+        <a:xfrm>
+          <a:off x="0" y="0"/>
+          <a:ext cx="0" cy="0"/>
+          <a:chOff x="0" y="0"/>
+          <a:chExt cx="0" cy="0"/>
+        </a:xfrm>
+      </p:grpSpPr>
+      <p:sp>
+        <p:nvSpPr>
+          <p:cNvPr id="2" name="Título 1"/>
+          <p:cNvSpPr>
+            <a:spLocks noGrp="1"/>
+          </p:cNvSpPr>
+          <p:nvPr>
+            <p:ph type="title"/>
+          </p:nvPr>
+        </p:nvSpPr>
+        <p:spPr/>
+        <p:txBody>
+          <a:bodyPr/>
+          <a:lstStyle/>
+          <a:p>
+            <a:r>
+              <a:rPr lang="pt-BR" dirty="0" smtClean="0"/>
+              <a:t>Funções de Execução</a:t>
+            </a:r>
+            <a:endParaRPr lang="pt-BR" dirty="0"/>
+          </a:p>
+        </p:txBody>
+      </p:sp>
+      <p:sp>
+        <p:nvSpPr>
+          <p:cNvPr id="3" name="Espaço Reservado para Conteúdo 2"/>
+          <p:cNvSpPr>
+            <a:spLocks noGrp="1"/>
+          </p:cNvSpPr>
+          <p:nvPr>
+            <p:ph idx="1"/>
+          </p:nvPr>
+        </p:nvSpPr>
+        <p:spPr/>
+        <p:txBody>
+          <a:bodyPr/>
+          <a:lstStyle/>
+          <a:p>
+            <a:endParaRPr lang="pt-BR" dirty="0" smtClean="0"/>
+          </a:p>
+          <a:p>
             <a:pPr marL="0" indent="0" algn="just">
               <a:buNone/>
             </a:pPr>
@@ -9910,6 +10696,102 @@
   <p:clrMapOvr>
     <a:masterClrMapping/>
   </p:clrMapOvr>
+  <p:timing>
+    <p:tnLst>
+      <p:par>
+        <p:cTn id="1" dur="indefinite" restart="never" nodeType="tmRoot"/>
+      </p:par>
+    </p:tnLst>
+  </p:timing>
+</p:sld>
+</file>
+
+<file path=ppt/slides/slide18.xml><?xml version="1.0" encoding="utf-8"?>
+<p:sld xmlns:a="http://schemas.openxmlformats.org/drawingml/2006/main" xmlns:r="http://schemas.openxmlformats.org/officeDocument/2006/relationships" xmlns:p="http://schemas.openxmlformats.org/presentationml/2006/main">
+  <p:cSld>
+    <p:spTree>
+      <p:nvGrpSpPr>
+        <p:cNvPr id="1" name=""/>
+        <p:cNvGrpSpPr/>
+        <p:nvPr/>
+      </p:nvGrpSpPr>
+      <p:grpSpPr>
+        <a:xfrm>
+          <a:off x="0" y="0"/>
+          <a:ext cx="0" cy="0"/>
+          <a:chOff x="0" y="0"/>
+          <a:chExt cx="0" cy="0"/>
+        </a:xfrm>
+      </p:grpSpPr>
+      <p:sp>
+        <p:nvSpPr>
+          <p:cNvPr id="5" name="Título 4"/>
+          <p:cNvSpPr>
+            <a:spLocks noGrp="1"/>
+          </p:cNvSpPr>
+          <p:nvPr>
+            <p:ph type="title"/>
+          </p:nvPr>
+        </p:nvSpPr>
+        <p:spPr/>
+        <p:txBody>
+          <a:bodyPr/>
+          <a:lstStyle/>
+          <a:p>
+            <a:r>
+              <a:rPr lang="pt-BR" dirty="0" smtClean="0"/>
+              <a:t>Dúvidas?</a:t>
+            </a:r>
+            <a:endParaRPr lang="pt-BR" dirty="0"/>
+          </a:p>
+        </p:txBody>
+      </p:sp>
+      <p:pic>
+        <p:nvPicPr>
+          <p:cNvPr id="4" name="Espaço Reservado para Conteúdo 3"/>
+          <p:cNvPicPr>
+            <a:picLocks noGrp="1" noChangeAspect="1"/>
+          </p:cNvPicPr>
+          <p:nvPr>
+            <p:ph idx="1"/>
+          </p:nvPr>
+        </p:nvPicPr>
+        <p:blipFill>
+          <a:blip r:embed="rId2">
+            <a:extLst>
+              <a:ext uri="{28A0092B-C50C-407E-A947-70E740481C1C}">
+                <a14:useLocalDpi xmlns:a14="http://schemas.microsoft.com/office/drawing/2010/main" val="0"/>
+              </a:ext>
+            </a:extLst>
+          </a:blip>
+          <a:stretch>
+            <a:fillRect/>
+          </a:stretch>
+        </p:blipFill>
+        <p:spPr>
+          <a:xfrm>
+            <a:off x="3440028" y="1690688"/>
+            <a:ext cx="4970045" cy="4970045"/>
+          </a:xfrm>
+        </p:spPr>
+      </p:pic>
+    </p:spTree>
+    <p:extLst>
+      <p:ext uri="{BB962C8B-B14F-4D97-AF65-F5344CB8AC3E}">
+        <p14:creationId xmlns:p14="http://schemas.microsoft.com/office/powerpoint/2010/main" val="3948626471"/>
+      </p:ext>
+    </p:extLst>
+  </p:cSld>
+  <p:clrMapOvr>
+    <a:masterClrMapping/>
+  </p:clrMapOvr>
+  <p:timing>
+    <p:tnLst>
+      <p:par>
+        <p:cTn id="1" dur="indefinite" restart="never" nodeType="tmRoot"/>
+      </p:par>
+    </p:tnLst>
+  </p:timing>
 </p:sld>
 </file>
 
@@ -10050,6 +10932,13 @@
   <p:clrMapOvr>
     <a:masterClrMapping/>
   </p:clrMapOvr>
+  <p:timing>
+    <p:tnLst>
+      <p:par>
+        <p:cTn id="1" dur="indefinite" restart="never" nodeType="tmRoot"/>
+      </p:par>
+    </p:tnLst>
+  </p:timing>
 </p:sld>
 </file>
 
@@ -10202,6 +11091,13 @@
   <p:clrMapOvr>
     <a:masterClrMapping/>
   </p:clrMapOvr>
+  <p:timing>
+    <p:tnLst>
+      <p:par>
+        <p:cTn id="1" dur="indefinite" restart="never" nodeType="tmRoot"/>
+      </p:par>
+    </p:tnLst>
+  </p:timing>
 </p:sld>
 </file>
 
@@ -10298,6 +11194,13 @@
   <p:clrMapOvr>
     <a:masterClrMapping/>
   </p:clrMapOvr>
+  <p:timing>
+    <p:tnLst>
+      <p:par>
+        <p:cTn id="1" dur="indefinite" restart="never" nodeType="tmRoot"/>
+      </p:par>
+    </p:tnLst>
+  </p:timing>
 </p:sld>
 </file>
 
@@ -11066,6 +11969,13 @@
   <p:clrMapOvr>
     <a:masterClrMapping/>
   </p:clrMapOvr>
+  <p:timing>
+    <p:tnLst>
+      <p:par>
+        <p:cTn id="1" dur="indefinite" restart="never" nodeType="tmRoot"/>
+      </p:par>
+    </p:tnLst>
+  </p:timing>
 </p:sld>
 </file>
 
@@ -11281,6 +12191,13 @@
   <p:clrMapOvr>
     <a:masterClrMapping/>
   </p:clrMapOvr>
+  <p:timing>
+    <p:tnLst>
+      <p:par>
+        <p:cTn id="1" dur="indefinite" restart="never" nodeType="tmRoot"/>
+      </p:par>
+    </p:tnLst>
+  </p:timing>
 </p:sld>
 </file>
 

</xml_diff>

<commit_message>
More updates in the presentation
</commit_message>
<xml_diff>
--- a/Mundo do Wumpus.pptx
+++ b/Mundo do Wumpus.pptx
@@ -4,6 +4,9 @@
   <p:sldMasterIdLst>
     <p:sldMasterId id="2147483648" r:id="rId1"/>
   </p:sldMasterIdLst>
+  <p:notesMasterIdLst>
+    <p:notesMasterId r:id="rId20"/>
+  </p:notesMasterIdLst>
   <p:sldIdLst>
     <p:sldId id="256" r:id="rId2"/>
     <p:sldId id="257" r:id="rId3"/>
@@ -6459,6 +6462,440 @@
 </dgm:styleDef>
 </file>
 
+<file path=ppt/notesMasters/notesMaster1.xml><?xml version="1.0" encoding="utf-8"?>
+<p:notesMaster xmlns:a="http://schemas.openxmlformats.org/drawingml/2006/main" xmlns:r="http://schemas.openxmlformats.org/officeDocument/2006/relationships" xmlns:p="http://schemas.openxmlformats.org/presentationml/2006/main">
+  <p:cSld>
+    <p:bg>
+      <p:bgRef idx="1001">
+        <a:schemeClr val="bg1"/>
+      </p:bgRef>
+    </p:bg>
+    <p:spTree>
+      <p:nvGrpSpPr>
+        <p:cNvPr id="1" name=""/>
+        <p:cNvGrpSpPr/>
+        <p:nvPr/>
+      </p:nvGrpSpPr>
+      <p:grpSpPr>
+        <a:xfrm>
+          <a:off x="0" y="0"/>
+          <a:ext cx="0" cy="0"/>
+          <a:chOff x="0" y="0"/>
+          <a:chExt cx="0" cy="0"/>
+        </a:xfrm>
+      </p:grpSpPr>
+      <p:sp>
+        <p:nvSpPr>
+          <p:cNvPr id="2" name="Espaço Reservado para Cabeçalho 1"/>
+          <p:cNvSpPr>
+            <a:spLocks noGrp="1"/>
+          </p:cNvSpPr>
+          <p:nvPr>
+            <p:ph type="hdr" sz="quarter"/>
+          </p:nvPr>
+        </p:nvSpPr>
+        <p:spPr>
+          <a:xfrm>
+            <a:off x="0" y="0"/>
+            <a:ext cx="2971800" cy="458788"/>
+          </a:xfrm>
+          <a:prstGeom prst="rect">
+            <a:avLst/>
+          </a:prstGeom>
+        </p:spPr>
+        <p:txBody>
+          <a:bodyPr vert="horz" lIns="91440" tIns="45720" rIns="91440" bIns="45720" rtlCol="0"/>
+          <a:lstStyle>
+            <a:lvl1pPr algn="l">
+              <a:defRPr sz="1200"/>
+            </a:lvl1pPr>
+          </a:lstStyle>
+          <a:p>
+            <a:endParaRPr lang="pt-BR"/>
+          </a:p>
+        </p:txBody>
+      </p:sp>
+      <p:sp>
+        <p:nvSpPr>
+          <p:cNvPr id="3" name="Espaço Reservado para Data 2"/>
+          <p:cNvSpPr>
+            <a:spLocks noGrp="1"/>
+          </p:cNvSpPr>
+          <p:nvPr>
+            <p:ph type="dt" idx="1"/>
+          </p:nvPr>
+        </p:nvSpPr>
+        <p:spPr>
+          <a:xfrm>
+            <a:off x="3884613" y="0"/>
+            <a:ext cx="2971800" cy="458788"/>
+          </a:xfrm>
+          <a:prstGeom prst="rect">
+            <a:avLst/>
+          </a:prstGeom>
+        </p:spPr>
+        <p:txBody>
+          <a:bodyPr vert="horz" lIns="91440" tIns="45720" rIns="91440" bIns="45720" rtlCol="0"/>
+          <a:lstStyle>
+            <a:lvl1pPr algn="r">
+              <a:defRPr sz="1200"/>
+            </a:lvl1pPr>
+          </a:lstStyle>
+          <a:p>
+            <a:fld id="{A9D60E8B-9A90-4006-A905-9BFFC413621B}" type="datetimeFigureOut">
+              <a:rPr lang="pt-BR" smtClean="0"/>
+              <a:t>04/01/2017</a:t>
+            </a:fld>
+            <a:endParaRPr lang="pt-BR"/>
+          </a:p>
+        </p:txBody>
+      </p:sp>
+      <p:sp>
+        <p:nvSpPr>
+          <p:cNvPr id="4" name="Espaço Reservado para Imagem de Slide 3"/>
+          <p:cNvSpPr>
+            <a:spLocks noGrp="1" noRot="1" noChangeAspect="1"/>
+          </p:cNvSpPr>
+          <p:nvPr>
+            <p:ph type="sldImg" idx="2"/>
+          </p:nvPr>
+        </p:nvSpPr>
+        <p:spPr>
+          <a:xfrm>
+            <a:off x="685800" y="1143000"/>
+            <a:ext cx="5486400" cy="3086100"/>
+          </a:xfrm>
+          <a:prstGeom prst="rect">
+            <a:avLst/>
+          </a:prstGeom>
+          <a:noFill/>
+          <a:ln w="12700">
+            <a:solidFill>
+              <a:prstClr val="black"/>
+            </a:solidFill>
+          </a:ln>
+        </p:spPr>
+        <p:txBody>
+          <a:bodyPr vert="horz" lIns="91440" tIns="45720" rIns="91440" bIns="45720" rtlCol="0" anchor="ctr"/>
+          <a:lstStyle/>
+          <a:p>
+            <a:endParaRPr lang="pt-BR"/>
+          </a:p>
+        </p:txBody>
+      </p:sp>
+      <p:sp>
+        <p:nvSpPr>
+          <p:cNvPr id="5" name="Espaço Reservado para Anotações 4"/>
+          <p:cNvSpPr>
+            <a:spLocks noGrp="1"/>
+          </p:cNvSpPr>
+          <p:nvPr>
+            <p:ph type="body" sz="quarter" idx="3"/>
+          </p:nvPr>
+        </p:nvSpPr>
+        <p:spPr>
+          <a:xfrm>
+            <a:off x="685800" y="4400550"/>
+            <a:ext cx="5486400" cy="3600450"/>
+          </a:xfrm>
+          <a:prstGeom prst="rect">
+            <a:avLst/>
+          </a:prstGeom>
+        </p:spPr>
+        <p:txBody>
+          <a:bodyPr vert="horz" lIns="91440" tIns="45720" rIns="91440" bIns="45720" rtlCol="0"/>
+          <a:lstStyle/>
+          <a:p>
+            <a:pPr lvl="0"/>
+            <a:r>
+              <a:rPr lang="pt-BR" smtClean="0"/>
+              <a:t>Clique para editar o texto mestre</a:t>
+            </a:r>
+          </a:p>
+          <a:p>
+            <a:pPr lvl="1"/>
+            <a:r>
+              <a:rPr lang="pt-BR" smtClean="0"/>
+              <a:t>Segundo nível</a:t>
+            </a:r>
+          </a:p>
+          <a:p>
+            <a:pPr lvl="2"/>
+            <a:r>
+              <a:rPr lang="pt-BR" smtClean="0"/>
+              <a:t>Terceiro nível</a:t>
+            </a:r>
+          </a:p>
+          <a:p>
+            <a:pPr lvl="3"/>
+            <a:r>
+              <a:rPr lang="pt-BR" smtClean="0"/>
+              <a:t>Quarto nível</a:t>
+            </a:r>
+          </a:p>
+          <a:p>
+            <a:pPr lvl="4"/>
+            <a:r>
+              <a:rPr lang="pt-BR" smtClean="0"/>
+              <a:t>Quinto nível</a:t>
+            </a:r>
+            <a:endParaRPr lang="pt-BR"/>
+          </a:p>
+        </p:txBody>
+      </p:sp>
+      <p:sp>
+        <p:nvSpPr>
+          <p:cNvPr id="6" name="Espaço Reservado para Rodapé 5"/>
+          <p:cNvSpPr>
+            <a:spLocks noGrp="1"/>
+          </p:cNvSpPr>
+          <p:nvPr>
+            <p:ph type="ftr" sz="quarter" idx="4"/>
+          </p:nvPr>
+        </p:nvSpPr>
+        <p:spPr>
+          <a:xfrm>
+            <a:off x="0" y="8685213"/>
+            <a:ext cx="2971800" cy="458787"/>
+          </a:xfrm>
+          <a:prstGeom prst="rect">
+            <a:avLst/>
+          </a:prstGeom>
+        </p:spPr>
+        <p:txBody>
+          <a:bodyPr vert="horz" lIns="91440" tIns="45720" rIns="91440" bIns="45720" rtlCol="0" anchor="b"/>
+          <a:lstStyle>
+            <a:lvl1pPr algn="l">
+              <a:defRPr sz="1200"/>
+            </a:lvl1pPr>
+          </a:lstStyle>
+          <a:p>
+            <a:endParaRPr lang="pt-BR"/>
+          </a:p>
+        </p:txBody>
+      </p:sp>
+      <p:sp>
+        <p:nvSpPr>
+          <p:cNvPr id="7" name="Espaço Reservado para Número de Slide 6"/>
+          <p:cNvSpPr>
+            <a:spLocks noGrp="1"/>
+          </p:cNvSpPr>
+          <p:nvPr>
+            <p:ph type="sldNum" sz="quarter" idx="5"/>
+          </p:nvPr>
+        </p:nvSpPr>
+        <p:spPr>
+          <a:xfrm>
+            <a:off x="3884613" y="8685213"/>
+            <a:ext cx="2971800" cy="458787"/>
+          </a:xfrm>
+          <a:prstGeom prst="rect">
+            <a:avLst/>
+          </a:prstGeom>
+        </p:spPr>
+        <p:txBody>
+          <a:bodyPr vert="horz" lIns="91440" tIns="45720" rIns="91440" bIns="45720" rtlCol="0" anchor="b"/>
+          <a:lstStyle>
+            <a:lvl1pPr algn="r">
+              <a:defRPr sz="1200"/>
+            </a:lvl1pPr>
+          </a:lstStyle>
+          <a:p>
+            <a:fld id="{6E7D9F6C-46C6-466E-BD8C-E525EAE5D2D0}" type="slidenum">
+              <a:rPr lang="pt-BR" smtClean="0"/>
+              <a:t>‹nº›</a:t>
+            </a:fld>
+            <a:endParaRPr lang="pt-BR"/>
+          </a:p>
+        </p:txBody>
+      </p:sp>
+    </p:spTree>
+    <p:extLst>
+      <p:ext uri="{BB962C8B-B14F-4D97-AF65-F5344CB8AC3E}">
+        <p14:creationId xmlns:p14="http://schemas.microsoft.com/office/powerpoint/2010/main" val="4215352319"/>
+      </p:ext>
+    </p:extLst>
+  </p:cSld>
+  <p:clrMap bg1="lt1" tx1="dk1" bg2="lt2" tx2="dk2" accent1="accent1" accent2="accent2" accent3="accent3" accent4="accent4" accent5="accent5" accent6="accent6" hlink="hlink" folHlink="folHlink"/>
+  <p:notesStyle>
+    <a:lvl1pPr marL="0" algn="l" defTabSz="914400" rtl="0" eaLnBrk="1" latinLnBrk="0" hangingPunct="1">
+      <a:defRPr sz="1200" kern="1200">
+        <a:solidFill>
+          <a:schemeClr val="tx1"/>
+        </a:solidFill>
+        <a:latin typeface="+mn-lt"/>
+        <a:ea typeface="+mn-ea"/>
+        <a:cs typeface="+mn-cs"/>
+      </a:defRPr>
+    </a:lvl1pPr>
+    <a:lvl2pPr marL="457200" algn="l" defTabSz="914400" rtl="0" eaLnBrk="1" latinLnBrk="0" hangingPunct="1">
+      <a:defRPr sz="1200" kern="1200">
+        <a:solidFill>
+          <a:schemeClr val="tx1"/>
+        </a:solidFill>
+        <a:latin typeface="+mn-lt"/>
+        <a:ea typeface="+mn-ea"/>
+        <a:cs typeface="+mn-cs"/>
+      </a:defRPr>
+    </a:lvl2pPr>
+    <a:lvl3pPr marL="914400" algn="l" defTabSz="914400" rtl="0" eaLnBrk="1" latinLnBrk="0" hangingPunct="1">
+      <a:defRPr sz="1200" kern="1200">
+        <a:solidFill>
+          <a:schemeClr val="tx1"/>
+        </a:solidFill>
+        <a:latin typeface="+mn-lt"/>
+        <a:ea typeface="+mn-ea"/>
+        <a:cs typeface="+mn-cs"/>
+      </a:defRPr>
+    </a:lvl3pPr>
+    <a:lvl4pPr marL="1371600" algn="l" defTabSz="914400" rtl="0" eaLnBrk="1" latinLnBrk="0" hangingPunct="1">
+      <a:defRPr sz="1200" kern="1200">
+        <a:solidFill>
+          <a:schemeClr val="tx1"/>
+        </a:solidFill>
+        <a:latin typeface="+mn-lt"/>
+        <a:ea typeface="+mn-ea"/>
+        <a:cs typeface="+mn-cs"/>
+      </a:defRPr>
+    </a:lvl4pPr>
+    <a:lvl5pPr marL="1828800" algn="l" defTabSz="914400" rtl="0" eaLnBrk="1" latinLnBrk="0" hangingPunct="1">
+      <a:defRPr sz="1200" kern="1200">
+        <a:solidFill>
+          <a:schemeClr val="tx1"/>
+        </a:solidFill>
+        <a:latin typeface="+mn-lt"/>
+        <a:ea typeface="+mn-ea"/>
+        <a:cs typeface="+mn-cs"/>
+      </a:defRPr>
+    </a:lvl5pPr>
+    <a:lvl6pPr marL="2286000" algn="l" defTabSz="914400" rtl="0" eaLnBrk="1" latinLnBrk="0" hangingPunct="1">
+      <a:defRPr sz="1200" kern="1200">
+        <a:solidFill>
+          <a:schemeClr val="tx1"/>
+        </a:solidFill>
+        <a:latin typeface="+mn-lt"/>
+        <a:ea typeface="+mn-ea"/>
+        <a:cs typeface="+mn-cs"/>
+      </a:defRPr>
+    </a:lvl6pPr>
+    <a:lvl7pPr marL="2743200" algn="l" defTabSz="914400" rtl="0" eaLnBrk="1" latinLnBrk="0" hangingPunct="1">
+      <a:defRPr sz="1200" kern="1200">
+        <a:solidFill>
+          <a:schemeClr val="tx1"/>
+        </a:solidFill>
+        <a:latin typeface="+mn-lt"/>
+        <a:ea typeface="+mn-ea"/>
+        <a:cs typeface="+mn-cs"/>
+      </a:defRPr>
+    </a:lvl7pPr>
+    <a:lvl8pPr marL="3200400" algn="l" defTabSz="914400" rtl="0" eaLnBrk="1" latinLnBrk="0" hangingPunct="1">
+      <a:defRPr sz="1200" kern="1200">
+        <a:solidFill>
+          <a:schemeClr val="tx1"/>
+        </a:solidFill>
+        <a:latin typeface="+mn-lt"/>
+        <a:ea typeface="+mn-ea"/>
+        <a:cs typeface="+mn-cs"/>
+      </a:defRPr>
+    </a:lvl8pPr>
+    <a:lvl9pPr marL="3657600" algn="l" defTabSz="914400" rtl="0" eaLnBrk="1" latinLnBrk="0" hangingPunct="1">
+      <a:defRPr sz="1200" kern="1200">
+        <a:solidFill>
+          <a:schemeClr val="tx1"/>
+        </a:solidFill>
+        <a:latin typeface="+mn-lt"/>
+        <a:ea typeface="+mn-ea"/>
+        <a:cs typeface="+mn-cs"/>
+      </a:defRPr>
+    </a:lvl9pPr>
+  </p:notesStyle>
+</p:notesMaster>
+</file>
+
+<file path=ppt/notesSlides/notesSlide1.xml><?xml version="1.0" encoding="utf-8"?>
+<p:notes xmlns:a="http://schemas.openxmlformats.org/drawingml/2006/main" xmlns:r="http://schemas.openxmlformats.org/officeDocument/2006/relationships" xmlns:p="http://schemas.openxmlformats.org/presentationml/2006/main">
+  <p:cSld>
+    <p:spTree>
+      <p:nvGrpSpPr>
+        <p:cNvPr id="1" name=""/>
+        <p:cNvGrpSpPr/>
+        <p:nvPr/>
+      </p:nvGrpSpPr>
+      <p:grpSpPr>
+        <a:xfrm>
+          <a:off x="0" y="0"/>
+          <a:ext cx="0" cy="0"/>
+          <a:chOff x="0" y="0"/>
+          <a:chExt cx="0" cy="0"/>
+        </a:xfrm>
+      </p:grpSpPr>
+      <p:sp>
+        <p:nvSpPr>
+          <p:cNvPr id="2" name="Espaço Reservado para Imagem de Slide 1"/>
+          <p:cNvSpPr>
+            <a:spLocks noGrp="1" noRot="1" noChangeAspect="1"/>
+          </p:cNvSpPr>
+          <p:nvPr>
+            <p:ph type="sldImg"/>
+          </p:nvPr>
+        </p:nvSpPr>
+        <p:spPr/>
+      </p:sp>
+      <p:sp>
+        <p:nvSpPr>
+          <p:cNvPr id="3" name="Espaço Reservado para Anotações 2"/>
+          <p:cNvSpPr>
+            <a:spLocks noGrp="1"/>
+          </p:cNvSpPr>
+          <p:nvPr>
+            <p:ph type="body" idx="1"/>
+          </p:nvPr>
+        </p:nvSpPr>
+        <p:spPr/>
+        <p:txBody>
+          <a:bodyPr/>
+          <a:lstStyle/>
+          <a:p>
+            <a:endParaRPr lang="pt-BR" dirty="0"/>
+          </a:p>
+        </p:txBody>
+      </p:sp>
+      <p:sp>
+        <p:nvSpPr>
+          <p:cNvPr id="4" name="Espaço Reservado para Número de Slide 3"/>
+          <p:cNvSpPr>
+            <a:spLocks noGrp="1"/>
+          </p:cNvSpPr>
+          <p:nvPr>
+            <p:ph type="sldNum" sz="quarter" idx="10"/>
+          </p:nvPr>
+        </p:nvSpPr>
+        <p:spPr/>
+        <p:txBody>
+          <a:bodyPr/>
+          <a:lstStyle/>
+          <a:p>
+            <a:fld id="{6E7D9F6C-46C6-466E-BD8C-E525EAE5D2D0}" type="slidenum">
+              <a:rPr lang="pt-BR" smtClean="0"/>
+              <a:t>1</a:t>
+            </a:fld>
+            <a:endParaRPr lang="pt-BR"/>
+          </a:p>
+        </p:txBody>
+      </p:sp>
+    </p:spTree>
+    <p:extLst>
+      <p:ext uri="{BB962C8B-B14F-4D97-AF65-F5344CB8AC3E}">
+        <p14:creationId xmlns:p14="http://schemas.microsoft.com/office/powerpoint/2010/main" val="3332561753"/>
+      </p:ext>
+    </p:extLst>
+  </p:cSld>
+  <p:clrMapOvr>
+    <a:masterClrMapping/>
+  </p:clrMapOvr>
+</p:notes>
+</file>
+
 <file path=ppt/slideLayouts/slideLayout1.xml><?xml version="1.0" encoding="utf-8"?>
 <p:sldLayout xmlns:a="http://schemas.openxmlformats.org/drawingml/2006/main" xmlns:r="http://schemas.openxmlformats.org/officeDocument/2006/relationships" xmlns:p="http://schemas.openxmlformats.org/presentationml/2006/main" type="title" preserve="1">
   <p:cSld name="Slide de título">
@@ -9386,7 +9823,6 @@
               <a:rPr lang="pt-BR" dirty="0" smtClean="0"/>
               <a:t> Alves Arnaldo</a:t>
             </a:r>
-            <a:endParaRPr lang="pt-BR" dirty="0" smtClean="0"/>
           </a:p>
           <a:p>
             <a:endParaRPr lang="pt-BR" dirty="0" smtClean="0"/>
@@ -9415,7 +9851,7 @@
           <p:nvPr/>
         </p:nvPicPr>
         <p:blipFill>
-          <a:blip r:embed="rId2">
+          <a:blip r:embed="rId3">
             <a:extLst>
               <a:ext uri="{28A0092B-C50C-407E-A947-70E740481C1C}">
                 <a14:useLocalDpi xmlns:a14="http://schemas.microsoft.com/office/drawing/2010/main" val="0"/>
@@ -9445,7 +9881,7 @@
           <p:nvPr/>
         </p:nvPicPr>
         <p:blipFill>
-          <a:blip r:embed="rId3">
+          <a:blip r:embed="rId4">
             <a:extLst>
               <a:ext uri="{28A0092B-C50C-407E-A947-70E740481C1C}">
                 <a14:useLocalDpi xmlns:a14="http://schemas.microsoft.com/office/drawing/2010/main" val="0"/>
@@ -9570,7 +10006,6 @@
               <a:rPr lang="pt-BR" b="1" i="1" dirty="0"/>
               <a:t>Estou me movimentando para uma área que sei que é segura.</a:t>
             </a:r>
-            <a:endParaRPr lang="pt-BR" b="1" i="1" dirty="0"/>
           </a:p>
         </p:txBody>
       </p:sp>
@@ -9584,6 +10019,13 @@
   <p:clrMapOvr>
     <a:masterClrMapping/>
   </p:clrMapOvr>
+  <p:timing>
+    <p:tnLst>
+      <p:par>
+        <p:cTn id="1" dur="indefinite" restart="never" nodeType="tmRoot"/>
+      </p:par>
+    </p:tnLst>
+  </p:timing>
 </p:sld>
 </file>
 
@@ -9711,6 +10153,13 @@
   <p:clrMapOvr>
     <a:masterClrMapping/>
   </p:clrMapOvr>
+  <p:timing>
+    <p:tnLst>
+      <p:par>
+        <p:cTn id="1" dur="indefinite" restart="never" nodeType="tmRoot"/>
+      </p:par>
+    </p:tnLst>
+  </p:timing>
 </p:sld>
 </file>
 
@@ -9803,11 +10252,7 @@
             </a:pPr>
             <a:r>
               <a:rPr lang="pt-BR" dirty="0" smtClean="0"/>
-              <a:t>// </a:t>
-            </a:r>
-            <a:r>
-              <a:rPr lang="pt-BR" dirty="0" smtClean="0"/>
-              <a:t>Agente </a:t>
+              <a:t>// Agente </a:t>
             </a:r>
             <a:r>
               <a:rPr lang="pt-BR" dirty="0"/>
@@ -9867,11 +10312,7 @@
             </a:pPr>
             <a:r>
               <a:rPr lang="pt-BR" dirty="0" smtClean="0"/>
-              <a:t>// </a:t>
-            </a:r>
-            <a:r>
-              <a:rPr lang="pt-BR" dirty="0" smtClean="0"/>
-              <a:t>Agente </a:t>
+              <a:t>// Agente </a:t>
             </a:r>
             <a:r>
               <a:rPr lang="pt-BR" dirty="0"/>
@@ -10048,6 +10489,13 @@
   <p:clrMapOvr>
     <a:masterClrMapping/>
   </p:clrMapOvr>
+  <p:timing>
+    <p:tnLst>
+      <p:par>
+        <p:cTn id="1" dur="indefinite" restart="never" nodeType="tmRoot"/>
+      </p:par>
+    </p:tnLst>
+  </p:timing>
 </p:sld>
 </file>
 
@@ -10145,6 +10593,13 @@
   <p:clrMapOvr>
     <a:masterClrMapping/>
   </p:clrMapOvr>
+  <p:timing>
+    <p:tnLst>
+      <p:par>
+        <p:cTn id="1" dur="indefinite" restart="never" nodeType="tmRoot"/>
+      </p:par>
+    </p:tnLst>
+  </p:timing>
 </p:sld>
 </file>
 
@@ -10531,6 +10986,13 @@
   <p:clrMapOvr>
     <a:masterClrMapping/>
   </p:clrMapOvr>
+  <p:timing>
+    <p:tnLst>
+      <p:par>
+        <p:cTn id="1" dur="indefinite" restart="never" nodeType="tmRoot"/>
+      </p:par>
+    </p:tnLst>
+  </p:timing>
 </p:sld>
 </file>
 
@@ -11065,8 +11527,31 @@
             </a:pPr>
             <a:r>
               <a:rPr lang="pt-BR" dirty="0" smtClean="0"/>
-              <a:t> B: brisa.</a:t>
-            </a:r>
+              <a:t> B: brisa</a:t>
+            </a:r>
+            <a:r>
+              <a:rPr lang="pt-BR" dirty="0" smtClean="0"/>
+              <a:t>.</a:t>
+            </a:r>
+          </a:p>
+          <a:p>
+            <a:pPr lvl="2">
+              <a:buFont typeface="Wingdings" panose="05000000000000000000" pitchFamily="2" charset="2"/>
+              <a:buChar char="q"/>
+            </a:pPr>
+            <a:r>
+              <a:rPr lang="pt-BR" dirty="0"/>
+              <a:t> </a:t>
+            </a:r>
+            <a:r>
+              <a:rPr lang="pt-BR" dirty="0" smtClean="0"/>
+              <a:t>P</a:t>
+            </a:r>
+            <a:r>
+              <a:rPr lang="pt-BR" smtClean="0"/>
+              <a:t>: poço.</a:t>
+            </a:r>
+            <a:endParaRPr lang="pt-BR" dirty="0" smtClean="0"/>
           </a:p>
           <a:p>
             <a:pPr lvl="2">
@@ -11262,43 +11747,16 @@
             <a:endParaRPr lang="pt-BR" dirty="0" smtClean="0"/>
           </a:p>
           <a:p>
-            <a:r>
-              <a:rPr lang="en-US" b="1" dirty="0"/>
-              <a:t>static char </a:t>
-            </a:r>
-            <a:r>
-              <a:rPr lang="en-US" b="1" i="1" dirty="0" err="1" smtClean="0"/>
-              <a:t>brisas</a:t>
-            </a:r>
-            <a:r>
-              <a:rPr lang="en-US" b="1" i="1" dirty="0"/>
-              <a:t>[][] = new char[4][4];</a:t>
-            </a:r>
-          </a:p>
-          <a:p>
             <a:pPr marL="0" indent="0">
               <a:buNone/>
             </a:pPr>
             <a:r>
-              <a:rPr lang="pt-BR" dirty="0"/>
-              <a:t>// </a:t>
-            </a:r>
-            <a:r>
-              <a:rPr lang="pt-BR" u="sng" dirty="0"/>
-              <a:t>Esta matriz fica responsável por armazenar as brisas.</a:t>
-            </a:r>
-          </a:p>
-          <a:p>
-            <a:endParaRPr lang="pt-BR" dirty="0"/>
-          </a:p>
-          <a:p>
-            <a:r>
               <a:rPr lang="en-US" b="1" dirty="0"/>
               <a:t>static char </a:t>
             </a:r>
             <a:r>
-              <a:rPr lang="en-US" b="1" i="1" dirty="0" err="1"/>
-              <a:t>fedor</a:t>
+              <a:rPr lang="en-US" b="1" i="1" dirty="0" err="1" smtClean="0"/>
+              <a:t>brisas</a:t>
             </a:r>
             <a:r>
               <a:rPr lang="en-US" b="1" i="1" dirty="0"/>
@@ -11311,13 +11769,37 @@
             </a:pPr>
             <a:r>
               <a:rPr lang="pt-BR" dirty="0"/>
-              <a:t>// </a:t>
-            </a:r>
-            <a:r>
-              <a:rPr lang="pt-BR" u="sng" dirty="0"/>
-              <a:t>Esta matriz fica responsável por armazenar os fedores.</a:t>
-            </a:r>
+              <a:t>// Esta matriz fica responsável por armazenar as brisas.</a:t>
+            </a:r>
+          </a:p>
+          <a:p>
             <a:endParaRPr lang="pt-BR" dirty="0"/>
+          </a:p>
+          <a:p>
+            <a:pPr marL="0" indent="0">
+              <a:buNone/>
+            </a:pPr>
+            <a:r>
+              <a:rPr lang="en-US" b="1" dirty="0"/>
+              <a:t>static char </a:t>
+            </a:r>
+            <a:r>
+              <a:rPr lang="en-US" b="1" i="1" dirty="0" err="1"/>
+              <a:t>fedor</a:t>
+            </a:r>
+            <a:r>
+              <a:rPr lang="en-US" b="1" i="1" dirty="0"/>
+              <a:t>[][] = new char[4][4];</a:t>
+            </a:r>
+          </a:p>
+          <a:p>
+            <a:pPr marL="0" indent="0">
+              <a:buNone/>
+            </a:pPr>
+            <a:r>
+              <a:rPr lang="pt-BR" dirty="0"/>
+              <a:t>// Esta matriz fica responsável por armazenar os fedores.</a:t>
+            </a:r>
           </a:p>
         </p:txBody>
       </p:sp>
@@ -11619,7 +12101,15 @@
             </a:r>
             <a:r>
               <a:rPr lang="pt-BR" dirty="0"/>
-              <a:t>do trabalho na disciplina</a:t>
+              <a:t>do trabalho </a:t>
+            </a:r>
+            <a:r>
+              <a:rPr lang="pt-BR" dirty="0" smtClean="0"/>
+              <a:t>da </a:t>
+            </a:r>
+            <a:r>
+              <a:rPr lang="pt-BR" dirty="0"/>
+              <a:t>disciplina</a:t>
             </a:r>
             <a:r>
               <a:rPr lang="pt-BR" dirty="0" smtClean="0"/>
@@ -11915,7 +12405,17 @@
             </a:r>
             <a:r>
               <a:rPr lang="pt-BR" b="1" i="1" dirty="0" smtClean="0"/>
-              <a:t>|"); 				</a:t>
+              <a:t>|"); 		</a:t>
+            </a:r>
+            <a:endParaRPr lang="pt-BR" b="1" i="1" dirty="0" smtClean="0"/>
+          </a:p>
+          <a:p>
+            <a:pPr marL="0" indent="0">
+              <a:buNone/>
+            </a:pPr>
+            <a:r>
+              <a:rPr lang="pt-BR" b="1" i="1" dirty="0" smtClean="0"/>
+              <a:t>		</a:t>
             </a:r>
             <a:r>
               <a:rPr lang="pt-BR" dirty="0" err="1" smtClean="0"/>
@@ -12460,4 +12960,265 @@
     </a:ext>
   </a:extLst>
 </a:theme>
+</file>
+
+<file path=ppt/theme/theme2.xml><?xml version="1.0" encoding="utf-8"?>
+<a:theme xmlns:a="http://schemas.openxmlformats.org/drawingml/2006/main" name="Tema do Office">
+  <a:themeElements>
+    <a:clrScheme name="Escritório">
+      <a:dk1>
+        <a:sysClr val="windowText" lastClr="000000"/>
+      </a:dk1>
+      <a:lt1>
+        <a:sysClr val="window" lastClr="FFFFFF"/>
+      </a:lt1>
+      <a:dk2>
+        <a:srgbClr val="44546A"/>
+      </a:dk2>
+      <a:lt2>
+        <a:srgbClr val="E7E6E6"/>
+      </a:lt2>
+      <a:accent1>
+        <a:srgbClr val="5B9BD5"/>
+      </a:accent1>
+      <a:accent2>
+        <a:srgbClr val="ED7D31"/>
+      </a:accent2>
+      <a:accent3>
+        <a:srgbClr val="A5A5A5"/>
+      </a:accent3>
+      <a:accent4>
+        <a:srgbClr val="FFC000"/>
+      </a:accent4>
+      <a:accent5>
+        <a:srgbClr val="4472C4"/>
+      </a:accent5>
+      <a:accent6>
+        <a:srgbClr val="70AD47"/>
+      </a:accent6>
+      <a:hlink>
+        <a:srgbClr val="0563C1"/>
+      </a:hlink>
+      <a:folHlink>
+        <a:srgbClr val="954F72"/>
+      </a:folHlink>
+    </a:clrScheme>
+    <a:fontScheme name="Escritório">
+      <a:majorFont>
+        <a:latin typeface="Calibri Light" panose="020F0302020204030204"/>
+        <a:ea typeface=""/>
+        <a:cs typeface=""/>
+        <a:font script="Jpan" typeface="ＭＳ Ｐゴシック"/>
+        <a:font script="Hang" typeface="맑은 고딕"/>
+        <a:font script="Hans" typeface="宋体"/>
+        <a:font script="Hant" typeface="新細明體"/>
+        <a:font script="Arab" typeface="Times New Roman"/>
+        <a:font script="Hebr" typeface="Times New Roman"/>
+        <a:font script="Thai" typeface="Angsana New"/>
+        <a:font script="Ethi" typeface="Nyala"/>
+        <a:font script="Beng" typeface="Vrinda"/>
+        <a:font script="Gujr" typeface="Shruti"/>
+        <a:font script="Khmr" typeface="MoolBoran"/>
+        <a:font script="Knda" typeface="Tunga"/>
+        <a:font script="Guru" typeface="Raavi"/>
+        <a:font script="Cans" typeface="Euphemia"/>
+        <a:font script="Cher" typeface="Plantagenet Cherokee"/>
+        <a:font script="Yiii" typeface="Microsoft Yi Baiti"/>
+        <a:font script="Tibt" typeface="Microsoft Himalaya"/>
+        <a:font script="Thaa" typeface="MV Boli"/>
+        <a:font script="Deva" typeface="Mangal"/>
+        <a:font script="Telu" typeface="Gautami"/>
+        <a:font script="Taml" typeface="Latha"/>
+        <a:font script="Syrc" typeface="Estrangelo Edessa"/>
+        <a:font script="Orya" typeface="Kalinga"/>
+        <a:font script="Mlym" typeface="Kartika"/>
+        <a:font script="Laoo" typeface="DokChampa"/>
+        <a:font script="Sinh" typeface="Iskoola Pota"/>
+        <a:font script="Mong" typeface="Mongolian Baiti"/>
+        <a:font script="Viet" typeface="Times New Roman"/>
+        <a:font script="Uigh" typeface="Microsoft Uighur"/>
+        <a:font script="Geor" typeface="Sylfaen"/>
+      </a:majorFont>
+      <a:minorFont>
+        <a:latin typeface="Calibri" panose="020F0502020204030204"/>
+        <a:ea typeface=""/>
+        <a:cs typeface=""/>
+        <a:font script="Jpan" typeface="ＭＳ Ｐゴシック"/>
+        <a:font script="Hang" typeface="맑은 고딕"/>
+        <a:font script="Hans" typeface="宋体"/>
+        <a:font script="Hant" typeface="新細明體"/>
+        <a:font script="Arab" typeface="Arial"/>
+        <a:font script="Hebr" typeface="Arial"/>
+        <a:font script="Thai" typeface="Cordia New"/>
+        <a:font script="Ethi" typeface="Nyala"/>
+        <a:font script="Beng" typeface="Vrinda"/>
+        <a:font script="Gujr" typeface="Shruti"/>
+        <a:font script="Khmr" typeface="DaunPenh"/>
+        <a:font script="Knda" typeface="Tunga"/>
+        <a:font script="Guru" typeface="Raavi"/>
+        <a:font script="Cans" typeface="Euphemia"/>
+        <a:font script="Cher" typeface="Plantagenet Cherokee"/>
+        <a:font script="Yiii" typeface="Microsoft Yi Baiti"/>
+        <a:font script="Tibt" typeface="Microsoft Himalaya"/>
+        <a:font script="Thaa" typeface="MV Boli"/>
+        <a:font script="Deva" typeface="Mangal"/>
+        <a:font script="Telu" typeface="Gautami"/>
+        <a:font script="Taml" typeface="Latha"/>
+        <a:font script="Syrc" typeface="Estrangelo Edessa"/>
+        <a:font script="Orya" typeface="Kalinga"/>
+        <a:font script="Mlym" typeface="Kartika"/>
+        <a:font script="Laoo" typeface="DokChampa"/>
+        <a:font script="Sinh" typeface="Iskoola Pota"/>
+        <a:font script="Mong" typeface="Mongolian Baiti"/>
+        <a:font script="Viet" typeface="Arial"/>
+        <a:font script="Uigh" typeface="Microsoft Uighur"/>
+        <a:font script="Geor" typeface="Sylfaen"/>
+      </a:minorFont>
+    </a:fontScheme>
+    <a:fmtScheme name="Escritório">
+      <a:fillStyleLst>
+        <a:solidFill>
+          <a:schemeClr val="phClr"/>
+        </a:solidFill>
+        <a:gradFill rotWithShape="1">
+          <a:gsLst>
+            <a:gs pos="0">
+              <a:schemeClr val="phClr">
+                <a:lumMod val="110000"/>
+                <a:satMod val="105000"/>
+                <a:tint val="67000"/>
+              </a:schemeClr>
+            </a:gs>
+            <a:gs pos="50000">
+              <a:schemeClr val="phClr">
+                <a:lumMod val="105000"/>
+                <a:satMod val="103000"/>
+                <a:tint val="73000"/>
+              </a:schemeClr>
+            </a:gs>
+            <a:gs pos="100000">
+              <a:schemeClr val="phClr">
+                <a:lumMod val="105000"/>
+                <a:satMod val="109000"/>
+                <a:tint val="81000"/>
+              </a:schemeClr>
+            </a:gs>
+          </a:gsLst>
+          <a:lin ang="5400000" scaled="0"/>
+        </a:gradFill>
+        <a:gradFill rotWithShape="1">
+          <a:gsLst>
+            <a:gs pos="0">
+              <a:schemeClr val="phClr">
+                <a:satMod val="103000"/>
+                <a:lumMod val="102000"/>
+                <a:tint val="94000"/>
+              </a:schemeClr>
+            </a:gs>
+            <a:gs pos="50000">
+              <a:schemeClr val="phClr">
+                <a:satMod val="110000"/>
+                <a:lumMod val="100000"/>
+                <a:shade val="100000"/>
+              </a:schemeClr>
+            </a:gs>
+            <a:gs pos="100000">
+              <a:schemeClr val="phClr">
+                <a:lumMod val="99000"/>
+                <a:satMod val="120000"/>
+                <a:shade val="78000"/>
+              </a:schemeClr>
+            </a:gs>
+          </a:gsLst>
+          <a:lin ang="5400000" scaled="0"/>
+        </a:gradFill>
+      </a:fillStyleLst>
+      <a:lnStyleLst>
+        <a:ln w="6350" cap="flat" cmpd="sng" algn="ctr">
+          <a:solidFill>
+            <a:schemeClr val="phClr"/>
+          </a:solidFill>
+          <a:prstDash val="solid"/>
+          <a:miter lim="800000"/>
+        </a:ln>
+        <a:ln w="12700" cap="flat" cmpd="sng" algn="ctr">
+          <a:solidFill>
+            <a:schemeClr val="phClr"/>
+          </a:solidFill>
+          <a:prstDash val="solid"/>
+          <a:miter lim="800000"/>
+        </a:ln>
+        <a:ln w="19050" cap="flat" cmpd="sng" algn="ctr">
+          <a:solidFill>
+            <a:schemeClr val="phClr"/>
+          </a:solidFill>
+          <a:prstDash val="solid"/>
+          <a:miter lim="800000"/>
+        </a:ln>
+      </a:lnStyleLst>
+      <a:effectStyleLst>
+        <a:effectStyle>
+          <a:effectLst/>
+        </a:effectStyle>
+        <a:effectStyle>
+          <a:effectLst/>
+        </a:effectStyle>
+        <a:effectStyle>
+          <a:effectLst>
+            <a:outerShdw blurRad="57150" dist="19050" dir="5400000" algn="ctr" rotWithShape="0">
+              <a:srgbClr val="000000">
+                <a:alpha val="63000"/>
+              </a:srgbClr>
+            </a:outerShdw>
+          </a:effectLst>
+        </a:effectStyle>
+      </a:effectStyleLst>
+      <a:bgFillStyleLst>
+        <a:solidFill>
+          <a:schemeClr val="phClr"/>
+        </a:solidFill>
+        <a:solidFill>
+          <a:schemeClr val="phClr">
+            <a:tint val="95000"/>
+            <a:satMod val="170000"/>
+          </a:schemeClr>
+        </a:solidFill>
+        <a:gradFill rotWithShape="1">
+          <a:gsLst>
+            <a:gs pos="0">
+              <a:schemeClr val="phClr">
+                <a:tint val="93000"/>
+                <a:satMod val="150000"/>
+                <a:shade val="98000"/>
+                <a:lumMod val="102000"/>
+              </a:schemeClr>
+            </a:gs>
+            <a:gs pos="50000">
+              <a:schemeClr val="phClr">
+                <a:tint val="98000"/>
+                <a:satMod val="130000"/>
+                <a:shade val="90000"/>
+                <a:lumMod val="103000"/>
+              </a:schemeClr>
+            </a:gs>
+            <a:gs pos="100000">
+              <a:schemeClr val="phClr">
+                <a:shade val="63000"/>
+                <a:satMod val="120000"/>
+              </a:schemeClr>
+            </a:gs>
+          </a:gsLst>
+          <a:lin ang="5400000" scaled="0"/>
+        </a:gradFill>
+      </a:bgFillStyleLst>
+    </a:fmtScheme>
+  </a:themeElements>
+  <a:objectDefaults/>
+  <a:extraClrSchemeLst/>
+  <a:extLst>
+    <a:ext uri="{05A4C25C-085E-4340-85A3-A5531E510DB2}">
+      <thm15:themeFamily xmlns:thm15="http://schemas.microsoft.com/office/thememl/2012/main" name="Office Theme" id="{62F939B6-93AF-4DB8-9C6B-D6C7DFDC589F}" vid="{4A3C46E8-61CC-4603-A589-7422A47A8E4A}"/>
+    </a:ext>
+  </a:extLst>
+</a:theme>
 </file>
</xml_diff>

<commit_message>
More updates with Rodrigo
</commit_message>
<xml_diff>
--- a/Mundo do Wumpus.pptx
+++ b/Mundo do Wumpus.pptx
@@ -11545,11 +11545,25 @@
             </a:r>
             <a:r>
               <a:rPr lang="pt-BR" dirty="0" smtClean="0"/>
-              <a:t>P</a:t>
+              <a:t>P: poço.</a:t>
+            </a:r>
+          </a:p>
+          <a:p>
+            <a:pPr lvl="2">
+              <a:buFont typeface="Wingdings" panose="05000000000000000000" pitchFamily="2" charset="2"/>
+              <a:buChar char="q"/>
+            </a:pPr>
+            <a:r>
+              <a:rPr lang="pt-BR" dirty="0"/>
+              <a:t> </a:t>
+            </a:r>
+            <a:r>
+              <a:rPr lang="pt-BR" dirty="0" smtClean="0"/>
+              <a:t>O</a:t>
             </a:r>
             <a:r>
               <a:rPr lang="pt-BR" smtClean="0"/>
-              <a:t>: poço.</a:t>
+              <a:t>: ouro.</a:t>
             </a:r>
             <a:endParaRPr lang="pt-BR" dirty="0" smtClean="0"/>
           </a:p>

</xml_diff>

<commit_message>
More contributions with Rodrigo Carlos
</commit_message>
<xml_diff>
--- a/Mundo do Wumpus.pptx
+++ b/Mundo do Wumpus.pptx
@@ -5,29 +5,31 @@
     <p:sldMasterId id="2147483648" r:id="rId1"/>
   </p:sldMasterIdLst>
   <p:notesMasterIdLst>
-    <p:notesMasterId r:id="rId22"/>
+    <p:notesMasterId r:id="rId24"/>
   </p:notesMasterIdLst>
   <p:sldIdLst>
     <p:sldId id="256" r:id="rId2"/>
     <p:sldId id="257" r:id="rId3"/>
     <p:sldId id="258" r:id="rId4"/>
-    <p:sldId id="259" r:id="rId5"/>
-    <p:sldId id="260" r:id="rId6"/>
-    <p:sldId id="267" r:id="rId7"/>
-    <p:sldId id="261" r:id="rId8"/>
-    <p:sldId id="262" r:id="rId9"/>
-    <p:sldId id="263" r:id="rId10"/>
-    <p:sldId id="272" r:id="rId11"/>
-    <p:sldId id="273" r:id="rId12"/>
-    <p:sldId id="264" r:id="rId13"/>
-    <p:sldId id="274" r:id="rId14"/>
-    <p:sldId id="275" r:id="rId15"/>
-    <p:sldId id="270" r:id="rId16"/>
-    <p:sldId id="271" r:id="rId17"/>
-    <p:sldId id="265" r:id="rId18"/>
-    <p:sldId id="269" r:id="rId19"/>
-    <p:sldId id="266" r:id="rId20"/>
-    <p:sldId id="268" r:id="rId21"/>
+    <p:sldId id="276" r:id="rId5"/>
+    <p:sldId id="259" r:id="rId6"/>
+    <p:sldId id="260" r:id="rId7"/>
+    <p:sldId id="267" r:id="rId8"/>
+    <p:sldId id="261" r:id="rId9"/>
+    <p:sldId id="262" r:id="rId10"/>
+    <p:sldId id="263" r:id="rId11"/>
+    <p:sldId id="272" r:id="rId12"/>
+    <p:sldId id="273" r:id="rId13"/>
+    <p:sldId id="264" r:id="rId14"/>
+    <p:sldId id="274" r:id="rId15"/>
+    <p:sldId id="275" r:id="rId16"/>
+    <p:sldId id="270" r:id="rId17"/>
+    <p:sldId id="271" r:id="rId18"/>
+    <p:sldId id="265" r:id="rId19"/>
+    <p:sldId id="269" r:id="rId20"/>
+    <p:sldId id="266" r:id="rId21"/>
+    <p:sldId id="268" r:id="rId22"/>
+    <p:sldId id="277" r:id="rId23"/>
   </p:sldIdLst>
   <p:sldSz cx="12192000" cy="6858000"/>
   <p:notesSz cx="6858000" cy="9144000"/>
@@ -6898,6 +6900,99 @@
 </p:notes>
 </file>
 
+<file path=ppt/notesSlides/notesSlide2.xml><?xml version="1.0" encoding="utf-8"?>
+<p:notes xmlns:a="http://schemas.openxmlformats.org/drawingml/2006/main" xmlns:r="http://schemas.openxmlformats.org/officeDocument/2006/relationships" xmlns:p="http://schemas.openxmlformats.org/presentationml/2006/main">
+  <p:cSld>
+    <p:spTree>
+      <p:nvGrpSpPr>
+        <p:cNvPr id="1" name=""/>
+        <p:cNvGrpSpPr/>
+        <p:nvPr/>
+      </p:nvGrpSpPr>
+      <p:grpSpPr>
+        <a:xfrm>
+          <a:off x="0" y="0"/>
+          <a:ext cx="0" cy="0"/>
+          <a:chOff x="0" y="0"/>
+          <a:chExt cx="0" cy="0"/>
+        </a:xfrm>
+      </p:grpSpPr>
+      <p:sp>
+        <p:nvSpPr>
+          <p:cNvPr id="2" name="Espaço Reservado para Imagem de Slide 1"/>
+          <p:cNvSpPr>
+            <a:spLocks noGrp="1" noRot="1" noChangeAspect="1"/>
+          </p:cNvSpPr>
+          <p:nvPr>
+            <p:ph type="sldImg"/>
+          </p:nvPr>
+        </p:nvSpPr>
+        <p:spPr/>
+      </p:sp>
+      <p:sp>
+        <p:nvSpPr>
+          <p:cNvPr id="3" name="Espaço Reservado para Anotações 2"/>
+          <p:cNvSpPr>
+            <a:spLocks noGrp="1"/>
+          </p:cNvSpPr>
+          <p:nvPr>
+            <p:ph type="body" idx="1"/>
+          </p:nvPr>
+        </p:nvSpPr>
+        <p:spPr/>
+        <p:txBody>
+          <a:bodyPr/>
+          <a:lstStyle/>
+          <a:p>
+            <a:endParaRPr lang="pt-BR" dirty="0"/>
+          </a:p>
+        </p:txBody>
+      </p:sp>
+      <p:sp>
+        <p:nvSpPr>
+          <p:cNvPr id="4" name="Espaço Reservado para Número de Slide 3"/>
+          <p:cNvSpPr>
+            <a:spLocks noGrp="1"/>
+          </p:cNvSpPr>
+          <p:nvPr>
+            <p:ph type="sldNum" sz="quarter" idx="10"/>
+          </p:nvPr>
+        </p:nvSpPr>
+        <p:spPr/>
+        <p:txBody>
+          <a:bodyPr/>
+          <a:lstStyle/>
+          <a:p>
+            <a:fld id="{6E7D9F6C-46C6-466E-BD8C-E525EAE5D2D0}" type="slidenum">
+              <a:rPr lang="pt-BR" smtClean="0">
+                <a:solidFill>
+                  <a:prstClr val="black"/>
+                </a:solidFill>
+              </a:rPr>
+              <a:pPr/>
+              <a:t>22</a:t>
+            </a:fld>
+            <a:endParaRPr lang="pt-BR">
+              <a:solidFill>
+                <a:prstClr val="black"/>
+              </a:solidFill>
+            </a:endParaRPr>
+          </a:p>
+        </p:txBody>
+      </p:sp>
+    </p:spTree>
+    <p:extLst>
+      <p:ext uri="{BB962C8B-B14F-4D97-AF65-F5344CB8AC3E}">
+        <p14:creationId xmlns:p14="http://schemas.microsoft.com/office/powerpoint/2010/main" val="1482070457"/>
+      </p:ext>
+    </p:extLst>
+  </p:cSld>
+  <p:clrMapOvr>
+    <a:masterClrMapping/>
+  </p:clrMapOvr>
+</p:notes>
+</file>
+
 <file path=ppt/slideLayouts/slideLayout1.xml><?xml version="1.0" encoding="utf-8"?>
 <p:sldLayout xmlns:a="http://schemas.openxmlformats.org/drawingml/2006/main" xmlns:r="http://schemas.openxmlformats.org/officeDocument/2006/relationships" xmlns:p="http://schemas.openxmlformats.org/presentationml/2006/main" type="title" preserve="1">
   <p:cSld name="Slide de título">
@@ -9979,42 +10074,157 @@
           <a:bodyPr/>
           <a:lstStyle/>
           <a:p>
+            <a:pPr marL="0" indent="0">
+              <a:buNone/>
+            </a:pPr>
+            <a:r>
+              <a:rPr lang="pt-BR" dirty="0"/>
+              <a:t>// A</a:t>
+            </a:r>
+            <a:r>
+              <a:rPr lang="pt-BR" dirty="0" smtClean="0"/>
+              <a:t>qui ocorre </a:t>
+            </a:r>
+            <a:r>
+              <a:rPr lang="pt-BR" dirty="0"/>
+              <a:t>o </a:t>
+            </a:r>
+            <a:r>
+              <a:rPr lang="pt-BR" dirty="0" smtClean="0"/>
+              <a:t>raciocínio e movimento </a:t>
+            </a:r>
+            <a:r>
+              <a:rPr lang="pt-BR" dirty="0"/>
+              <a:t>do agente.</a:t>
+            </a:r>
             <a:endParaRPr lang="pt-BR" dirty="0" smtClean="0"/>
           </a:p>
           <a:p>
-            <a:r>
-              <a:rPr lang="pt-BR" dirty="0" smtClean="0"/>
-              <a:t>A função start busca comparar sempre as áreas seguras, com as áreas visitadas e as áreas possíveis de movimentação.</a:t>
-            </a:r>
-          </a:p>
-          <a:p>
+            <a:endParaRPr lang="pt-BR" dirty="0" smtClean="0"/>
+          </a:p>
+          <a:p>
+            <a:pPr marL="0" indent="0">
+              <a:buNone/>
+            </a:pPr>
+            <a:r>
+              <a:rPr lang="en-US" b="1" dirty="0"/>
+              <a:t>public static char[][] start(char </a:t>
+            </a:r>
+            <a:r>
+              <a:rPr lang="en-US" b="1" dirty="0" err="1"/>
+              <a:t>ambiente</a:t>
+            </a:r>
+            <a:r>
+              <a:rPr lang="en-US" b="1" dirty="0" smtClean="0"/>
+              <a:t>[][]){</a:t>
+            </a:r>
+          </a:p>
+          <a:p>
+            <a:pPr marL="0" indent="0">
+              <a:buNone/>
+            </a:pPr>
+            <a:r>
+              <a:rPr lang="en-US" b="1" dirty="0" smtClean="0"/>
+              <a:t>…</a:t>
+            </a:r>
+          </a:p>
+          <a:p>
+            <a:pPr marL="0" indent="0">
+              <a:buNone/>
+            </a:pPr>
+            <a:r>
+              <a:rPr lang="en-US" b="1" dirty="0" smtClean="0"/>
+              <a:t>}</a:t>
+            </a:r>
+          </a:p>
+          <a:p>
+            <a:pPr marL="0" indent="0">
+              <a:buNone/>
+            </a:pPr>
+            <a:endParaRPr lang="en-US" b="1" dirty="0"/>
+          </a:p>
+          <a:p>
+            <a:pPr algn="just"/>
+            <a:r>
+              <a:rPr lang="en-US" dirty="0" err="1" smtClean="0"/>
+              <a:t>Uso</a:t>
+            </a:r>
+            <a:r>
+              <a:rPr lang="en-US" dirty="0" smtClean="0"/>
+              <a:t> de </a:t>
+            </a:r>
+            <a:r>
+              <a:rPr lang="en-US" dirty="0" err="1" smtClean="0"/>
+              <a:t>estruturas</a:t>
+            </a:r>
+            <a:r>
+              <a:rPr lang="en-US" dirty="0" smtClean="0"/>
+              <a:t> de </a:t>
+            </a:r>
+            <a:r>
+              <a:rPr lang="en-US" dirty="0" err="1" smtClean="0"/>
+              <a:t>armazenamento</a:t>
+            </a:r>
+            <a:r>
+              <a:rPr lang="en-US" dirty="0" smtClean="0"/>
+              <a:t> para </a:t>
+            </a:r>
+            <a:r>
+              <a:rPr lang="en-US" dirty="0" err="1" smtClean="0"/>
+              <a:t>subsidiar</a:t>
+            </a:r>
+            <a:r>
+              <a:rPr lang="en-US" dirty="0" smtClean="0"/>
+              <a:t> a </a:t>
+            </a:r>
+            <a:r>
+              <a:rPr lang="en-US" dirty="0" err="1" smtClean="0"/>
+              <a:t>tomada</a:t>
+            </a:r>
+            <a:r>
+              <a:rPr lang="en-US" dirty="0" smtClean="0"/>
+              <a:t> de </a:t>
+            </a:r>
+            <a:r>
+              <a:rPr lang="en-US" dirty="0" err="1" smtClean="0"/>
+              <a:t>decisão</a:t>
+            </a:r>
+            <a:r>
+              <a:rPr lang="en-US" dirty="0" smtClean="0"/>
+              <a:t> do </a:t>
+            </a:r>
+            <a:r>
+              <a:rPr lang="en-US" dirty="0" err="1" smtClean="0"/>
+              <a:t>agente</a:t>
+            </a:r>
+            <a:r>
+              <a:rPr lang="en-US" dirty="0" smtClean="0"/>
+              <a:t> do </a:t>
+            </a:r>
+            <a:r>
+              <a:rPr lang="en-US" dirty="0" err="1" smtClean="0"/>
+              <a:t>mundo</a:t>
+            </a:r>
+            <a:r>
+              <a:rPr lang="en-US" dirty="0" smtClean="0"/>
+              <a:t> de </a:t>
+            </a:r>
+            <a:r>
+              <a:rPr lang="en-US" dirty="0" err="1" smtClean="0"/>
+              <a:t>Wumpus</a:t>
+            </a:r>
+            <a:r>
+              <a:rPr lang="en-US" dirty="0" smtClean="0"/>
+              <a:t>.</a:t>
+            </a:r>
             <a:endParaRPr lang="pt-BR" dirty="0"/>
-          </a:p>
-          <a:p>
-            <a:r>
-              <a:rPr lang="pt-BR" dirty="0" smtClean="0"/>
-              <a:t>Se há uma área segura, que ainda não foi visitada, e que é uma área possível de movimentação, então o movimento é realizado.</a:t>
-            </a:r>
-          </a:p>
-          <a:p>
-            <a:endParaRPr lang="pt-BR" dirty="0"/>
-          </a:p>
-          <a:p>
-            <a:r>
-              <a:rPr lang="pt-BR" dirty="0" smtClean="0"/>
-              <a:t>Neste momento, o guerreiro fala: </a:t>
-            </a:r>
-            <a:r>
-              <a:rPr lang="pt-BR" b="1" i="1" dirty="0"/>
-              <a:t>Estou me movimentando para uma área que sei que é segura.</a:t>
-            </a:r>
           </a:p>
         </p:txBody>
       </p:sp>
     </p:spTree>
     <p:extLst>
       <p:ext uri="{BB962C8B-B14F-4D97-AF65-F5344CB8AC3E}">
-        <p14:creationId xmlns:p14="http://schemas.microsoft.com/office/powerpoint/2010/main" val="4286639439"/>
+        <p14:creationId xmlns:p14="http://schemas.microsoft.com/office/powerpoint/2010/main" val="1907980347"/>
       </p:ext>
     </p:extLst>
   </p:cSld>
@@ -10091,7 +10301,7 @@
           <a:p>
             <a:r>
               <a:rPr lang="pt-BR" dirty="0" smtClean="0"/>
-              <a:t>Entretanto, se as áreas seguras todas já foram visitadas, não resta mais nada para o agente a não ser sortear a sua próxima jogada.</a:t>
+              <a:t>A função start busca comparar sempre as áreas seguras, com as áreas visitadas e as áreas possíveis de movimentação.</a:t>
             </a:r>
           </a:p>
           <a:p>
@@ -10100,55 +10310,28 @@
           <a:p>
             <a:r>
               <a:rPr lang="pt-BR" dirty="0" smtClean="0"/>
-              <a:t>Neste momento, o guerreiro fala:</a:t>
-            </a:r>
-            <a:r>
-              <a:rPr lang="pt-BR" b="1" i="1" dirty="0" smtClean="0"/>
-              <a:t> </a:t>
+              <a:t>Se há uma área segura, que ainda não foi visitada, e que é uma área possível de movimentação, então o movimento é realizado.</a:t>
+            </a:r>
+          </a:p>
+          <a:p>
+            <a:endParaRPr lang="pt-BR" dirty="0"/>
+          </a:p>
+          <a:p>
+            <a:r>
+              <a:rPr lang="pt-BR" dirty="0" smtClean="0"/>
+              <a:t>Neste momento, o guerreiro fala: </a:t>
             </a:r>
             <a:r>
               <a:rPr lang="pt-BR" b="1" i="1" dirty="0"/>
-              <a:t>Neste momento não sei para onde ir</a:t>
-            </a:r>
-            <a:r>
-              <a:rPr lang="pt-BR" b="1" i="1" dirty="0" smtClean="0"/>
-              <a:t>! </a:t>
-            </a:r>
-            <a:r>
-              <a:rPr lang="pt-BR" b="1" i="1" dirty="0"/>
-              <a:t>Vou escolher ao acaso. Então me deseja sorte</a:t>
-            </a:r>
-            <a:r>
-              <a:rPr lang="pt-BR" b="1" i="1" dirty="0" smtClean="0"/>
-              <a:t>.</a:t>
-            </a:r>
-            <a:endParaRPr lang="pt-BR" dirty="0" smtClean="0"/>
-          </a:p>
-          <a:p>
-            <a:endParaRPr lang="pt-BR" b="1" i="1" dirty="0"/>
-          </a:p>
-          <a:p>
-            <a:pPr algn="just"/>
-            <a:r>
-              <a:rPr lang="pt-BR" dirty="0" smtClean="0"/>
-              <a:t>A próxima jogada é sorteada de forma completamente aleatória usando os recursos da classe </a:t>
-            </a:r>
-            <a:r>
-              <a:rPr lang="pt-BR" dirty="0" err="1" smtClean="0"/>
-              <a:t>Random</a:t>
-            </a:r>
-            <a:r>
-              <a:rPr lang="pt-BR" dirty="0" smtClean="0"/>
-              <a:t> da linguagem Java.</a:t>
-            </a:r>
-            <a:endParaRPr lang="pt-BR" dirty="0"/>
+              <a:t>Estou me movimentando para uma área que sei que é segura.</a:t>
+            </a:r>
           </a:p>
         </p:txBody>
       </p:sp>
     </p:spTree>
     <p:extLst>
       <p:ext uri="{BB962C8B-B14F-4D97-AF65-F5344CB8AC3E}">
-        <p14:creationId xmlns:p14="http://schemas.microsoft.com/office/powerpoint/2010/main" val="3979793273"/>
+        <p14:creationId xmlns:p14="http://schemas.microsoft.com/office/powerpoint/2010/main" val="4286639439"/>
       </p:ext>
     </p:extLst>
   </p:cSld>
@@ -10199,7 +10382,7 @@
           <a:p>
             <a:r>
               <a:rPr lang="pt-BR" dirty="0" smtClean="0"/>
-              <a:t>Estruturas auxiliares</a:t>
+              <a:t>Funções de Execução</a:t>
             </a:r>
             <a:endParaRPr lang="pt-BR" dirty="0"/>
           </a:p>
@@ -10217,125 +10400,72 @@
         </p:nvSpPr>
         <p:spPr/>
         <p:txBody>
-          <a:bodyPr>
-            <a:normAutofit lnSpcReduction="10000"/>
-          </a:bodyPr>
+          <a:bodyPr/>
           <a:lstStyle/>
           <a:p>
-            <a:pPr marL="0" indent="0">
-              <a:buNone/>
-            </a:pPr>
-            <a:r>
-              <a:rPr lang="en-US" b="1" dirty="0"/>
-              <a:t>static char </a:t>
-            </a:r>
-            <a:r>
-              <a:rPr lang="en-US" b="1" i="1" dirty="0" err="1"/>
-              <a:t>imaginacaoWumpus</a:t>
-            </a:r>
-            <a:r>
-              <a:rPr lang="en-US" b="1" i="1" dirty="0"/>
-              <a:t>[][] = new char[4][4];</a:t>
-            </a:r>
-          </a:p>
-          <a:p>
-            <a:pPr marL="0" indent="0">
-              <a:buNone/>
-            </a:pPr>
-            <a:r>
-              <a:rPr lang="pt-BR" dirty="0"/>
-              <a:t>// Aqui é uma matriz que mostra a imaginação do Agente, o que o </a:t>
-            </a:r>
             <a:endParaRPr lang="pt-BR" dirty="0" smtClean="0"/>
           </a:p>
           <a:p>
-            <a:pPr marL="0" indent="0">
-              <a:buNone/>
-            </a:pPr>
             <a:r>
               <a:rPr lang="pt-BR" dirty="0" smtClean="0"/>
-              <a:t>// Agente </a:t>
-            </a:r>
-            <a:r>
-              <a:rPr lang="pt-BR" dirty="0"/>
-              <a:t>tem de interpretação do</a:t>
-            </a:r>
-          </a:p>
-          <a:p>
-            <a:pPr marL="0" indent="0">
-              <a:buNone/>
-            </a:pPr>
-            <a:r>
-              <a:rPr lang="pt-BR" dirty="0"/>
-              <a:t>// cenário sobre a localização do </a:t>
-            </a:r>
-            <a:r>
-              <a:rPr lang="pt-BR" dirty="0" err="1"/>
-              <a:t>Wumpus</a:t>
-            </a:r>
-            <a:r>
-              <a:rPr lang="pt-BR" dirty="0"/>
-              <a:t> está aqui!</a:t>
+              <a:t>Entretanto, se as áreas seguras todas já foram visitadas, não resta mais nada para o agente a não ser sortear a sua próxima jogada.</a:t>
             </a:r>
           </a:p>
           <a:p>
             <a:endParaRPr lang="pt-BR" dirty="0"/>
           </a:p>
           <a:p>
-            <a:pPr marL="0" indent="0">
-              <a:buNone/>
-            </a:pPr>
-            <a:r>
-              <a:rPr lang="en-US" b="1" dirty="0"/>
-              <a:t>static char </a:t>
-            </a:r>
-            <a:r>
-              <a:rPr lang="en-US" b="1" i="1" dirty="0" err="1"/>
-              <a:t>imaginacaoPocos</a:t>
-            </a:r>
-            <a:r>
-              <a:rPr lang="en-US" b="1" i="1" dirty="0"/>
-              <a:t>[][] = new char[4][4];</a:t>
-            </a:r>
-          </a:p>
-          <a:p>
-            <a:pPr marL="0" indent="0">
-              <a:buNone/>
-            </a:pPr>
-            <a:r>
-              <a:rPr lang="pt-BR" dirty="0"/>
-              <a:t>// Aqui é uma matriz que mostra a imaginação do Agente, o que o </a:t>
+            <a:r>
+              <a:rPr lang="pt-BR" dirty="0" smtClean="0"/>
+              <a:t>Neste momento, o guerreiro fala:</a:t>
+            </a:r>
+            <a:r>
+              <a:rPr lang="pt-BR" b="1" i="1" dirty="0" smtClean="0"/>
+              <a:t> </a:t>
+            </a:r>
+            <a:r>
+              <a:rPr lang="pt-BR" b="1" i="1" dirty="0"/>
+              <a:t>Neste momento não sei para onde ir</a:t>
+            </a:r>
+            <a:r>
+              <a:rPr lang="pt-BR" b="1" i="1" dirty="0" smtClean="0"/>
+              <a:t>! </a:t>
+            </a:r>
+            <a:r>
+              <a:rPr lang="pt-BR" b="1" i="1" dirty="0"/>
+              <a:t>Vou escolher ao acaso. Então me deseja sorte</a:t>
+            </a:r>
+            <a:r>
+              <a:rPr lang="pt-BR" b="1" i="1" dirty="0" smtClean="0"/>
+              <a:t>.</a:t>
             </a:r>
             <a:endParaRPr lang="pt-BR" dirty="0" smtClean="0"/>
           </a:p>
           <a:p>
-            <a:pPr marL="0" indent="0">
-              <a:buNone/>
-            </a:pPr>
+            <a:endParaRPr lang="pt-BR" b="1" i="1" dirty="0"/>
+          </a:p>
+          <a:p>
+            <a:pPr algn="just"/>
             <a:r>
               <a:rPr lang="pt-BR" dirty="0" smtClean="0"/>
-              <a:t>// Agente </a:t>
-            </a:r>
-            <a:r>
-              <a:rPr lang="pt-BR" dirty="0"/>
-              <a:t>tem de interpretação do</a:t>
-            </a:r>
-          </a:p>
-          <a:p>
-            <a:pPr marL="0" indent="0">
-              <a:buNone/>
-            </a:pPr>
-            <a:r>
-              <a:rPr lang="pt-BR" dirty="0"/>
-              <a:t>// cenário sobre a localização dos poços está aqui!</a:t>
-            </a:r>
+              <a:t>A próxima jogada é sorteada de forma completamente aleatória usando os recursos da classe </a:t>
+            </a:r>
+            <a:r>
+              <a:rPr lang="pt-BR" dirty="0" err="1" smtClean="0"/>
+              <a:t>Random</a:t>
+            </a:r>
+            <a:r>
+              <a:rPr lang="pt-BR" dirty="0" smtClean="0"/>
+              <a:t> da linguagem Java.</a:t>
+            </a:r>
+            <a:endParaRPr lang="pt-BR" dirty="0"/>
           </a:p>
         </p:txBody>
       </p:sp>
     </p:spTree>
     <p:extLst>
       <p:ext uri="{BB962C8B-B14F-4D97-AF65-F5344CB8AC3E}">
-        <p14:creationId xmlns:p14="http://schemas.microsoft.com/office/powerpoint/2010/main" val="581382581"/>
+        <p14:creationId xmlns:p14="http://schemas.microsoft.com/office/powerpoint/2010/main" val="3979793273"/>
       </p:ext>
     </p:extLst>
   </p:cSld>
@@ -10404,82 +10534,138 @@
         </p:nvSpPr>
         <p:spPr/>
         <p:txBody>
-          <a:bodyPr/>
+          <a:bodyPr>
+            <a:normAutofit lnSpcReduction="10000"/>
+          </a:bodyPr>
           <a:lstStyle/>
-          <a:p>
-            <a:endParaRPr lang="en-US" b="1" dirty="0" smtClean="0"/>
-          </a:p>
-          <a:p>
-            <a:r>
-              <a:rPr lang="en-US" b="1" dirty="0" smtClean="0"/>
-              <a:t>static </a:t>
-            </a:r>
-            <a:r>
-              <a:rPr lang="en-US" b="1" dirty="0"/>
-              <a:t>char </a:t>
-            </a:r>
-            <a:r>
-              <a:rPr lang="en-US" b="1" i="1" dirty="0" err="1"/>
-              <a:t>imaginacaoOuro</a:t>
-            </a:r>
-            <a:r>
-              <a:rPr lang="en-US" b="1" i="1" dirty="0"/>
-              <a:t>[][] = new char[4][4</a:t>
-            </a:r>
-            <a:r>
-              <a:rPr lang="en-US" b="1" i="1" dirty="0" smtClean="0"/>
-              <a:t>];</a:t>
-            </a:r>
-          </a:p>
           <a:p>
             <a:pPr marL="0" indent="0">
               <a:buNone/>
             </a:pPr>
             <a:r>
-              <a:rPr lang="pt-BR" dirty="0" smtClean="0"/>
-              <a:t>// </a:t>
-            </a:r>
-            <a:r>
-              <a:rPr lang="pt-BR" dirty="0"/>
-              <a:t>Aqui é uma matriz que mostra a imaginação do Agente, o que o </a:t>
-            </a:r>
-            <a:endParaRPr lang="pt-BR" dirty="0" smtClean="0"/>
+              <a:rPr lang="en-US" b="1" dirty="0"/>
+              <a:t>static char </a:t>
+            </a:r>
+            <a:r>
+              <a:rPr lang="en-US" b="1" i="1" dirty="0" err="1"/>
+              <a:t>imaginacaoWumpus</a:t>
+            </a:r>
+            <a:r>
+              <a:rPr lang="en-US" b="1" i="1" dirty="0"/>
+              <a:t>[][] = new char[4][4];</a:t>
+            </a:r>
           </a:p>
           <a:p>
             <a:pPr marL="0" indent="0">
               <a:buNone/>
             </a:pPr>
             <a:r>
-              <a:rPr lang="pt-BR" dirty="0" smtClean="0"/>
-              <a:t>// Agente </a:t>
-            </a:r>
-            <a:r>
               <a:rPr lang="pt-BR" dirty="0"/>
-              <a:t>tem de interpretação do</a:t>
-            </a:r>
+              <a:t>// Aqui é uma matriz que mostra a imaginação do Agente, o que o </a:t>
+            </a:r>
+            <a:endParaRPr lang="pt-BR" dirty="0" smtClean="0"/>
           </a:p>
           <a:p>
             <a:pPr marL="0" indent="0">
               <a:buNone/>
             </a:pPr>
             <a:r>
+              <a:rPr lang="pt-BR" dirty="0" smtClean="0"/>
+              <a:t>// Agente </a:t>
+            </a:r>
+            <a:r>
               <a:rPr lang="pt-BR" dirty="0"/>
-              <a:t>// cenário sobre a localização do Ouro está aqui!</a:t>
-            </a:r>
+              <a:t>tem de interpretação do</a:t>
+            </a:r>
+          </a:p>
+          <a:p>
+            <a:pPr marL="0" indent="0">
+              <a:buNone/>
+            </a:pPr>
+            <a:r>
+              <a:rPr lang="pt-BR" dirty="0"/>
+              <a:t>// cenário sobre a localização do </a:t>
+            </a:r>
+            <a:r>
+              <a:rPr lang="pt-BR" dirty="0" err="1"/>
+              <a:t>Wumpus</a:t>
+            </a:r>
+            <a:r>
+              <a:rPr lang="pt-BR" dirty="0"/>
+              <a:t> está aqui!</a:t>
+            </a:r>
+          </a:p>
+          <a:p>
             <a:endParaRPr lang="pt-BR" dirty="0"/>
+          </a:p>
+          <a:p>
+            <a:pPr marL="0" indent="0">
+              <a:buNone/>
+            </a:pPr>
+            <a:r>
+              <a:rPr lang="en-US" b="1" dirty="0"/>
+              <a:t>static char </a:t>
+            </a:r>
+            <a:r>
+              <a:rPr lang="en-US" b="1" i="1" dirty="0" err="1"/>
+              <a:t>imaginacaoPocos</a:t>
+            </a:r>
+            <a:r>
+              <a:rPr lang="en-US" b="1" i="1" dirty="0"/>
+              <a:t>[][] = new char[4][4];</a:t>
+            </a:r>
+          </a:p>
+          <a:p>
+            <a:pPr marL="0" indent="0">
+              <a:buNone/>
+            </a:pPr>
+            <a:r>
+              <a:rPr lang="pt-BR" dirty="0"/>
+              <a:t>// Aqui é uma matriz que mostra a imaginação do Agente, o que o </a:t>
+            </a:r>
+            <a:endParaRPr lang="pt-BR" dirty="0" smtClean="0"/>
+          </a:p>
+          <a:p>
+            <a:pPr marL="0" indent="0">
+              <a:buNone/>
+            </a:pPr>
+            <a:r>
+              <a:rPr lang="pt-BR" dirty="0" smtClean="0"/>
+              <a:t>// Agente </a:t>
+            </a:r>
+            <a:r>
+              <a:rPr lang="pt-BR" dirty="0"/>
+              <a:t>tem de interpretação do</a:t>
+            </a:r>
+          </a:p>
+          <a:p>
+            <a:pPr marL="0" indent="0">
+              <a:buNone/>
+            </a:pPr>
+            <a:r>
+              <a:rPr lang="pt-BR" dirty="0"/>
+              <a:t>// cenário sobre a localização dos poços está aqui!</a:t>
+            </a:r>
           </a:p>
         </p:txBody>
       </p:sp>
     </p:spTree>
     <p:extLst>
       <p:ext uri="{BB962C8B-B14F-4D97-AF65-F5344CB8AC3E}">
-        <p14:creationId xmlns:p14="http://schemas.microsoft.com/office/powerpoint/2010/main" val="676650168"/>
+        <p14:creationId xmlns:p14="http://schemas.microsoft.com/office/powerpoint/2010/main" val="581382581"/>
       </p:ext>
     </p:extLst>
   </p:cSld>
   <p:clrMapOvr>
     <a:masterClrMapping/>
   </p:clrMapOvr>
+  <p:timing>
+    <p:tnLst>
+      <p:par>
+        <p:cTn id="1" dur="indefinite" restart="never" nodeType="tmRoot"/>
+      </p:par>
+    </p:tnLst>
+  </p:timing>
 </p:sld>
 </file>
 
@@ -10538,86 +10724,65 @@
           <a:bodyPr/>
           <a:lstStyle/>
           <a:p>
-            <a:pPr algn="just"/>
+            <a:endParaRPr lang="en-US" b="1" dirty="0" smtClean="0"/>
+          </a:p>
+          <a:p>
+            <a:r>
+              <a:rPr lang="en-US" b="1" dirty="0" smtClean="0"/>
+              <a:t>static </a:t>
+            </a:r>
+            <a:r>
+              <a:rPr lang="en-US" b="1" dirty="0"/>
+              <a:t>char </a:t>
+            </a:r>
+            <a:r>
+              <a:rPr lang="en-US" b="1" i="1" dirty="0" err="1"/>
+              <a:t>imaginacaoOuro</a:t>
+            </a:r>
+            <a:r>
+              <a:rPr lang="en-US" b="1" i="1" dirty="0"/>
+              <a:t>[][] = new char[4][4</a:t>
+            </a:r>
+            <a:r>
+              <a:rPr lang="en-US" b="1" i="1" dirty="0" smtClean="0"/>
+              <a:t>];</a:t>
+            </a:r>
+          </a:p>
+          <a:p>
+            <a:pPr marL="0" indent="0">
+              <a:buNone/>
+            </a:pPr>
+            <a:r>
+              <a:rPr lang="pt-BR" dirty="0" smtClean="0"/>
+              <a:t>// </a:t>
+            </a:r>
             <a:r>
               <a:rPr lang="pt-BR" dirty="0"/>
-              <a:t>A lista </a:t>
-            </a:r>
-            <a:r>
-              <a:rPr lang="pt-BR" dirty="0" err="1" smtClean="0"/>
-              <a:t>imaginacaoOuro</a:t>
-            </a:r>
+              <a:t>Aqui é uma matriz que mostra a imaginação do Agente, o que o </a:t>
+            </a:r>
+            <a:endParaRPr lang="pt-BR" dirty="0" smtClean="0"/>
+          </a:p>
+          <a:p>
+            <a:pPr marL="0" indent="0">
+              <a:buNone/>
+            </a:pPr>
             <a:r>
               <a:rPr lang="pt-BR" dirty="0" smtClean="0"/>
-              <a:t> </a:t>
+              <a:t>// Agente </a:t>
             </a:r>
             <a:r>
               <a:rPr lang="pt-BR" dirty="0"/>
-              <a:t>corresponde a uma imaginação simulada virtualmente do agente sobre </a:t>
-            </a:r>
-            <a:r>
-              <a:rPr lang="pt-BR" dirty="0" smtClean="0"/>
-              <a:t>a localização do Ouro.</a:t>
-            </a:r>
-            <a:endParaRPr lang="pt-BR" dirty="0"/>
-          </a:p>
-          <a:p>
-            <a:pPr algn="just"/>
-            <a:endParaRPr lang="pt-BR" dirty="0"/>
-          </a:p>
-          <a:p>
-            <a:pPr algn="just"/>
+              <a:t>tem de interpretação do</a:t>
+            </a:r>
+          </a:p>
+          <a:p>
+            <a:pPr marL="0" indent="0">
+              <a:buNone/>
+            </a:pPr>
             <a:r>
               <a:rPr lang="pt-BR" dirty="0"/>
-              <a:t>A </a:t>
-            </a:r>
-            <a:r>
-              <a:rPr lang="pt-BR" dirty="0" err="1"/>
-              <a:t>imaginacaoWumpus</a:t>
-            </a:r>
-            <a:r>
-              <a:rPr lang="pt-BR" dirty="0"/>
-              <a:t> se beneficia das percepções do agente para tentar tirar a conclusão de onde está o </a:t>
-            </a:r>
-            <a:r>
-              <a:rPr lang="pt-BR" dirty="0" smtClean="0"/>
-              <a:t>Ouro.</a:t>
-            </a:r>
-            <a:endParaRPr lang="pt-BR" dirty="0"/>
-          </a:p>
-          <a:p>
-            <a:pPr algn="just"/>
-            <a:endParaRPr lang="pt-BR" dirty="0"/>
-          </a:p>
-          <a:p>
-            <a:pPr algn="just"/>
-            <a:r>
-              <a:rPr lang="pt-BR" dirty="0"/>
-              <a:t>No momento de descoberta do </a:t>
-            </a:r>
-            <a:r>
-              <a:rPr lang="pt-BR" dirty="0" smtClean="0"/>
-              <a:t>Ouro, </a:t>
-            </a:r>
-            <a:r>
-              <a:rPr lang="pt-BR" dirty="0"/>
-              <a:t>o guerreiro (ou agente) </a:t>
-            </a:r>
-            <a:r>
-              <a:rPr lang="pt-BR" dirty="0" smtClean="0"/>
-              <a:t>fala: </a:t>
-            </a:r>
-            <a:r>
-              <a:rPr lang="pt-BR" b="1" dirty="0"/>
-              <a:t>Eu sei onde está o Ouro. Vou pegá-lo!</a:t>
-            </a:r>
-            <a:r>
-              <a:rPr lang="pt-BR" dirty="0" smtClean="0"/>
-              <a:t>.</a:t>
-            </a:r>
-            <a:endParaRPr lang="pt-BR" dirty="0"/>
-          </a:p>
-          <a:p>
+              <a:t>// cenário sobre a localização do Ouro está aqui!</a:t>
+            </a:r>
             <a:endParaRPr lang="pt-BR" dirty="0"/>
           </a:p>
         </p:txBody>
@@ -10625,7 +10790,7 @@
     </p:spTree>
     <p:extLst>
       <p:ext uri="{BB962C8B-B14F-4D97-AF65-F5344CB8AC3E}">
-        <p14:creationId xmlns:p14="http://schemas.microsoft.com/office/powerpoint/2010/main" val="2613646740"/>
+        <p14:creationId xmlns:p14="http://schemas.microsoft.com/office/powerpoint/2010/main" val="676650168"/>
       </p:ext>
     </p:extLst>
   </p:cSld>
@@ -10690,76 +10855,86 @@
           <a:bodyPr/>
           <a:lstStyle/>
           <a:p>
-            <a:endParaRPr lang="pt-BR" dirty="0" smtClean="0"/>
-          </a:p>
-          <a:p>
             <a:pPr algn="just"/>
             <a:r>
+              <a:rPr lang="pt-BR" dirty="0"/>
+              <a:t>A lista </a:t>
+            </a:r>
+            <a:r>
+              <a:rPr lang="pt-BR" dirty="0" err="1" smtClean="0"/>
+              <a:t>imaginacaoOuro</a:t>
+            </a:r>
+            <a:r>
               <a:rPr lang="pt-BR" dirty="0" smtClean="0"/>
-              <a:t>A lista </a:t>
-            </a:r>
-            <a:r>
-              <a:rPr lang="pt-BR" dirty="0" err="1" smtClean="0"/>
+              <a:t> </a:t>
+            </a:r>
+            <a:r>
+              <a:rPr lang="pt-BR" dirty="0"/>
+              <a:t>corresponde a uma imaginação simulada virtualmente do agente sobre </a:t>
+            </a:r>
+            <a:r>
+              <a:rPr lang="pt-BR" dirty="0" smtClean="0"/>
+              <a:t>a localização do Ouro.</a:t>
+            </a:r>
+            <a:endParaRPr lang="pt-BR" dirty="0"/>
+          </a:p>
+          <a:p>
+            <a:pPr algn="just"/>
+            <a:endParaRPr lang="pt-BR" dirty="0"/>
+          </a:p>
+          <a:p>
+            <a:pPr algn="just"/>
+            <a:r>
+              <a:rPr lang="pt-BR" dirty="0"/>
+              <a:t>A </a:t>
+            </a:r>
+            <a:r>
+              <a:rPr lang="pt-BR" dirty="0" err="1"/>
               <a:t>imaginacaoWumpus</a:t>
             </a:r>
             <a:r>
+              <a:rPr lang="pt-BR" dirty="0"/>
+              <a:t> se beneficia das percepções do agente para tentar tirar a conclusão de onde está o </a:t>
+            </a:r>
+            <a:r>
               <a:rPr lang="pt-BR" dirty="0" smtClean="0"/>
-              <a:t> corresponde a uma imaginação simulada virtualmente do agente sobre o </a:t>
-            </a:r>
-            <a:r>
-              <a:rPr lang="pt-BR" dirty="0" err="1" smtClean="0"/>
-              <a:t>Wumpus</a:t>
+              <a:t>Ouro.</a:t>
+            </a:r>
+            <a:endParaRPr lang="pt-BR" dirty="0"/>
+          </a:p>
+          <a:p>
+            <a:pPr algn="just"/>
+            <a:endParaRPr lang="pt-BR" dirty="0"/>
+          </a:p>
+          <a:p>
+            <a:pPr algn="just"/>
+            <a:r>
+              <a:rPr lang="pt-BR" dirty="0"/>
+              <a:t>No momento de descoberta do </a:t>
+            </a:r>
+            <a:r>
+              <a:rPr lang="pt-BR" dirty="0" smtClean="0"/>
+              <a:t>Ouro, </a:t>
+            </a:r>
+            <a:r>
+              <a:rPr lang="pt-BR" dirty="0"/>
+              <a:t>o guerreiro (ou agente) </a:t>
+            </a:r>
+            <a:r>
+              <a:rPr lang="pt-BR" dirty="0" smtClean="0"/>
+              <a:t>fala: </a:t>
+            </a:r>
+            <a:r>
+              <a:rPr lang="pt-BR" b="1" dirty="0"/>
+              <a:t>Eu sei onde está o Ouro. Vou pegá-lo!</a:t>
             </a:r>
             <a:r>
               <a:rPr lang="pt-BR" dirty="0" smtClean="0"/>
               <a:t>.</a:t>
             </a:r>
-          </a:p>
-          <a:p>
-            <a:pPr algn="just"/>
-            <a:endParaRPr lang="pt-BR" dirty="0" smtClean="0"/>
-          </a:p>
-          <a:p>
-            <a:pPr algn="just"/>
-            <a:r>
-              <a:rPr lang="pt-BR" dirty="0" smtClean="0"/>
-              <a:t>A </a:t>
-            </a:r>
-            <a:r>
-              <a:rPr lang="pt-BR" dirty="0" err="1" smtClean="0"/>
-              <a:t>imaginacaoWumpus</a:t>
-            </a:r>
-            <a:r>
-              <a:rPr lang="pt-BR" dirty="0" smtClean="0"/>
-              <a:t> se beneficia das percepções do agente para tentar tirar a conclusão de onde está o </a:t>
-            </a:r>
-            <a:r>
-              <a:rPr lang="pt-BR" dirty="0" err="1" smtClean="0"/>
-              <a:t>Wumpus</a:t>
-            </a:r>
-            <a:r>
-              <a:rPr lang="pt-BR" dirty="0" smtClean="0"/>
-              <a:t>.</a:t>
-            </a:r>
-          </a:p>
-          <a:p>
-            <a:pPr algn="just"/>
             <a:endParaRPr lang="pt-BR" dirty="0"/>
           </a:p>
           <a:p>
-            <a:pPr algn="just"/>
-            <a:r>
-              <a:rPr lang="pt-BR" dirty="0" smtClean="0"/>
-              <a:t>No momento de descoberta do </a:t>
-            </a:r>
-            <a:r>
-              <a:rPr lang="pt-BR" dirty="0" err="1" smtClean="0"/>
-              <a:t>Wumpus</a:t>
-            </a:r>
-            <a:r>
-              <a:rPr lang="pt-BR" dirty="0" smtClean="0"/>
-              <a:t>, o guerreiro (ou agente) ataca com a flecha.</a:t>
-            </a:r>
             <a:endParaRPr lang="pt-BR" dirty="0"/>
           </a:p>
         </p:txBody>
@@ -10767,20 +10942,13 @@
     </p:spTree>
     <p:extLst>
       <p:ext uri="{BB962C8B-B14F-4D97-AF65-F5344CB8AC3E}">
-        <p14:creationId xmlns:p14="http://schemas.microsoft.com/office/powerpoint/2010/main" val="3185484214"/>
+        <p14:creationId xmlns:p14="http://schemas.microsoft.com/office/powerpoint/2010/main" val="2613646740"/>
       </p:ext>
     </p:extLst>
   </p:cSld>
   <p:clrMapOvr>
     <a:masterClrMapping/>
   </p:clrMapOvr>
-  <p:timing>
-    <p:tnLst>
-      <p:par>
-        <p:cTn id="1" dur="indefinite" restart="never" nodeType="tmRoot"/>
-      </p:par>
-    </p:tnLst>
-  </p:timing>
 </p:sld>
 </file>
 
@@ -10842,27 +11010,72 @@
             <a:endParaRPr lang="pt-BR" dirty="0" smtClean="0"/>
           </a:p>
           <a:p>
+            <a:pPr algn="just"/>
             <a:r>
               <a:rPr lang="pt-BR" dirty="0" smtClean="0"/>
-              <a:t>Já a lista </a:t>
+              <a:t>A lista </a:t>
             </a:r>
             <a:r>
               <a:rPr lang="pt-BR" dirty="0" err="1" smtClean="0"/>
-              <a:t>imaginacaoPocos</a:t>
+              <a:t>imaginacaoWumpus</a:t>
             </a:r>
             <a:r>
               <a:rPr lang="pt-BR" dirty="0" smtClean="0"/>
-              <a:t> fica responsável por tentar identificar onde ficam os poços do cenário, a partir das percepções do agente.</a:t>
-            </a:r>
-          </a:p>
-          <a:p>
+              <a:t> corresponde a uma imaginação simulada virtualmente do agente sobre o </a:t>
+            </a:r>
+            <a:r>
+              <a:rPr lang="pt-BR" dirty="0" err="1" smtClean="0"/>
+              <a:t>Wumpus</a:t>
+            </a:r>
+            <a:r>
+              <a:rPr lang="pt-BR" dirty="0" smtClean="0"/>
+              <a:t>.</a:t>
+            </a:r>
+          </a:p>
+          <a:p>
+            <a:pPr algn="just"/>
+            <a:endParaRPr lang="pt-BR" dirty="0" smtClean="0"/>
+          </a:p>
+          <a:p>
+            <a:pPr algn="just"/>
+            <a:r>
+              <a:rPr lang="pt-BR" dirty="0" smtClean="0"/>
+              <a:t>A </a:t>
+            </a:r>
+            <a:r>
+              <a:rPr lang="pt-BR" dirty="0" err="1" smtClean="0"/>
+              <a:t>imaginacaoWumpus</a:t>
+            </a:r>
+            <a:r>
+              <a:rPr lang="pt-BR" dirty="0" smtClean="0"/>
+              <a:t> se beneficia das percepções do agente para tentar tirar a conclusão de onde está o </a:t>
+            </a:r>
+            <a:r>
+              <a:rPr lang="pt-BR" dirty="0" err="1" smtClean="0"/>
+              <a:t>Wumpus</a:t>
+            </a:r>
+            <a:r>
+              <a:rPr lang="pt-BR" dirty="0" smtClean="0"/>
+              <a:t>.</a:t>
+            </a:r>
+          </a:p>
+          <a:p>
+            <a:pPr algn="just"/>
             <a:endParaRPr lang="pt-BR" dirty="0"/>
           </a:p>
           <a:p>
             <a:pPr algn="just"/>
             <a:r>
               <a:rPr lang="pt-BR" dirty="0" smtClean="0"/>
-              <a:t>Além desta identificação, essas áreas ficam sendo consideradas áreas perigosas, desta forma, o agente não pode visita-las, a não ser em casos excepcionais (quando não houver nenhuma possibilidade).</a:t>
+              <a:t>No momento de descoberta do </a:t>
+            </a:r>
+            <a:r>
+              <a:rPr lang="pt-BR" dirty="0" err="1" smtClean="0"/>
+              <a:t>Wumpus</a:t>
+            </a:r>
+            <a:r>
+              <a:rPr lang="pt-BR" dirty="0" smtClean="0"/>
+              <a:t>, o guerreiro (ou agente) ataca com a flecha.</a:t>
             </a:r>
             <a:endParaRPr lang="pt-BR" dirty="0"/>
           </a:p>
@@ -10871,7 +11084,7 @@
     </p:spTree>
     <p:extLst>
       <p:ext uri="{BB962C8B-B14F-4D97-AF65-F5344CB8AC3E}">
-        <p14:creationId xmlns:p14="http://schemas.microsoft.com/office/powerpoint/2010/main" val="830079334"/>
+        <p14:creationId xmlns:p14="http://schemas.microsoft.com/office/powerpoint/2010/main" val="3185484214"/>
       </p:ext>
     </p:extLst>
   </p:cSld>
@@ -10940,201 +11153,42 @@
         </p:nvSpPr>
         <p:spPr/>
         <p:txBody>
-          <a:bodyPr>
-            <a:normAutofit fontScale="85000" lnSpcReduction="20000"/>
-          </a:bodyPr>
+          <a:bodyPr/>
           <a:lstStyle/>
           <a:p>
-            <a:pPr marL="0" indent="0">
-              <a:buNone/>
-            </a:pPr>
-            <a:r>
-              <a:rPr lang="en-US" b="1" dirty="0"/>
-              <a:t>static </a:t>
-            </a:r>
-            <a:r>
-              <a:rPr lang="en-US" b="1" dirty="0" err="1"/>
-              <a:t>ArrayList</a:t>
-            </a:r>
-            <a:r>
-              <a:rPr lang="en-US" b="1" dirty="0"/>
-              <a:t>&lt;Position&gt; </a:t>
-            </a:r>
-            <a:r>
-              <a:rPr lang="en-US" b="1" i="1" dirty="0" err="1"/>
-              <a:t>areas_visitadas</a:t>
-            </a:r>
-            <a:r>
-              <a:rPr lang="en-US" b="1" i="1" dirty="0"/>
-              <a:t> = new </a:t>
-            </a:r>
-            <a:r>
-              <a:rPr lang="en-US" b="1" i="1" dirty="0" err="1"/>
-              <a:t>ArrayList</a:t>
-            </a:r>
-            <a:r>
-              <a:rPr lang="en-US" b="1" i="1" dirty="0"/>
-              <a:t>&lt;Position&gt;();</a:t>
-            </a:r>
-          </a:p>
-          <a:p>
-            <a:pPr marL="0" indent="0">
-              <a:buNone/>
-            </a:pPr>
-            <a:r>
-              <a:rPr lang="pt-BR" dirty="0"/>
-              <a:t>// Aqui são armazenadas as áreas já visitadas pelo agente.</a:t>
+            <a:endParaRPr lang="pt-BR" dirty="0" smtClean="0"/>
+          </a:p>
+          <a:p>
+            <a:r>
+              <a:rPr lang="pt-BR" dirty="0" smtClean="0"/>
+              <a:t>Já a lista </a:t>
+            </a:r>
+            <a:r>
+              <a:rPr lang="pt-BR" dirty="0" err="1" smtClean="0"/>
+              <a:t>imaginacaoPocos</a:t>
+            </a:r>
+            <a:r>
+              <a:rPr lang="pt-BR" dirty="0" smtClean="0"/>
+              <a:t> fica responsável por tentar identificar onde ficam os poços do cenário, a partir das percepções do agente.</a:t>
             </a:r>
           </a:p>
           <a:p>
             <a:endParaRPr lang="pt-BR" dirty="0"/>
           </a:p>
           <a:p>
-            <a:pPr marL="0" indent="0">
-              <a:buNone/>
-            </a:pPr>
-            <a:r>
-              <a:rPr lang="en-US" b="1" dirty="0"/>
-              <a:t>static </a:t>
-            </a:r>
-            <a:r>
-              <a:rPr lang="en-US" b="1" dirty="0" err="1"/>
-              <a:t>ArrayList</a:t>
-            </a:r>
-            <a:r>
-              <a:rPr lang="en-US" b="1" dirty="0"/>
-              <a:t>&lt;Position&gt; </a:t>
-            </a:r>
-            <a:r>
-              <a:rPr lang="en-US" b="1" i="1" dirty="0" err="1"/>
-              <a:t>areas_perigosas</a:t>
-            </a:r>
-            <a:r>
-              <a:rPr lang="en-US" b="1" i="1" dirty="0"/>
-              <a:t> = new </a:t>
-            </a:r>
-            <a:r>
-              <a:rPr lang="en-US" b="1" i="1" dirty="0" err="1"/>
-              <a:t>ArrayList</a:t>
-            </a:r>
-            <a:r>
-              <a:rPr lang="en-US" b="1" i="1" dirty="0"/>
-              <a:t>&lt;Position&gt;();</a:t>
-            </a:r>
-          </a:p>
-          <a:p>
-            <a:pPr marL="0" indent="0">
-              <a:buNone/>
-            </a:pPr>
-            <a:r>
-              <a:rPr lang="pt-BR" dirty="0"/>
-              <a:t>// Aqui são armazenadas áreas perigosas descobertas pelo agente.</a:t>
-            </a:r>
-          </a:p>
-          <a:p>
+            <a:pPr algn="just"/>
+            <a:r>
+              <a:rPr lang="pt-BR" dirty="0" smtClean="0"/>
+              <a:t>Além desta identificação, essas áreas ficam sendo consideradas áreas perigosas, desta forma, o agente não pode visita-las, a não ser em casos excepcionais (quando não houver nenhuma possibilidade).</a:t>
+            </a:r>
             <a:endParaRPr lang="pt-BR" dirty="0"/>
-          </a:p>
-          <a:p>
-            <a:pPr marL="0" indent="0">
-              <a:buNone/>
-            </a:pPr>
-            <a:r>
-              <a:rPr lang="en-US" b="1" dirty="0"/>
-              <a:t>static </a:t>
-            </a:r>
-            <a:r>
-              <a:rPr lang="en-US" b="1" dirty="0" err="1"/>
-              <a:t>ArrayList</a:t>
-            </a:r>
-            <a:r>
-              <a:rPr lang="en-US" b="1" dirty="0"/>
-              <a:t>&lt;Position&gt; </a:t>
-            </a:r>
-            <a:r>
-              <a:rPr lang="en-US" b="1" i="1" dirty="0" err="1"/>
-              <a:t>areas_seguras</a:t>
-            </a:r>
-            <a:r>
-              <a:rPr lang="en-US" b="1" i="1" dirty="0"/>
-              <a:t> = new </a:t>
-            </a:r>
-            <a:r>
-              <a:rPr lang="en-US" b="1" i="1" dirty="0" err="1"/>
-              <a:t>ArrayList</a:t>
-            </a:r>
-            <a:r>
-              <a:rPr lang="en-US" b="1" i="1" dirty="0"/>
-              <a:t>&lt;Position&gt;();</a:t>
-            </a:r>
-          </a:p>
-          <a:p>
-            <a:pPr marL="0" indent="0">
-              <a:buNone/>
-            </a:pPr>
-            <a:r>
-              <a:rPr lang="pt-BR" dirty="0"/>
-              <a:t>// Aqui ficam as áreas consideradas seguras para o agente.</a:t>
-            </a:r>
-          </a:p>
-          <a:p>
-            <a:endParaRPr lang="pt-BR" dirty="0"/>
-          </a:p>
-          <a:p>
-            <a:pPr marL="0" indent="0">
-              <a:buNone/>
-            </a:pPr>
-            <a:r>
-              <a:rPr lang="en-US" b="1" dirty="0"/>
-              <a:t>static </a:t>
-            </a:r>
-            <a:r>
-              <a:rPr lang="en-US" b="1" dirty="0" err="1"/>
-              <a:t>ArrayList</a:t>
-            </a:r>
-            <a:r>
-              <a:rPr lang="en-US" b="1" dirty="0"/>
-              <a:t>&lt;Position&gt; </a:t>
-            </a:r>
-            <a:r>
-              <a:rPr lang="en-US" b="1" i="1" dirty="0" err="1"/>
-              <a:t>areas_possiveis</a:t>
-            </a:r>
-            <a:r>
-              <a:rPr lang="en-US" b="1" i="1" dirty="0"/>
-              <a:t> = new </a:t>
-            </a:r>
-            <a:r>
-              <a:rPr lang="en-US" b="1" i="1" dirty="0" err="1"/>
-              <a:t>ArrayList</a:t>
-            </a:r>
-            <a:r>
-              <a:rPr lang="en-US" b="1" i="1" dirty="0"/>
-              <a:t>&lt;Position&gt;();</a:t>
-            </a:r>
-          </a:p>
-          <a:p>
-            <a:pPr marL="0" indent="0">
-              <a:buNone/>
-            </a:pPr>
-            <a:r>
-              <a:rPr lang="pt-BR" dirty="0"/>
-              <a:t>// Neste </a:t>
-            </a:r>
-            <a:r>
-              <a:rPr lang="pt-BR" dirty="0" err="1"/>
-              <a:t>array</a:t>
-            </a:r>
-            <a:r>
-              <a:rPr lang="pt-BR" dirty="0"/>
-              <a:t> ficam as possíveis jogadas ou movimentos do agente.</a:t>
-            </a:r>
           </a:p>
         </p:txBody>
       </p:sp>
     </p:spTree>
     <p:extLst>
       <p:ext uri="{BB962C8B-B14F-4D97-AF65-F5344CB8AC3E}">
-        <p14:creationId xmlns:p14="http://schemas.microsoft.com/office/powerpoint/2010/main" val="1698051050"/>
+        <p14:creationId xmlns:p14="http://schemas.microsoft.com/office/powerpoint/2010/main" val="830079334"/>
       </p:ext>
     </p:extLst>
   </p:cSld>
@@ -11203,60 +11257,193 @@
         </p:nvSpPr>
         <p:spPr/>
         <p:txBody>
-          <a:bodyPr/>
+          <a:bodyPr>
+            <a:normAutofit fontScale="85000" lnSpcReduction="20000"/>
+          </a:bodyPr>
           <a:lstStyle/>
           <a:p>
-            <a:r>
-              <a:rPr lang="pt-BR" dirty="0" smtClean="0"/>
-              <a:t>Situações que ocorre a criação de áreas perigosas:</a:t>
-            </a:r>
-          </a:p>
-          <a:p>
-            <a:endParaRPr lang="pt-BR" dirty="0"/>
-          </a:p>
-          <a:p>
-            <a:pPr lvl="2">
-              <a:buFont typeface="Wingdings" panose="05000000000000000000" pitchFamily="2" charset="2"/>
-              <a:buChar char="q"/>
-            </a:pPr>
-            <a:r>
-              <a:rPr lang="pt-BR" dirty="0" smtClean="0"/>
-              <a:t> Quando o guerreiro encontra um fedor;</a:t>
-            </a:r>
-          </a:p>
-          <a:p>
-            <a:pPr lvl="2">
-              <a:buFont typeface="Wingdings" panose="05000000000000000000" pitchFamily="2" charset="2"/>
-              <a:buChar char="q"/>
-            </a:pPr>
-            <a:r>
-              <a:rPr lang="pt-BR" dirty="0"/>
-              <a:t> </a:t>
-            </a:r>
-            <a:r>
-              <a:rPr lang="pt-BR" dirty="0" smtClean="0"/>
-              <a:t>Quando o guerreiro encontra uma brisa.</a:t>
-            </a:r>
-          </a:p>
-          <a:p>
-            <a:pPr marL="914400" lvl="2" indent="0">
+            <a:pPr marL="0" indent="0">
               <a:buNone/>
             </a:pPr>
-            <a:endParaRPr lang="pt-BR" dirty="0" smtClean="0"/>
-          </a:p>
-          <a:p>
-            <a:pPr marL="0" lvl="2" indent="0" algn="just">
+            <a:r>
+              <a:rPr lang="en-US" b="1" dirty="0"/>
+              <a:t>static </a:t>
+            </a:r>
+            <a:r>
+              <a:rPr lang="en-US" b="1" dirty="0" err="1"/>
+              <a:t>ArrayList</a:t>
+            </a:r>
+            <a:r>
+              <a:rPr lang="en-US" b="1" dirty="0"/>
+              <a:t>&lt;Position&gt; </a:t>
+            </a:r>
+            <a:r>
+              <a:rPr lang="en-US" b="1" i="1" dirty="0" err="1"/>
+              <a:t>areas_visitadas</a:t>
+            </a:r>
+            <a:r>
+              <a:rPr lang="en-US" b="1" i="1" dirty="0"/>
+              <a:t> = new </a:t>
+            </a:r>
+            <a:r>
+              <a:rPr lang="en-US" b="1" i="1" dirty="0" err="1"/>
+              <a:t>ArrayList</a:t>
+            </a:r>
+            <a:r>
+              <a:rPr lang="en-US" b="1" i="1" dirty="0"/>
+              <a:t>&lt;Position&gt;();</a:t>
+            </a:r>
+          </a:p>
+          <a:p>
+            <a:pPr marL="0" indent="0">
               <a:buNone/>
             </a:pPr>
-            <a:endParaRPr lang="pt-BR" sz="2800" dirty="0" smtClean="0"/>
-          </a:p>
-          <a:p>
-            <a:pPr marL="0" lvl="2" indent="0" algn="just">
+            <a:r>
+              <a:rPr lang="pt-BR" dirty="0"/>
+              <a:t>// Aqui são armazenadas as áreas já visitadas pelo agente.</a:t>
+            </a:r>
+          </a:p>
+          <a:p>
+            <a:endParaRPr lang="pt-BR" dirty="0"/>
+          </a:p>
+          <a:p>
+            <a:pPr marL="0" indent="0">
               <a:buNone/>
             </a:pPr>
             <a:r>
-              <a:rPr lang="pt-BR" sz="2800" dirty="0" smtClean="0"/>
-              <a:t>Nestas situações, o algoritmo cria áreas perigosas, ou melhor dizendo, áreas suspeitas de perigo em que o guerreiro não vai arriscar entrar nestas, a não ser que não exista qualquer outra possibilidade.</a:t>
+              <a:rPr lang="en-US" b="1" dirty="0"/>
+              <a:t>static </a:t>
+            </a:r>
+            <a:r>
+              <a:rPr lang="en-US" b="1" dirty="0" err="1"/>
+              <a:t>ArrayList</a:t>
+            </a:r>
+            <a:r>
+              <a:rPr lang="en-US" b="1" dirty="0"/>
+              <a:t>&lt;Position&gt; </a:t>
+            </a:r>
+            <a:r>
+              <a:rPr lang="en-US" b="1" i="1" dirty="0" err="1"/>
+              <a:t>areas_perigosas</a:t>
+            </a:r>
+            <a:r>
+              <a:rPr lang="en-US" b="1" i="1" dirty="0"/>
+              <a:t> = new </a:t>
+            </a:r>
+            <a:r>
+              <a:rPr lang="en-US" b="1" i="1" dirty="0" err="1"/>
+              <a:t>ArrayList</a:t>
+            </a:r>
+            <a:r>
+              <a:rPr lang="en-US" b="1" i="1" dirty="0"/>
+              <a:t>&lt;Position&gt;();</a:t>
+            </a:r>
+          </a:p>
+          <a:p>
+            <a:pPr marL="0" indent="0">
+              <a:buNone/>
+            </a:pPr>
+            <a:r>
+              <a:rPr lang="pt-BR" dirty="0"/>
+              <a:t>// Aqui são armazenadas áreas perigosas descobertas pelo agente.</a:t>
+            </a:r>
+          </a:p>
+          <a:p>
+            <a:endParaRPr lang="pt-BR" dirty="0"/>
+          </a:p>
+          <a:p>
+            <a:pPr marL="0" indent="0">
+              <a:buNone/>
+            </a:pPr>
+            <a:r>
+              <a:rPr lang="en-US" b="1" dirty="0"/>
+              <a:t>static </a:t>
+            </a:r>
+            <a:r>
+              <a:rPr lang="en-US" b="1" dirty="0" err="1"/>
+              <a:t>ArrayList</a:t>
+            </a:r>
+            <a:r>
+              <a:rPr lang="en-US" b="1" dirty="0"/>
+              <a:t>&lt;Position&gt; </a:t>
+            </a:r>
+            <a:r>
+              <a:rPr lang="en-US" b="1" i="1" dirty="0" err="1"/>
+              <a:t>areas_seguras</a:t>
+            </a:r>
+            <a:r>
+              <a:rPr lang="en-US" b="1" i="1" dirty="0"/>
+              <a:t> = new </a:t>
+            </a:r>
+            <a:r>
+              <a:rPr lang="en-US" b="1" i="1" dirty="0" err="1"/>
+              <a:t>ArrayList</a:t>
+            </a:r>
+            <a:r>
+              <a:rPr lang="en-US" b="1" i="1" dirty="0"/>
+              <a:t>&lt;Position&gt;();</a:t>
+            </a:r>
+          </a:p>
+          <a:p>
+            <a:pPr marL="0" indent="0">
+              <a:buNone/>
+            </a:pPr>
+            <a:r>
+              <a:rPr lang="pt-BR" dirty="0"/>
+              <a:t>// Aqui ficam as áreas consideradas seguras para o agente.</a:t>
+            </a:r>
+          </a:p>
+          <a:p>
+            <a:endParaRPr lang="pt-BR" dirty="0"/>
+          </a:p>
+          <a:p>
+            <a:pPr marL="0" indent="0">
+              <a:buNone/>
+            </a:pPr>
+            <a:r>
+              <a:rPr lang="en-US" b="1" dirty="0"/>
+              <a:t>static </a:t>
+            </a:r>
+            <a:r>
+              <a:rPr lang="en-US" b="1" dirty="0" err="1"/>
+              <a:t>ArrayList</a:t>
+            </a:r>
+            <a:r>
+              <a:rPr lang="en-US" b="1" dirty="0"/>
+              <a:t>&lt;Position&gt; </a:t>
+            </a:r>
+            <a:r>
+              <a:rPr lang="en-US" b="1" i="1" dirty="0" err="1"/>
+              <a:t>areas_possiveis</a:t>
+            </a:r>
+            <a:r>
+              <a:rPr lang="en-US" b="1" i="1" dirty="0"/>
+              <a:t> = new </a:t>
+            </a:r>
+            <a:r>
+              <a:rPr lang="en-US" b="1" i="1" dirty="0" err="1"/>
+              <a:t>ArrayList</a:t>
+            </a:r>
+            <a:r>
+              <a:rPr lang="en-US" b="1" i="1" dirty="0"/>
+              <a:t>&lt;Position&gt;();</a:t>
+            </a:r>
+          </a:p>
+          <a:p>
+            <a:pPr marL="0" indent="0">
+              <a:buNone/>
+            </a:pPr>
+            <a:r>
+              <a:rPr lang="pt-BR" dirty="0"/>
+              <a:t>// Neste </a:t>
+            </a:r>
+            <a:r>
+              <a:rPr lang="pt-BR" dirty="0" err="1"/>
+              <a:t>array</a:t>
+            </a:r>
+            <a:r>
+              <a:rPr lang="pt-BR" dirty="0"/>
+              <a:t> ficam as possíveis jogadas ou movimentos do agente.</a:t>
             </a:r>
           </a:p>
         </p:txBody>
@@ -11264,7 +11451,7 @@
     </p:spTree>
     <p:extLst>
       <p:ext uri="{BB962C8B-B14F-4D97-AF65-F5344CB8AC3E}">
-        <p14:creationId xmlns:p14="http://schemas.microsoft.com/office/powerpoint/2010/main" val="3128287076"/>
+        <p14:creationId xmlns:p14="http://schemas.microsoft.com/office/powerpoint/2010/main" val="1698051050"/>
       </p:ext>
     </p:extLst>
   </p:cSld>
@@ -11315,7 +11502,7 @@
           <a:p>
             <a:r>
               <a:rPr lang="pt-BR" dirty="0" smtClean="0"/>
-              <a:t>Funções de Execução</a:t>
+              <a:t>Estruturas auxiliares</a:t>
             </a:r>
             <a:endParaRPr lang="pt-BR" dirty="0"/>
           </a:p>
@@ -11336,107 +11523,65 @@
           <a:bodyPr/>
           <a:lstStyle/>
           <a:p>
-            <a:endParaRPr lang="pt-BR" dirty="0" smtClean="0"/>
-          </a:p>
-          <a:p>
-            <a:pPr marL="0" indent="0" algn="just">
+            <a:r>
+              <a:rPr lang="pt-BR" dirty="0" smtClean="0"/>
+              <a:t>Situações que ocorre a criação de áreas perigosas:</a:t>
+            </a:r>
+          </a:p>
+          <a:p>
+            <a:endParaRPr lang="pt-BR" dirty="0"/>
+          </a:p>
+          <a:p>
+            <a:pPr lvl="2">
+              <a:buFont typeface="Wingdings" panose="05000000000000000000" pitchFamily="2" charset="2"/>
+              <a:buChar char="q"/>
+            </a:pPr>
+            <a:r>
+              <a:rPr lang="pt-BR" dirty="0" smtClean="0"/>
+              <a:t> Quando o guerreiro encontra um fedor;</a:t>
+            </a:r>
+          </a:p>
+          <a:p>
+            <a:pPr lvl="2">
+              <a:buFont typeface="Wingdings" panose="05000000000000000000" pitchFamily="2" charset="2"/>
+              <a:buChar char="q"/>
+            </a:pPr>
+            <a:r>
+              <a:rPr lang="pt-BR" dirty="0"/>
+              <a:t> </a:t>
+            </a:r>
+            <a:r>
+              <a:rPr lang="pt-BR" dirty="0" smtClean="0"/>
+              <a:t>Quando o guerreiro encontra uma brisa.</a:t>
+            </a:r>
+          </a:p>
+          <a:p>
+            <a:pPr marL="914400" lvl="2" indent="0">
               <a:buNone/>
             </a:pPr>
-            <a:r>
-              <a:rPr lang="pt-BR" dirty="0"/>
-              <a:t>// Esta função fica responsável por atualizar o </a:t>
-            </a:r>
-            <a:r>
-              <a:rPr lang="pt-BR" dirty="0" smtClean="0"/>
-              <a:t>status (medida de </a:t>
-            </a:r>
-          </a:p>
-          <a:p>
-            <a:pPr marL="0" indent="0" algn="just">
+            <a:endParaRPr lang="pt-BR" dirty="0" smtClean="0"/>
+          </a:p>
+          <a:p>
+            <a:pPr marL="0" lvl="2" indent="0" algn="just">
               <a:buNone/>
             </a:pPr>
-            <a:r>
-              <a:rPr lang="pt-BR" dirty="0" smtClean="0"/>
-              <a:t>// desempenho) </a:t>
-            </a:r>
-            <a:r>
-              <a:rPr lang="pt-BR" dirty="0"/>
-              <a:t>do jogo</a:t>
-            </a:r>
-            <a:r>
-              <a:rPr lang="pt-BR" dirty="0" smtClean="0"/>
-              <a:t>.</a:t>
-            </a:r>
-          </a:p>
-          <a:p>
-            <a:pPr marL="0" indent="0">
+            <a:endParaRPr lang="pt-BR" sz="2800" dirty="0" smtClean="0"/>
+          </a:p>
+          <a:p>
+            <a:pPr marL="0" lvl="2" indent="0" algn="just">
               <a:buNone/>
             </a:pPr>
             <a:r>
-              <a:rPr lang="pt-BR" dirty="0"/>
-              <a:t>// Além de verificar se o guerreiro encontrou o ouro (teste de objetivo</a:t>
-            </a:r>
-            <a:r>
-              <a:rPr lang="pt-BR" dirty="0" smtClean="0"/>
-              <a:t>).</a:t>
-            </a:r>
-          </a:p>
-          <a:p>
-            <a:pPr marL="0" indent="0">
-              <a:buNone/>
-            </a:pPr>
-            <a:endParaRPr lang="pt-BR" dirty="0"/>
-          </a:p>
-          <a:p>
-            <a:pPr marL="0" indent="0">
-              <a:buNone/>
-            </a:pPr>
-            <a:r>
-              <a:rPr lang="en-US" b="1" dirty="0"/>
-              <a:t>public static </a:t>
-            </a:r>
-            <a:r>
-              <a:rPr lang="en-US" b="1" dirty="0" err="1"/>
-              <a:t>boolean</a:t>
-            </a:r>
-            <a:r>
-              <a:rPr lang="en-US" b="1" dirty="0"/>
-              <a:t> verify(char </a:t>
-            </a:r>
-            <a:r>
-              <a:rPr lang="en-US" b="1" dirty="0" err="1"/>
-              <a:t>ambiente</a:t>
-            </a:r>
-            <a:r>
-              <a:rPr lang="en-US" b="1" dirty="0" smtClean="0"/>
-              <a:t>[][]){</a:t>
-            </a:r>
-          </a:p>
-          <a:p>
-            <a:pPr marL="0" indent="0">
-              <a:buNone/>
-            </a:pPr>
-            <a:r>
-              <a:rPr lang="en-US" b="1" dirty="0" smtClean="0"/>
-              <a:t>…</a:t>
-            </a:r>
-          </a:p>
-          <a:p>
-            <a:pPr marL="0" indent="0">
-              <a:buNone/>
-            </a:pPr>
-            <a:r>
-              <a:rPr lang="en-US" b="1" dirty="0"/>
-              <a:t>}</a:t>
-            </a:r>
-            <a:endParaRPr lang="pt-BR" dirty="0"/>
+              <a:rPr lang="pt-BR" sz="2800" dirty="0" smtClean="0"/>
+              <a:t>Nestas situações, o algoritmo cria áreas perigosas, ou melhor dizendo, áreas suspeitas de perigo em que o guerreiro não vai arriscar entrar nestas, a não ser que não exista qualquer outra possibilidade.</a:t>
+            </a:r>
           </a:p>
         </p:txBody>
       </p:sp>
     </p:spTree>
     <p:extLst>
       <p:ext uri="{BB962C8B-B14F-4D97-AF65-F5344CB8AC3E}">
-        <p14:creationId xmlns:p14="http://schemas.microsoft.com/office/powerpoint/2010/main" val="3867417413"/>
+        <p14:creationId xmlns:p14="http://schemas.microsoft.com/office/powerpoint/2010/main" val="3128287076"/>
       </p:ext>
     </p:extLst>
   </p:cSld>
@@ -11619,6 +11764,178 @@
       </p:grpSpPr>
       <p:sp>
         <p:nvSpPr>
+          <p:cNvPr id="2" name="Título 1"/>
+          <p:cNvSpPr>
+            <a:spLocks noGrp="1"/>
+          </p:cNvSpPr>
+          <p:nvPr>
+            <p:ph type="title"/>
+          </p:nvPr>
+        </p:nvSpPr>
+        <p:spPr/>
+        <p:txBody>
+          <a:bodyPr/>
+          <a:lstStyle/>
+          <a:p>
+            <a:r>
+              <a:rPr lang="pt-BR" dirty="0" smtClean="0"/>
+              <a:t>Funções de Execução</a:t>
+            </a:r>
+            <a:endParaRPr lang="pt-BR" dirty="0"/>
+          </a:p>
+        </p:txBody>
+      </p:sp>
+      <p:sp>
+        <p:nvSpPr>
+          <p:cNvPr id="3" name="Espaço Reservado para Conteúdo 2"/>
+          <p:cNvSpPr>
+            <a:spLocks noGrp="1"/>
+          </p:cNvSpPr>
+          <p:nvPr>
+            <p:ph idx="1"/>
+          </p:nvPr>
+        </p:nvSpPr>
+        <p:spPr/>
+        <p:txBody>
+          <a:bodyPr/>
+          <a:lstStyle/>
+          <a:p>
+            <a:endParaRPr lang="pt-BR" dirty="0" smtClean="0"/>
+          </a:p>
+          <a:p>
+            <a:pPr marL="0" indent="0" algn="just">
+              <a:buNone/>
+            </a:pPr>
+            <a:r>
+              <a:rPr lang="pt-BR" dirty="0"/>
+              <a:t>// Esta função fica responsável por atualizar o </a:t>
+            </a:r>
+            <a:r>
+              <a:rPr lang="pt-BR" dirty="0" smtClean="0"/>
+              <a:t>status (medida de </a:t>
+            </a:r>
+          </a:p>
+          <a:p>
+            <a:pPr marL="0" indent="0" algn="just">
+              <a:buNone/>
+            </a:pPr>
+            <a:r>
+              <a:rPr lang="pt-BR" dirty="0" smtClean="0"/>
+              <a:t>// desempenho) </a:t>
+            </a:r>
+            <a:r>
+              <a:rPr lang="pt-BR" dirty="0"/>
+              <a:t>do jogo</a:t>
+            </a:r>
+            <a:r>
+              <a:rPr lang="pt-BR" dirty="0" smtClean="0"/>
+              <a:t>.</a:t>
+            </a:r>
+          </a:p>
+          <a:p>
+            <a:pPr marL="0" indent="0">
+              <a:buNone/>
+            </a:pPr>
+            <a:r>
+              <a:rPr lang="pt-BR" dirty="0"/>
+              <a:t>// Além de verificar se o guerreiro encontrou o ouro (teste de objetivo</a:t>
+            </a:r>
+            <a:r>
+              <a:rPr lang="pt-BR" dirty="0" smtClean="0"/>
+              <a:t>).</a:t>
+            </a:r>
+          </a:p>
+          <a:p>
+            <a:pPr marL="0" indent="0">
+              <a:buNone/>
+            </a:pPr>
+            <a:endParaRPr lang="pt-BR" dirty="0"/>
+          </a:p>
+          <a:p>
+            <a:pPr marL="0" indent="0">
+              <a:buNone/>
+            </a:pPr>
+            <a:r>
+              <a:rPr lang="en-US" b="1" dirty="0"/>
+              <a:t>public static </a:t>
+            </a:r>
+            <a:r>
+              <a:rPr lang="en-US" b="1" dirty="0" err="1"/>
+              <a:t>boolean</a:t>
+            </a:r>
+            <a:r>
+              <a:rPr lang="en-US" b="1" dirty="0"/>
+              <a:t> verify(char </a:t>
+            </a:r>
+            <a:r>
+              <a:rPr lang="en-US" b="1" dirty="0" err="1"/>
+              <a:t>ambiente</a:t>
+            </a:r>
+            <a:r>
+              <a:rPr lang="en-US" b="1" dirty="0" smtClean="0"/>
+              <a:t>[][]){</a:t>
+            </a:r>
+          </a:p>
+          <a:p>
+            <a:pPr marL="0" indent="0">
+              <a:buNone/>
+            </a:pPr>
+            <a:r>
+              <a:rPr lang="en-US" b="1" dirty="0" smtClean="0"/>
+              <a:t>…</a:t>
+            </a:r>
+          </a:p>
+          <a:p>
+            <a:pPr marL="0" indent="0">
+              <a:buNone/>
+            </a:pPr>
+            <a:r>
+              <a:rPr lang="en-US" b="1" dirty="0"/>
+              <a:t>}</a:t>
+            </a:r>
+            <a:endParaRPr lang="pt-BR" dirty="0"/>
+          </a:p>
+        </p:txBody>
+      </p:sp>
+    </p:spTree>
+    <p:extLst>
+      <p:ext uri="{BB962C8B-B14F-4D97-AF65-F5344CB8AC3E}">
+        <p14:creationId xmlns:p14="http://schemas.microsoft.com/office/powerpoint/2010/main" val="3867417413"/>
+      </p:ext>
+    </p:extLst>
+  </p:cSld>
+  <p:clrMapOvr>
+    <a:masterClrMapping/>
+  </p:clrMapOvr>
+  <p:timing>
+    <p:tnLst>
+      <p:par>
+        <p:cTn id="1" dur="indefinite" restart="never" nodeType="tmRoot"/>
+      </p:par>
+    </p:tnLst>
+  </p:timing>
+</p:sld>
+</file>
+
+<file path=ppt/slides/slide21.xml><?xml version="1.0" encoding="utf-8"?>
+<p:sld xmlns:a="http://schemas.openxmlformats.org/drawingml/2006/main" xmlns:r="http://schemas.openxmlformats.org/officeDocument/2006/relationships" xmlns:p="http://schemas.openxmlformats.org/presentationml/2006/main">
+  <p:cSld>
+    <p:spTree>
+      <p:nvGrpSpPr>
+        <p:cNvPr id="1" name=""/>
+        <p:cNvGrpSpPr/>
+        <p:nvPr/>
+      </p:nvGrpSpPr>
+      <p:grpSpPr>
+        <a:xfrm>
+          <a:off x="0" y="0"/>
+          <a:ext cx="0" cy="0"/>
+          <a:chOff x="0" y="0"/>
+          <a:chExt cx="0" cy="0"/>
+        </a:xfrm>
+      </p:grpSpPr>
+      <p:sp>
+        <p:nvSpPr>
           <p:cNvPr id="5" name="Título 4"/>
           <p:cNvSpPr>
             <a:spLocks noGrp="1"/>
@@ -11689,6 +12006,192 @@
 </p:sld>
 </file>
 
+<file path=ppt/slides/slide22.xml><?xml version="1.0" encoding="utf-8"?>
+<p:sld xmlns:a="http://schemas.openxmlformats.org/drawingml/2006/main" xmlns:r="http://schemas.openxmlformats.org/officeDocument/2006/relationships" xmlns:p="http://schemas.openxmlformats.org/presentationml/2006/main">
+  <p:cSld>
+    <p:spTree>
+      <p:nvGrpSpPr>
+        <p:cNvPr id="1" name=""/>
+        <p:cNvGrpSpPr/>
+        <p:nvPr/>
+      </p:nvGrpSpPr>
+      <p:grpSpPr>
+        <a:xfrm>
+          <a:off x="0" y="0"/>
+          <a:ext cx="0" cy="0"/>
+          <a:chOff x="0" y="0"/>
+          <a:chExt cx="0" cy="0"/>
+        </a:xfrm>
+      </p:grpSpPr>
+      <p:sp>
+        <p:nvSpPr>
+          <p:cNvPr id="2" name="Título 1"/>
+          <p:cNvSpPr>
+            <a:spLocks noGrp="1"/>
+          </p:cNvSpPr>
+          <p:nvPr>
+            <p:ph type="ctrTitle"/>
+          </p:nvPr>
+        </p:nvSpPr>
+        <p:spPr/>
+        <p:txBody>
+          <a:bodyPr/>
+          <a:lstStyle/>
+          <a:p>
+            <a:r>
+              <a:rPr lang="pt-BR" dirty="0" smtClean="0"/>
+              <a:t>Agente racional para o Mundo do </a:t>
+            </a:r>
+            <a:r>
+              <a:rPr lang="pt-BR" dirty="0" err="1" smtClean="0"/>
+              <a:t>Wumpus</a:t>
+            </a:r>
+            <a:endParaRPr lang="pt-BR" dirty="0"/>
+          </a:p>
+        </p:txBody>
+      </p:sp>
+      <p:sp>
+        <p:nvSpPr>
+          <p:cNvPr id="3" name="Subtítulo 2"/>
+          <p:cNvSpPr>
+            <a:spLocks noGrp="1"/>
+          </p:cNvSpPr>
+          <p:nvPr>
+            <p:ph type="subTitle" idx="1"/>
+          </p:nvPr>
+        </p:nvSpPr>
+        <p:spPr>
+          <a:xfrm>
+            <a:off x="1524000" y="3602037"/>
+            <a:ext cx="9144000" cy="2149057"/>
+          </a:xfrm>
+        </p:spPr>
+        <p:txBody>
+          <a:bodyPr>
+            <a:normAutofit fontScale="85000" lnSpcReduction="20000"/>
+          </a:bodyPr>
+          <a:lstStyle/>
+          <a:p>
+            <a:endParaRPr lang="pt-BR" dirty="0" smtClean="0"/>
+          </a:p>
+          <a:p>
+            <a:r>
+              <a:rPr lang="pt-BR" sz="2700" dirty="0" smtClean="0"/>
+              <a:t>Sistemas Inteligentes</a:t>
+            </a:r>
+          </a:p>
+          <a:p>
+            <a:r>
+              <a:rPr lang="pt-BR" dirty="0"/>
+              <a:t>Prof. </a:t>
+            </a:r>
+            <a:r>
+              <a:rPr lang="pt-BR" dirty="0" err="1" smtClean="0"/>
+              <a:t>Heloina</a:t>
+            </a:r>
+            <a:r>
+              <a:rPr lang="pt-BR" dirty="0" smtClean="0"/>
+              <a:t> Alves Arnaldo</a:t>
+            </a:r>
+          </a:p>
+          <a:p>
+            <a:endParaRPr lang="pt-BR" dirty="0" smtClean="0"/>
+          </a:p>
+          <a:p>
+            <a:r>
+              <a:rPr lang="pt-BR" b="1" dirty="0" smtClean="0"/>
+              <a:t>Rodrigo Carlos Carvalho Lima Barbosa Leal</a:t>
+            </a:r>
+          </a:p>
+          <a:p>
+            <a:r>
+              <a:rPr lang="pt-BR" b="1" dirty="0" smtClean="0"/>
+              <a:t>Ricardo Bruno Ferreira da Silva</a:t>
+            </a:r>
+            <a:endParaRPr lang="pt-BR" b="1" dirty="0"/>
+          </a:p>
+        </p:txBody>
+      </p:sp>
+      <p:pic>
+        <p:nvPicPr>
+          <p:cNvPr id="5" name="Imagem 4"/>
+          <p:cNvPicPr>
+            <a:picLocks noChangeAspect="1"/>
+          </p:cNvPicPr>
+          <p:nvPr/>
+        </p:nvPicPr>
+        <p:blipFill>
+          <a:blip r:embed="rId3">
+            <a:extLst>
+              <a:ext uri="{28A0092B-C50C-407E-A947-70E740481C1C}">
+                <a14:useLocalDpi xmlns:a14="http://schemas.microsoft.com/office/drawing/2010/main" val="0"/>
+              </a:ext>
+            </a:extLst>
+          </a:blip>
+          <a:stretch>
+            <a:fillRect/>
+          </a:stretch>
+        </p:blipFill>
+        <p:spPr>
+          <a:xfrm>
+            <a:off x="1" y="1"/>
+            <a:ext cx="1524000" cy="2122486"/>
+          </a:xfrm>
+          <a:prstGeom prst="rect">
+            <a:avLst/>
+          </a:prstGeom>
+        </p:spPr>
+      </p:pic>
+      <p:pic>
+        <p:nvPicPr>
+          <p:cNvPr id="6" name="Imagem 5"/>
+          <p:cNvPicPr>
+            <a:picLocks noChangeAspect="1"/>
+          </p:cNvPicPr>
+          <p:nvPr/>
+        </p:nvPicPr>
+        <p:blipFill>
+          <a:blip r:embed="rId4">
+            <a:extLst>
+              <a:ext uri="{28A0092B-C50C-407E-A947-70E740481C1C}">
+                <a14:useLocalDpi xmlns:a14="http://schemas.microsoft.com/office/drawing/2010/main" val="0"/>
+              </a:ext>
+            </a:extLst>
+          </a:blip>
+          <a:stretch>
+            <a:fillRect/>
+          </a:stretch>
+        </p:blipFill>
+        <p:spPr>
+          <a:xfrm>
+            <a:off x="10062411" y="30165"/>
+            <a:ext cx="2129589" cy="2092321"/>
+          </a:xfrm>
+          <a:prstGeom prst="rect">
+            <a:avLst/>
+          </a:prstGeom>
+        </p:spPr>
+      </p:pic>
+    </p:spTree>
+    <p:extLst>
+      <p:ext uri="{BB962C8B-B14F-4D97-AF65-F5344CB8AC3E}">
+        <p14:creationId xmlns:p14="http://schemas.microsoft.com/office/powerpoint/2010/main" val="423639529"/>
+      </p:ext>
+    </p:extLst>
+  </p:cSld>
+  <p:clrMapOvr>
+    <a:masterClrMapping/>
+  </p:clrMapOvr>
+  <p:timing>
+    <p:tnLst>
+      <p:par>
+        <p:cTn id="1" dur="indefinite" restart="never" nodeType="tmRoot"/>
+      </p:par>
+    </p:tnLst>
+  </p:timing>
+</p:sld>
+</file>
+
 <file path=ppt/slides/slide3.xml><?xml version="1.0" encoding="utf-8"?>
 <p:sld xmlns:a="http://schemas.openxmlformats.org/drawingml/2006/main" xmlns:r="http://schemas.openxmlformats.org/officeDocument/2006/relationships" xmlns:p="http://schemas.openxmlformats.org/presentationml/2006/main">
   <p:cSld>
@@ -11888,6 +12391,36 @@
           </a:p>
         </p:txBody>
       </p:sp>
+      <p:pic>
+        <p:nvPicPr>
+          <p:cNvPr id="5" name="Imagem 4"/>
+          <p:cNvPicPr>
+            <a:picLocks noChangeAspect="1"/>
+          </p:cNvPicPr>
+          <p:nvPr/>
+        </p:nvPicPr>
+        <p:blipFill>
+          <a:blip r:embed="rId2">
+            <a:extLst>
+              <a:ext uri="{28A0092B-C50C-407E-A947-70E740481C1C}">
+                <a14:useLocalDpi xmlns:a14="http://schemas.microsoft.com/office/drawing/2010/main" val="0"/>
+              </a:ext>
+            </a:extLst>
+          </a:blip>
+          <a:stretch>
+            <a:fillRect/>
+          </a:stretch>
+        </p:blipFill>
+        <p:spPr>
+          <a:xfrm>
+            <a:off x="5741669" y="2806560"/>
+            <a:ext cx="4918927" cy="2146439"/>
+          </a:xfrm>
+          <a:prstGeom prst="rect">
+            <a:avLst/>
+          </a:prstGeom>
+        </p:spPr>
+      </p:pic>
     </p:spTree>
     <p:extLst>
       <p:ext uri="{BB962C8B-B14F-4D97-AF65-F5344CB8AC3E}">
@@ -11963,38 +12496,67 @@
           <a:bodyPr/>
           <a:lstStyle/>
           <a:p>
-            <a:pPr algn="just"/>
+            <a:endParaRPr lang="pt-BR" dirty="0" smtClean="0"/>
+          </a:p>
+          <a:p>
             <a:r>
               <a:rPr lang="pt-BR" dirty="0" smtClean="0"/>
-              <a:t>Cada posição tem capacidade máxima de representação de um único caractere, por padrões de estética da matriz.</a:t>
-            </a:r>
-          </a:p>
-          <a:p>
+              <a:t>Ordem de precedência de caracteres de percepção:</a:t>
+            </a:r>
+          </a:p>
+          <a:p>
+            <a:pPr marL="0" indent="0">
+              <a:buNone/>
+            </a:pPr>
             <a:endParaRPr lang="pt-BR" dirty="0"/>
           </a:p>
           <a:p>
-            <a:pPr algn="just"/>
+            <a:pPr marL="971550" lvl="1" indent="-514350">
+              <a:buFont typeface="+mj-lt"/>
+              <a:buAutoNum type="arabicPeriod"/>
+            </a:pPr>
             <a:r>
               <a:rPr lang="pt-BR" dirty="0" smtClean="0"/>
-              <a:t>Mas em uma mesma posição, pode-se ter mais de uma percepção, por exemplo, como ter um fedor e brisa na mesma posição.</a:t>
-            </a:r>
-          </a:p>
-          <a:p>
+              <a:t>F;</a:t>
+            </a:r>
+          </a:p>
+          <a:p>
+            <a:pPr marL="971550" lvl="1" indent="-514350">
+              <a:buFont typeface="+mj-lt"/>
+              <a:buAutoNum type="arabicPeriod"/>
+            </a:pPr>
+            <a:r>
+              <a:rPr lang="pt-BR" dirty="0" smtClean="0"/>
+              <a:t>B;</a:t>
+            </a:r>
+          </a:p>
+          <a:p>
+            <a:pPr marL="971550" lvl="1" indent="-514350">
+              <a:buFont typeface="+mj-lt"/>
+              <a:buAutoNum type="arabicPeriod"/>
+            </a:pPr>
+            <a:r>
+              <a:rPr lang="pt-BR" dirty="0" smtClean="0"/>
+              <a:t>R;</a:t>
+            </a:r>
+          </a:p>
+          <a:p>
+            <a:pPr marL="971550" lvl="1" indent="-514350">
+              <a:buFont typeface="+mj-lt"/>
+              <a:buAutoNum type="arabicPeriod"/>
+            </a:pPr>
+            <a:r>
+              <a:rPr lang="pt-BR" dirty="0" smtClean="0"/>
+              <a:t>- .</a:t>
+            </a:r>
             <a:endParaRPr lang="pt-BR" dirty="0"/>
-          </a:p>
-          <a:p>
-            <a:pPr algn="just"/>
-            <a:r>
-              <a:rPr lang="pt-BR" dirty="0" smtClean="0"/>
-              <a:t>Isto é possível no algoritmo, dado que, estruturas auxiliares são utilizadas para solucionar o problema comentado.</a:t>
-            </a:r>
           </a:p>
         </p:txBody>
       </p:sp>
     </p:spTree>
     <p:extLst>
       <p:ext uri="{BB962C8B-B14F-4D97-AF65-F5344CB8AC3E}">
-        <p14:creationId xmlns:p14="http://schemas.microsoft.com/office/powerpoint/2010/main" val="1058805741"/>
+        <p14:creationId xmlns:p14="http://schemas.microsoft.com/office/powerpoint/2010/main" val="912927595"/>
       </p:ext>
     </p:extLst>
   </p:cSld>
@@ -12063,6 +12625,109 @@
         </p:nvSpPr>
         <p:spPr/>
         <p:txBody>
+          <a:bodyPr/>
+          <a:lstStyle/>
+          <a:p>
+            <a:pPr algn="just"/>
+            <a:r>
+              <a:rPr lang="pt-BR" dirty="0" smtClean="0"/>
+              <a:t>Cada posição tem capacidade máxima de representação de um único caractere, por padrões de estética da matriz.</a:t>
+            </a:r>
+          </a:p>
+          <a:p>
+            <a:endParaRPr lang="pt-BR" dirty="0"/>
+          </a:p>
+          <a:p>
+            <a:pPr algn="just"/>
+            <a:r>
+              <a:rPr lang="pt-BR" dirty="0" smtClean="0"/>
+              <a:t>Mas em uma mesma posição, pode-se ter mais de uma percepção, por exemplo, como ter um fedor e brisa na mesma posição.</a:t>
+            </a:r>
+          </a:p>
+          <a:p>
+            <a:endParaRPr lang="pt-BR" dirty="0"/>
+          </a:p>
+          <a:p>
+            <a:pPr algn="just"/>
+            <a:r>
+              <a:rPr lang="pt-BR" dirty="0" smtClean="0"/>
+              <a:t>Isto é possível no algoritmo, dado que, estruturas auxiliares são utilizadas para solucionar o problema comentado.</a:t>
+            </a:r>
+          </a:p>
+        </p:txBody>
+      </p:sp>
+    </p:spTree>
+    <p:extLst>
+      <p:ext uri="{BB962C8B-B14F-4D97-AF65-F5344CB8AC3E}">
+        <p14:creationId xmlns:p14="http://schemas.microsoft.com/office/powerpoint/2010/main" val="1058805741"/>
+      </p:ext>
+    </p:extLst>
+  </p:cSld>
+  <p:clrMapOvr>
+    <a:masterClrMapping/>
+  </p:clrMapOvr>
+  <p:timing>
+    <p:tnLst>
+      <p:par>
+        <p:cTn id="1" dur="indefinite" restart="never" nodeType="tmRoot"/>
+      </p:par>
+    </p:tnLst>
+  </p:timing>
+</p:sld>
+</file>
+
+<file path=ppt/slides/slide6.xml><?xml version="1.0" encoding="utf-8"?>
+<p:sld xmlns:a="http://schemas.openxmlformats.org/drawingml/2006/main" xmlns:r="http://schemas.openxmlformats.org/officeDocument/2006/relationships" xmlns:p="http://schemas.openxmlformats.org/presentationml/2006/main">
+  <p:cSld>
+    <p:spTree>
+      <p:nvGrpSpPr>
+        <p:cNvPr id="1" name=""/>
+        <p:cNvGrpSpPr/>
+        <p:nvPr/>
+      </p:nvGrpSpPr>
+      <p:grpSpPr>
+        <a:xfrm>
+          <a:off x="0" y="0"/>
+          <a:ext cx="0" cy="0"/>
+          <a:chOff x="0" y="0"/>
+          <a:chExt cx="0" cy="0"/>
+        </a:xfrm>
+      </p:grpSpPr>
+      <p:sp>
+        <p:nvSpPr>
+          <p:cNvPr id="2" name="Título 1"/>
+          <p:cNvSpPr>
+            <a:spLocks noGrp="1"/>
+          </p:cNvSpPr>
+          <p:nvPr>
+            <p:ph type="title"/>
+          </p:nvPr>
+        </p:nvSpPr>
+        <p:spPr/>
+        <p:txBody>
+          <a:bodyPr/>
+          <a:lstStyle/>
+          <a:p>
+            <a:r>
+              <a:rPr lang="pt-BR" dirty="0" smtClean="0"/>
+              <a:t>Representação do cenário</a:t>
+            </a:r>
+            <a:endParaRPr lang="pt-BR" dirty="0"/>
+          </a:p>
+        </p:txBody>
+      </p:sp>
+      <p:sp>
+        <p:nvSpPr>
+          <p:cNvPr id="3" name="Espaço Reservado para Conteúdo 2"/>
+          <p:cNvSpPr>
+            <a:spLocks noGrp="1"/>
+          </p:cNvSpPr>
+          <p:nvPr>
+            <p:ph idx="1"/>
+          </p:nvPr>
+        </p:nvSpPr>
+        <p:spPr/>
+        <p:txBody>
           <a:bodyPr>
             <a:normAutofit lnSpcReduction="10000"/>
           </a:bodyPr>
@@ -12192,7 +12857,7 @@
 </p:sld>
 </file>
 
-<file path=ppt/slides/slide6.xml><?xml version="1.0" encoding="utf-8"?>
+<file path=ppt/slides/slide7.xml><?xml version="1.0" encoding="utf-8"?>
 <p:sld xmlns:a="http://schemas.openxmlformats.org/drawingml/2006/main" xmlns:r="http://schemas.openxmlformats.org/officeDocument/2006/relationships" xmlns:p="http://schemas.openxmlformats.org/presentationml/2006/main">
   <p:cSld>
     <p:spTree>
@@ -12339,241 +13004,6 @@
 </p:sld>
 </file>
 
-<file path=ppt/slides/slide7.xml><?xml version="1.0" encoding="utf-8"?>
-<p:sld xmlns:a="http://schemas.openxmlformats.org/drawingml/2006/main" xmlns:r="http://schemas.openxmlformats.org/officeDocument/2006/relationships" xmlns:p="http://schemas.openxmlformats.org/presentationml/2006/main">
-  <p:cSld>
-    <p:spTree>
-      <p:nvGrpSpPr>
-        <p:cNvPr id="1" name=""/>
-        <p:cNvGrpSpPr/>
-        <p:nvPr/>
-      </p:nvGrpSpPr>
-      <p:grpSpPr>
-        <a:xfrm>
-          <a:off x="0" y="0"/>
-          <a:ext cx="0" cy="0"/>
-          <a:chOff x="0" y="0"/>
-          <a:chExt cx="0" cy="0"/>
-        </a:xfrm>
-      </p:grpSpPr>
-      <p:sp>
-        <p:nvSpPr>
-          <p:cNvPr id="2" name="Título 1"/>
-          <p:cNvSpPr>
-            <a:spLocks noGrp="1"/>
-          </p:cNvSpPr>
-          <p:nvPr>
-            <p:ph type="title"/>
-          </p:nvPr>
-        </p:nvSpPr>
-        <p:spPr/>
-        <p:txBody>
-          <a:bodyPr/>
-          <a:lstStyle/>
-          <a:p>
-            <a:r>
-              <a:rPr lang="pt-BR" dirty="0" smtClean="0"/>
-              <a:t>Funções de Execução</a:t>
-            </a:r>
-            <a:endParaRPr lang="pt-BR" dirty="0"/>
-          </a:p>
-        </p:txBody>
-      </p:sp>
-      <p:sp>
-        <p:nvSpPr>
-          <p:cNvPr id="3" name="Espaço Reservado para Conteúdo 2"/>
-          <p:cNvSpPr>
-            <a:spLocks noGrp="1"/>
-          </p:cNvSpPr>
-          <p:nvPr>
-            <p:ph idx="1"/>
-          </p:nvPr>
-        </p:nvSpPr>
-        <p:spPr/>
-        <p:txBody>
-          <a:bodyPr>
-            <a:normAutofit fontScale="92500" lnSpcReduction="20000"/>
-          </a:bodyPr>
-          <a:lstStyle/>
-          <a:p>
-            <a:endParaRPr lang="pt-BR" dirty="0" smtClean="0"/>
-          </a:p>
-          <a:p>
-            <a:pPr marL="0" indent="0">
-              <a:buNone/>
-            </a:pPr>
-            <a:r>
-              <a:rPr lang="pt-BR" dirty="0"/>
-              <a:t>// Função </a:t>
-            </a:r>
-            <a:r>
-              <a:rPr lang="pt-BR" dirty="0" err="1" smtClean="0"/>
-              <a:t>init</a:t>
-            </a:r>
-            <a:r>
-              <a:rPr lang="pt-BR" dirty="0" smtClean="0"/>
-              <a:t>: </a:t>
-            </a:r>
-            <a:r>
-              <a:rPr lang="pt-BR" dirty="0"/>
-              <a:t>inicia o ambiente, colocando o </a:t>
-            </a:r>
-            <a:r>
-              <a:rPr lang="pt-BR" dirty="0" err="1" smtClean="0"/>
-              <a:t>Wumpus</a:t>
-            </a:r>
-            <a:r>
-              <a:rPr lang="pt-BR" dirty="0" smtClean="0"/>
-              <a:t>,      </a:t>
-            </a:r>
-          </a:p>
-          <a:p>
-            <a:pPr marL="0" indent="0">
-              <a:buNone/>
-            </a:pPr>
-            <a:r>
-              <a:rPr lang="pt-BR" dirty="0" smtClean="0"/>
-              <a:t>// Agente</a:t>
-            </a:r>
-            <a:r>
-              <a:rPr lang="pt-BR" dirty="0"/>
-              <a:t>, brisas, Fedor e Poços nos seus lugares</a:t>
-            </a:r>
-            <a:r>
-              <a:rPr lang="pt-BR" dirty="0" smtClean="0"/>
-              <a:t>.</a:t>
-            </a:r>
-          </a:p>
-          <a:p>
-            <a:pPr marL="0" indent="0">
-              <a:buNone/>
-            </a:pPr>
-            <a:endParaRPr lang="pt-BR" dirty="0"/>
-          </a:p>
-          <a:p>
-            <a:pPr marL="0" indent="0">
-              <a:buNone/>
-            </a:pPr>
-            <a:r>
-              <a:rPr lang="pt-BR" dirty="0"/>
-              <a:t>// O ambiente é gerado randomicamente, conforme pedido feito na </a:t>
-            </a:r>
-            <a:endParaRPr lang="pt-BR" dirty="0" smtClean="0"/>
-          </a:p>
-          <a:p>
-            <a:pPr marL="0" indent="0">
-              <a:buNone/>
-            </a:pPr>
-            <a:r>
-              <a:rPr lang="pt-BR" dirty="0" smtClean="0"/>
-              <a:t>// descrição </a:t>
-            </a:r>
-            <a:r>
-              <a:rPr lang="pt-BR" dirty="0"/>
-              <a:t>do trabalho </a:t>
-            </a:r>
-            <a:r>
-              <a:rPr lang="pt-BR" dirty="0" smtClean="0"/>
-              <a:t>da </a:t>
-            </a:r>
-            <a:r>
-              <a:rPr lang="pt-BR" dirty="0"/>
-              <a:t>disciplina</a:t>
-            </a:r>
-            <a:r>
-              <a:rPr lang="pt-BR" dirty="0" smtClean="0"/>
-              <a:t>.</a:t>
-            </a:r>
-          </a:p>
-          <a:p>
-            <a:endParaRPr lang="pt-BR" dirty="0"/>
-          </a:p>
-          <a:p>
-            <a:pPr marL="0" indent="0">
-              <a:buNone/>
-            </a:pPr>
-            <a:r>
-              <a:rPr lang="pt-BR" b="1" dirty="0" err="1"/>
-              <a:t>public</a:t>
-            </a:r>
-            <a:r>
-              <a:rPr lang="pt-BR" b="1" dirty="0"/>
-              <a:t> </a:t>
-            </a:r>
-            <a:r>
-              <a:rPr lang="pt-BR" b="1" dirty="0" err="1"/>
-              <a:t>static</a:t>
-            </a:r>
-            <a:r>
-              <a:rPr lang="pt-BR" b="1" dirty="0"/>
-              <a:t> </a:t>
-            </a:r>
-            <a:r>
-              <a:rPr lang="pt-BR" b="1" dirty="0" err="1"/>
-              <a:t>void</a:t>
-            </a:r>
-            <a:r>
-              <a:rPr lang="pt-BR" b="1" dirty="0"/>
-              <a:t> </a:t>
-            </a:r>
-            <a:r>
-              <a:rPr lang="pt-BR" b="1" dirty="0" err="1" smtClean="0"/>
-              <a:t>init</a:t>
-            </a:r>
-            <a:r>
-              <a:rPr lang="pt-BR" b="1" dirty="0" smtClean="0"/>
-              <a:t> (</a:t>
-            </a:r>
-            <a:r>
-              <a:rPr lang="pt-BR" b="1" dirty="0"/>
-              <a:t>char ambiente</a:t>
-            </a:r>
-            <a:r>
-              <a:rPr lang="pt-BR" b="1" dirty="0" smtClean="0"/>
-              <a:t>[][]){</a:t>
-            </a:r>
-          </a:p>
-          <a:p>
-            <a:pPr marL="0" indent="0">
-              <a:buNone/>
-            </a:pPr>
-            <a:r>
-              <a:rPr lang="pt-BR" b="1" dirty="0" smtClean="0"/>
-              <a:t>...</a:t>
-            </a:r>
-          </a:p>
-          <a:p>
-            <a:pPr marL="0" indent="0">
-              <a:buNone/>
-            </a:pPr>
-            <a:r>
-              <a:rPr lang="pt-BR" b="1" dirty="0"/>
-              <a:t>}</a:t>
-            </a:r>
-            <a:endParaRPr lang="pt-BR" dirty="0"/>
-          </a:p>
-        </p:txBody>
-      </p:sp>
-    </p:spTree>
-    <p:extLst>
-      <p:ext uri="{BB962C8B-B14F-4D97-AF65-F5344CB8AC3E}">
-        <p14:creationId xmlns:p14="http://schemas.microsoft.com/office/powerpoint/2010/main" val="110433529"/>
-      </p:ext>
-    </p:extLst>
-  </p:cSld>
-  <p:clrMapOvr>
-    <a:masterClrMapping/>
-  </p:clrMapOvr>
-  <p:timing>
-    <p:tnLst>
-      <p:par>
-        <p:cTn id="1" dur="indefinite" restart="never" nodeType="tmRoot"/>
-      </p:par>
-    </p:tnLst>
-  </p:timing>
-</p:sld>
-</file>
-
 <file path=ppt/slides/slide8.xml><?xml version="1.0" encoding="utf-8"?>
 <p:sld xmlns:a="http://schemas.openxmlformats.org/drawingml/2006/main" xmlns:r="http://schemas.openxmlformats.org/officeDocument/2006/relationships" xmlns:p="http://schemas.openxmlformats.org/presentationml/2006/main">
   <p:cSld>
@@ -12627,9 +13057,12 @@
         <p:spPr/>
         <p:txBody>
           <a:bodyPr>
-            <a:normAutofit lnSpcReduction="10000"/>
+            <a:normAutofit fontScale="92500" lnSpcReduction="20000"/>
           </a:bodyPr>
           <a:lstStyle/>
+          <a:p>
+            <a:endParaRPr lang="pt-BR" dirty="0" smtClean="0"/>
+          </a:p>
           <a:p>
             <a:pPr marL="0" indent="0">
               <a:buNone/>
@@ -12639,56 +13072,48 @@
               <a:t>// Função </a:t>
             </a:r>
             <a:r>
+              <a:rPr lang="pt-BR" dirty="0" err="1" smtClean="0"/>
+              <a:t>init</a:t>
+            </a:r>
+            <a:r>
               <a:rPr lang="pt-BR" dirty="0" smtClean="0"/>
-              <a:t>show: </a:t>
+              <a:t>: </a:t>
             </a:r>
             <a:r>
               <a:rPr lang="pt-BR" dirty="0"/>
-              <a:t>apresente a matriz passada por parâmetro.</a:t>
+              <a:t>inicia o ambiente, colocando o </a:t>
+            </a:r>
+            <a:r>
+              <a:rPr lang="pt-BR" dirty="0" err="1" smtClean="0"/>
+              <a:t>Wumpus</a:t>
+            </a:r>
+            <a:r>
+              <a:rPr lang="pt-BR" dirty="0" smtClean="0"/>
+              <a:t>,      </a:t>
             </a:r>
           </a:p>
           <a:p>
             <a:pPr marL="0" indent="0">
               <a:buNone/>
             </a:pPr>
-            <a:endParaRPr lang="pt-BR" b="1" dirty="0" smtClean="0"/>
+            <a:r>
+              <a:rPr lang="pt-BR" dirty="0" smtClean="0"/>
+              <a:t>// Agente</a:t>
+            </a:r>
+            <a:r>
+              <a:rPr lang="pt-BR" dirty="0"/>
+              <a:t>, brisas, Fedor e Poços nos seus lugares</a:t>
+            </a:r>
+            <a:r>
+              <a:rPr lang="pt-BR" dirty="0" smtClean="0"/>
+              <a:t>.</a:t>
+            </a:r>
           </a:p>
           <a:p>
             <a:pPr marL="0" indent="0">
               <a:buNone/>
             </a:pPr>
-            <a:r>
-              <a:rPr lang="pt-BR" b="1" dirty="0" err="1" smtClean="0"/>
-              <a:t>public</a:t>
-            </a:r>
-            <a:r>
-              <a:rPr lang="pt-BR" b="1" dirty="0" smtClean="0"/>
-              <a:t> </a:t>
-            </a:r>
-            <a:r>
-              <a:rPr lang="pt-BR" b="1" dirty="0" err="1"/>
-              <a:t>static</a:t>
-            </a:r>
-            <a:r>
-              <a:rPr lang="pt-BR" b="1" dirty="0"/>
-              <a:t> </a:t>
-            </a:r>
-            <a:r>
-              <a:rPr lang="pt-BR" b="1" dirty="0" err="1"/>
-              <a:t>void</a:t>
-            </a:r>
-            <a:r>
-              <a:rPr lang="pt-BR" b="1" dirty="0"/>
-              <a:t> </a:t>
-            </a:r>
-            <a:r>
-              <a:rPr lang="pt-BR" b="1" dirty="0" smtClean="0"/>
-              <a:t>show (</a:t>
-            </a:r>
-            <a:r>
-              <a:rPr lang="pt-BR" b="1" dirty="0"/>
-              <a:t>char ambiente[][]){</a:t>
-            </a:r>
+            <a:endParaRPr lang="pt-BR" dirty="0"/>
           </a:p>
           <a:p>
             <a:pPr marL="0" indent="0">
@@ -12696,111 +13121,90 @@
             </a:pPr>
             <a:r>
               <a:rPr lang="pt-BR" dirty="0"/>
-              <a:t>	</a:t>
-            </a:r>
-            <a:r>
-              <a:rPr lang="pt-BR" b="1" dirty="0" smtClean="0"/>
-              <a:t>for(</a:t>
-            </a:r>
-            <a:r>
-              <a:rPr lang="pt-BR" b="1" dirty="0" err="1" smtClean="0"/>
-              <a:t>int</a:t>
-            </a:r>
-            <a:r>
-              <a:rPr lang="pt-BR" b="1" dirty="0" smtClean="0"/>
-              <a:t> </a:t>
-            </a:r>
-            <a:r>
-              <a:rPr lang="pt-BR" b="1" dirty="0"/>
-              <a:t>i=0; i&lt;4; i</a:t>
-            </a:r>
-            <a:r>
-              <a:rPr lang="pt-BR" b="1" dirty="0" smtClean="0"/>
-              <a:t>++){</a:t>
-            </a:r>
+              <a:t>// O ambiente é gerado randomicamente, conforme pedido feito na </a:t>
+            </a:r>
+            <a:endParaRPr lang="pt-BR" dirty="0" smtClean="0"/>
           </a:p>
           <a:p>
             <a:pPr marL="0" indent="0">
               <a:buNone/>
             </a:pPr>
             <a:r>
-              <a:rPr lang="pt-BR" b="1" dirty="0"/>
-              <a:t>	</a:t>
-            </a:r>
-            <a:r>
-              <a:rPr lang="pt-BR" b="1" dirty="0" smtClean="0"/>
-              <a:t>	for(</a:t>
-            </a:r>
-            <a:r>
-              <a:rPr lang="pt-BR" b="1" dirty="0" err="1" smtClean="0"/>
-              <a:t>int</a:t>
-            </a:r>
-            <a:r>
-              <a:rPr lang="pt-BR" b="1" dirty="0" smtClean="0"/>
-              <a:t> </a:t>
-            </a:r>
-            <a:r>
-              <a:rPr lang="pt-BR" b="1" dirty="0"/>
-              <a:t>j=0; j&lt;4; j</a:t>
-            </a:r>
-            <a:r>
-              <a:rPr lang="pt-BR" b="1" dirty="0" smtClean="0"/>
-              <a:t>++)</a:t>
-            </a:r>
+              <a:rPr lang="pt-BR" dirty="0" smtClean="0"/>
+              <a:t>// descrição </a:t>
+            </a:r>
+            <a:r>
+              <a:rPr lang="pt-BR" dirty="0"/>
+              <a:t>do trabalho </a:t>
+            </a:r>
+            <a:r>
+              <a:rPr lang="pt-BR" dirty="0" smtClean="0"/>
+              <a:t>da </a:t>
+            </a:r>
+            <a:r>
+              <a:rPr lang="pt-BR" dirty="0"/>
+              <a:t>disciplina</a:t>
+            </a:r>
+            <a:r>
+              <a:rPr lang="pt-BR" dirty="0" smtClean="0"/>
+              <a:t>.</a:t>
+            </a:r>
+          </a:p>
+          <a:p>
+            <a:endParaRPr lang="pt-BR" dirty="0"/>
           </a:p>
           <a:p>
             <a:pPr marL="0" indent="0">
               <a:buNone/>
             </a:pPr>
             <a:r>
+              <a:rPr lang="pt-BR" b="1" dirty="0" err="1"/>
+              <a:t>public</a:t>
+            </a:r>
+            <a:r>
               <a:rPr lang="pt-BR" b="1" dirty="0"/>
-              <a:t>	</a:t>
+              <a:t> </a:t>
+            </a:r>
+            <a:r>
+              <a:rPr lang="pt-BR" b="1" dirty="0" err="1"/>
+              <a:t>static</a:t>
+            </a:r>
+            <a:r>
+              <a:rPr lang="pt-BR" b="1" dirty="0"/>
+              <a:t> </a:t>
+            </a:r>
+            <a:r>
+              <a:rPr lang="pt-BR" b="1" dirty="0" err="1"/>
+              <a:t>void</a:t>
+            </a:r>
+            <a:r>
+              <a:rPr lang="pt-BR" b="1" dirty="0"/>
+              <a:t> </a:t>
+            </a:r>
+            <a:r>
+              <a:rPr lang="pt-BR" b="1" dirty="0" err="1" smtClean="0"/>
+              <a:t>init</a:t>
             </a:r>
             <a:r>
               <a:rPr lang="pt-BR" b="1" dirty="0" smtClean="0"/>
-              <a:t>		</a:t>
-            </a:r>
-            <a:r>
-              <a:rPr lang="pt-BR" dirty="0" err="1" smtClean="0"/>
-              <a:t>System.</a:t>
-            </a:r>
-            <a:r>
-              <a:rPr lang="pt-BR" b="1" i="1" dirty="0" err="1" smtClean="0"/>
-              <a:t>out.print</a:t>
-            </a:r>
-            <a:r>
-              <a:rPr lang="pt-BR" b="1" i="1" dirty="0"/>
-              <a:t>("| "+ambiente[i][j]+" </a:t>
-            </a:r>
-            <a:r>
-              <a:rPr lang="pt-BR" b="1" i="1" dirty="0" smtClean="0"/>
-              <a:t>|"); 		</a:t>
-            </a:r>
-            <a:endParaRPr lang="pt-BR" b="1" i="1" dirty="0" smtClean="0"/>
+              <a:t> (</a:t>
+            </a:r>
+            <a:r>
+              <a:rPr lang="pt-BR" b="1" dirty="0"/>
+              <a:t>char ambiente</a:t>
+            </a:r>
+            <a:r>
+              <a:rPr lang="pt-BR" b="1" dirty="0" smtClean="0"/>
+              <a:t>[][]){</a:t>
+            </a:r>
           </a:p>
           <a:p>
             <a:pPr marL="0" indent="0">
               <a:buNone/>
             </a:pPr>
             <a:r>
-              <a:rPr lang="pt-BR" b="1" i="1" dirty="0" smtClean="0"/>
-              <a:t>		</a:t>
-            </a:r>
-            <a:r>
-              <a:rPr lang="pt-BR" dirty="0" err="1" smtClean="0"/>
-              <a:t>System.</a:t>
-            </a:r>
-            <a:r>
-              <a:rPr lang="pt-BR" b="1" i="1" dirty="0" err="1" smtClean="0"/>
-              <a:t>out.println</a:t>
-            </a:r>
-            <a:r>
-              <a:rPr lang="pt-BR" b="1" i="1" dirty="0"/>
-              <a:t>(" </a:t>
-            </a:r>
-            <a:r>
-              <a:rPr lang="pt-BR" b="1" i="1" dirty="0" smtClean="0"/>
-              <a:t>");</a:t>
+              <a:rPr lang="pt-BR" b="1" dirty="0" smtClean="0"/>
+              <a:t>...</a:t>
             </a:r>
           </a:p>
           <a:p>
@@ -12808,20 +13212,7 @@
               <a:buNone/>
             </a:pPr>
             <a:r>
-              <a:rPr lang="pt-BR" b="1" i="1" dirty="0"/>
-              <a:t>	</a:t>
-            </a:r>
-            <a:r>
-              <a:rPr lang="pt-BR" dirty="0" smtClean="0"/>
-              <a:t>}</a:t>
-            </a:r>
-          </a:p>
-          <a:p>
-            <a:pPr marL="0" indent="0">
-              <a:buNone/>
-            </a:pPr>
-            <a:r>
-              <a:rPr lang="pt-BR" dirty="0" smtClean="0"/>
+              <a:rPr lang="pt-BR" b="1" dirty="0"/>
               <a:t>}</a:t>
             </a:r>
             <a:endParaRPr lang="pt-BR" dirty="0"/>
@@ -12831,7 +13222,7 @@
     </p:spTree>
     <p:extLst>
       <p:ext uri="{BB962C8B-B14F-4D97-AF65-F5344CB8AC3E}">
-        <p14:creationId xmlns:p14="http://schemas.microsoft.com/office/powerpoint/2010/main" val="3577587169"/>
+        <p14:creationId xmlns:p14="http://schemas.microsoft.com/office/powerpoint/2010/main" val="110433529"/>
       </p:ext>
     </p:extLst>
   </p:cSld>
@@ -12900,7 +13291,9 @@
         </p:nvSpPr>
         <p:spPr/>
         <p:txBody>
-          <a:bodyPr/>
+          <a:bodyPr>
+            <a:normAutofit lnSpcReduction="10000"/>
+          </a:bodyPr>
           <a:lstStyle/>
           <a:p>
             <a:pPr marL="0" indent="0">
@@ -12908,53 +13301,58 @@
             </a:pPr>
             <a:r>
               <a:rPr lang="pt-BR" dirty="0"/>
-              <a:t>// A</a:t>
+              <a:t>// Função </a:t>
             </a:r>
             <a:r>
               <a:rPr lang="pt-BR" dirty="0" smtClean="0"/>
-              <a:t>qui ocorre </a:t>
+              <a:t>show: </a:t>
             </a:r>
             <a:r>
               <a:rPr lang="pt-BR" dirty="0"/>
-              <a:t>o </a:t>
-            </a:r>
-            <a:r>
-              <a:rPr lang="pt-BR" dirty="0" smtClean="0"/>
-              <a:t>raciocínio e movimento </a:t>
-            </a:r>
-            <a:r>
-              <a:rPr lang="pt-BR" dirty="0"/>
-              <a:t>do agente.</a:t>
-            </a:r>
-            <a:endParaRPr lang="pt-BR" dirty="0" smtClean="0"/>
-          </a:p>
-          <a:p>
-            <a:endParaRPr lang="pt-BR" dirty="0" smtClean="0"/>
+              <a:t>apresente a matriz passada por parâmetro.</a:t>
+            </a:r>
           </a:p>
           <a:p>
             <a:pPr marL="0" indent="0">
               <a:buNone/>
             </a:pPr>
-            <a:r>
-              <a:rPr lang="en-US" b="1" dirty="0"/>
-              <a:t>public static char[][] start(char </a:t>
-            </a:r>
-            <a:r>
-              <a:rPr lang="en-US" b="1" dirty="0" err="1"/>
-              <a:t>ambiente</a:t>
-            </a:r>
-            <a:r>
-              <a:rPr lang="en-US" b="1" dirty="0" smtClean="0"/>
-              <a:t>[][]){</a:t>
-            </a:r>
+            <a:endParaRPr lang="pt-BR" b="1" dirty="0" smtClean="0"/>
           </a:p>
           <a:p>
             <a:pPr marL="0" indent="0">
               <a:buNone/>
             </a:pPr>
             <a:r>
-              <a:rPr lang="en-US" b="1" dirty="0" smtClean="0"/>
-              <a:t>…</a:t>
+              <a:rPr lang="pt-BR" b="1" dirty="0" err="1" smtClean="0"/>
+              <a:t>public</a:t>
+            </a:r>
+            <a:r>
+              <a:rPr lang="pt-BR" b="1" dirty="0" smtClean="0"/>
+              <a:t> </a:t>
+            </a:r>
+            <a:r>
+              <a:rPr lang="pt-BR" b="1" dirty="0" err="1"/>
+              <a:t>static</a:t>
+            </a:r>
+            <a:r>
+              <a:rPr lang="pt-BR" b="1" dirty="0"/>
+              <a:t> </a:t>
+            </a:r>
+            <a:r>
+              <a:rPr lang="pt-BR" b="1" dirty="0" err="1"/>
+              <a:t>void</a:t>
+            </a:r>
+            <a:r>
+              <a:rPr lang="pt-BR" b="1" dirty="0"/>
+              <a:t> </a:t>
+            </a:r>
+            <a:r>
+              <a:rPr lang="pt-BR" b="1" dirty="0" smtClean="0"/>
+              <a:t>show (</a:t>
+            </a:r>
+            <a:r>
+              <a:rPr lang="pt-BR" b="1" dirty="0"/>
+              <a:t>char ambiente[][]){</a:t>
             </a:r>
           </a:p>
           <a:p>
@@ -12962,89 +13360,134 @@
               <a:buNone/>
             </a:pPr>
             <a:r>
-              <a:rPr lang="en-US" b="1" dirty="0" smtClean="0"/>
-              <a:t>}</a:t>
+              <a:rPr lang="pt-BR" dirty="0"/>
+              <a:t>	</a:t>
+            </a:r>
+            <a:r>
+              <a:rPr lang="pt-BR" b="1" dirty="0" smtClean="0"/>
+              <a:t>for(</a:t>
+            </a:r>
+            <a:r>
+              <a:rPr lang="pt-BR" b="1" dirty="0" err="1" smtClean="0"/>
+              <a:t>int</a:t>
+            </a:r>
+            <a:r>
+              <a:rPr lang="pt-BR" b="1" dirty="0" smtClean="0"/>
+              <a:t> </a:t>
+            </a:r>
+            <a:r>
+              <a:rPr lang="pt-BR" b="1" dirty="0"/>
+              <a:t>i=0; i&lt;4; i</a:t>
+            </a:r>
+            <a:r>
+              <a:rPr lang="pt-BR" b="1" dirty="0" smtClean="0"/>
+              <a:t>++){</a:t>
             </a:r>
           </a:p>
           <a:p>
             <a:pPr marL="0" indent="0">
               <a:buNone/>
             </a:pPr>
-            <a:endParaRPr lang="en-US" b="1" dirty="0"/>
-          </a:p>
-          <a:p>
-            <a:pPr algn="just"/>
-            <a:r>
-              <a:rPr lang="en-US" dirty="0" err="1" smtClean="0"/>
-              <a:t>Uso</a:t>
-            </a:r>
-            <a:r>
-              <a:rPr lang="en-US" dirty="0" smtClean="0"/>
-              <a:t> de </a:t>
-            </a:r>
-            <a:r>
-              <a:rPr lang="en-US" dirty="0" err="1" smtClean="0"/>
-              <a:t>estruturas</a:t>
-            </a:r>
-            <a:r>
-              <a:rPr lang="en-US" dirty="0" smtClean="0"/>
-              <a:t> de </a:t>
-            </a:r>
-            <a:r>
-              <a:rPr lang="en-US" dirty="0" err="1" smtClean="0"/>
-              <a:t>armazenamento</a:t>
-            </a:r>
-            <a:r>
-              <a:rPr lang="en-US" dirty="0" smtClean="0"/>
-              <a:t> para </a:t>
-            </a:r>
-            <a:r>
-              <a:rPr lang="en-US" dirty="0" err="1" smtClean="0"/>
-              <a:t>subsidiar</a:t>
-            </a:r>
-            <a:r>
-              <a:rPr lang="en-US" dirty="0" smtClean="0"/>
-              <a:t> a </a:t>
-            </a:r>
-            <a:r>
-              <a:rPr lang="en-US" dirty="0" err="1" smtClean="0"/>
-              <a:t>tomada</a:t>
-            </a:r>
-            <a:r>
-              <a:rPr lang="en-US" dirty="0" smtClean="0"/>
-              <a:t> de </a:t>
-            </a:r>
-            <a:r>
-              <a:rPr lang="en-US" dirty="0" err="1" smtClean="0"/>
-              <a:t>decisão</a:t>
-            </a:r>
-            <a:r>
-              <a:rPr lang="en-US" dirty="0" smtClean="0"/>
-              <a:t> do </a:t>
-            </a:r>
-            <a:r>
-              <a:rPr lang="en-US" dirty="0" err="1" smtClean="0"/>
-              <a:t>agente</a:t>
-            </a:r>
-            <a:r>
-              <a:rPr lang="en-US" dirty="0" smtClean="0"/>
-              <a:t> do </a:t>
-            </a:r>
-            <a:r>
-              <a:rPr lang="en-US" dirty="0" err="1" smtClean="0"/>
-              <a:t>mundo</a:t>
-            </a:r>
-            <a:r>
-              <a:rPr lang="en-US" dirty="0" smtClean="0"/>
-              <a:t> de </a:t>
-            </a:r>
-            <a:r>
-              <a:rPr lang="en-US" dirty="0" err="1" smtClean="0"/>
-              <a:t>Wumpus</a:t>
-            </a:r>
-            <a:r>
-              <a:rPr lang="en-US" dirty="0" smtClean="0"/>
-              <a:t>.</a:t>
+            <a:r>
+              <a:rPr lang="pt-BR" b="1" dirty="0"/>
+              <a:t>	</a:t>
+            </a:r>
+            <a:r>
+              <a:rPr lang="pt-BR" b="1" dirty="0" smtClean="0"/>
+              <a:t>	for(</a:t>
+            </a:r>
+            <a:r>
+              <a:rPr lang="pt-BR" b="1" dirty="0" err="1" smtClean="0"/>
+              <a:t>int</a:t>
+            </a:r>
+            <a:r>
+              <a:rPr lang="pt-BR" b="1" dirty="0" smtClean="0"/>
+              <a:t> </a:t>
+            </a:r>
+            <a:r>
+              <a:rPr lang="pt-BR" b="1" dirty="0"/>
+              <a:t>j=0; j&lt;4; j</a:t>
+            </a:r>
+            <a:r>
+              <a:rPr lang="pt-BR" b="1" dirty="0" smtClean="0"/>
+              <a:t>++)</a:t>
+            </a:r>
+          </a:p>
+          <a:p>
+            <a:pPr marL="0" indent="0">
+              <a:buNone/>
+            </a:pPr>
+            <a:r>
+              <a:rPr lang="pt-BR" b="1" dirty="0"/>
+              <a:t>	</a:t>
+            </a:r>
+            <a:r>
+              <a:rPr lang="pt-BR" b="1" dirty="0" smtClean="0"/>
+              <a:t>		</a:t>
+            </a:r>
+            <a:r>
+              <a:rPr lang="pt-BR" dirty="0" err="1" smtClean="0"/>
+              <a:t>System.</a:t>
+            </a:r>
+            <a:r>
+              <a:rPr lang="pt-BR" b="1" i="1" dirty="0" err="1" smtClean="0"/>
+              <a:t>out.print</a:t>
+            </a:r>
+            <a:r>
+              <a:rPr lang="pt-BR" b="1" i="1" dirty="0"/>
+              <a:t>("| "+ambiente[i][j]+" </a:t>
+            </a:r>
+            <a:r>
+              <a:rPr lang="pt-BR" b="1" i="1" dirty="0" smtClean="0"/>
+              <a:t>|"); 		</a:t>
+            </a:r>
+            <a:endParaRPr lang="pt-BR" b="1" i="1" dirty="0" smtClean="0"/>
+          </a:p>
+          <a:p>
+            <a:pPr marL="0" indent="0">
+              <a:buNone/>
+            </a:pPr>
+            <a:r>
+              <a:rPr lang="pt-BR" b="1" i="1" dirty="0" smtClean="0"/>
+              <a:t>		</a:t>
+            </a:r>
+            <a:r>
+              <a:rPr lang="pt-BR" dirty="0" err="1" smtClean="0"/>
+              <a:t>System.</a:t>
+            </a:r>
+            <a:r>
+              <a:rPr lang="pt-BR" b="1" i="1" dirty="0" err="1" smtClean="0"/>
+              <a:t>out.println</a:t>
+            </a:r>
+            <a:r>
+              <a:rPr lang="pt-BR" b="1" i="1" dirty="0"/>
+              <a:t>(" </a:t>
+            </a:r>
+            <a:r>
+              <a:rPr lang="pt-BR" b="1" i="1" dirty="0" smtClean="0"/>
+              <a:t>");</a:t>
+            </a:r>
+          </a:p>
+          <a:p>
+            <a:pPr marL="0" indent="0">
+              <a:buNone/>
+            </a:pPr>
+            <a:r>
+              <a:rPr lang="pt-BR" b="1" i="1" dirty="0"/>
+              <a:t>	</a:t>
+            </a:r>
+            <a:r>
+              <a:rPr lang="pt-BR" dirty="0" smtClean="0"/>
+              <a:t>}</a:t>
+            </a:r>
+          </a:p>
+          <a:p>
+            <a:pPr marL="0" indent="0">
+              <a:buNone/>
+            </a:pPr>
+            <a:r>
+              <a:rPr lang="pt-BR" dirty="0" smtClean="0"/>
+              <a:t>}</a:t>
             </a:r>
             <a:endParaRPr lang="pt-BR" dirty="0"/>
           </a:p>
@@ -13053,7 +13496,7 @@
     </p:spTree>
     <p:extLst>
       <p:ext uri="{BB962C8B-B14F-4D97-AF65-F5344CB8AC3E}">
-        <p14:creationId xmlns:p14="http://schemas.microsoft.com/office/powerpoint/2010/main" val="1907980347"/>
+        <p14:creationId xmlns:p14="http://schemas.microsoft.com/office/powerpoint/2010/main" val="3577587169"/>
       </p:ext>
     </p:extLst>
   </p:cSld>

</xml_diff>